<commit_message>
newest diagram is on the last slide
</commit_message>
<xml_diff>
--- a/beta/Bogovirus_β.pptx
+++ b/beta/Bogovirus_β.pptx
@@ -4,9 +4,14 @@
   <p:sldMasterIdLst>
     <p:sldMasterId id="2147483648" r:id="rId1"/>
   </p:sldMasterIdLst>
+  <p:notesMasterIdLst>
+    <p:notesMasterId r:id="rId6"/>
+  </p:notesMasterIdLst>
   <p:sldIdLst>
     <p:sldId id="256" r:id="rId2"/>
     <p:sldId id="259" r:id="rId3"/>
+    <p:sldId id="260" r:id="rId4"/>
+    <p:sldId id="261" r:id="rId5"/>
   </p:sldIdLst>
   <p:sldSz cx="12192000" cy="6858000"/>
   <p:notesSz cx="6858000" cy="9144000"/>
@@ -116,7 +121,7 @@
 <file path=ppt/revisionInfo.xml><?xml version="1.0" encoding="utf-8"?>
 <p1510:revInfo xmlns:a="http://schemas.openxmlformats.org/drawingml/2006/main" xmlns:r="http://schemas.openxmlformats.org/officeDocument/2006/relationships" xmlns:p1510="http://schemas.microsoft.com/office/powerpoint/2015/10/main">
   <p1510:revLst>
-    <p1510:client id="{238E5CC8-9B8A-406C-9BAE-8138369ADA9F}" v="3" dt="2023-02-08T07:25:55.302"/>
+    <p1510:client id="{238E5CC8-9B8A-406C-9BAE-8138369ADA9F}" v="7" dt="2023-02-10T21:28:29.088"/>
   </p1510:revLst>
 </p1510:revInfo>
 </file>
@@ -125,17 +130,33 @@
 <pc:chgInfo xmlns:a="http://schemas.openxmlformats.org/drawingml/2006/main" xmlns:r="http://schemas.openxmlformats.org/officeDocument/2006/relationships" xmlns:ac="http://schemas.microsoft.com/office/drawing/2013/main/command" xmlns:pc="http://schemas.microsoft.com/office/powerpoint/2013/main/command">
   <pc:docChgLst>
     <pc:chgData name="Robert Horton" userId="885a253a-1f89-43e3-bab8-4c3002513a21" providerId="ADAL" clId="{238E5CC8-9B8A-406C-9BAE-8138369ADA9F}"/>
-    <pc:docChg chg="custSel addSld delSld modSld">
-      <pc:chgData name="Robert Horton" userId="885a253a-1f89-43e3-bab8-4c3002513a21" providerId="ADAL" clId="{238E5CC8-9B8A-406C-9BAE-8138369ADA9F}" dt="2023-02-08T23:04:14.442" v="124" actId="47"/>
+    <pc:docChg chg="undo custSel addSld delSld modSld">
+      <pc:chgData name="Robert Horton" userId="885a253a-1f89-43e3-bab8-4c3002513a21" providerId="ADAL" clId="{238E5CC8-9B8A-406C-9BAE-8138369ADA9F}" dt="2023-02-10T22:32:53.059" v="1123" actId="20577"/>
       <pc:docMkLst>
         <pc:docMk/>
       </pc:docMkLst>
       <pc:sldChg chg="addSp delSp modSp mod">
-        <pc:chgData name="Robert Horton" userId="885a253a-1f89-43e3-bab8-4c3002513a21" providerId="ADAL" clId="{238E5CC8-9B8A-406C-9BAE-8138369ADA9F}" dt="2023-02-08T07:30:19.089" v="116" actId="688"/>
+        <pc:chgData name="Robert Horton" userId="885a253a-1f89-43e3-bab8-4c3002513a21" providerId="ADAL" clId="{238E5CC8-9B8A-406C-9BAE-8138369ADA9F}" dt="2023-02-09T18:15:28.912" v="152" actId="14100"/>
         <pc:sldMkLst>
           <pc:docMk/>
           <pc:sldMk cId="3939775279" sldId="259"/>
         </pc:sldMkLst>
+        <pc:spChg chg="add mod">
+          <ac:chgData name="Robert Horton" userId="885a253a-1f89-43e3-bab8-4c3002513a21" providerId="ADAL" clId="{238E5CC8-9B8A-406C-9BAE-8138369ADA9F}" dt="2023-02-09T18:15:03.155" v="134" actId="1076"/>
+          <ac:spMkLst>
+            <pc:docMk/>
+            <pc:sldMk cId="3939775279" sldId="259"/>
+            <ac:spMk id="2" creationId="{53D412E8-D39A-D47C-9D86-C709D9A87BAC}"/>
+          </ac:spMkLst>
+        </pc:spChg>
+        <pc:spChg chg="del mod">
+          <ac:chgData name="Robert Horton" userId="885a253a-1f89-43e3-bab8-4c3002513a21" providerId="ADAL" clId="{238E5CC8-9B8A-406C-9BAE-8138369ADA9F}" dt="2023-02-09T18:14:59.794" v="133" actId="478"/>
+          <ac:spMkLst>
+            <pc:docMk/>
+            <pc:sldMk cId="3939775279" sldId="259"/>
+            <ac:spMk id="4" creationId="{53A84C64-E677-3BE2-9483-3F8A5501E2D0}"/>
+          </ac:spMkLst>
+        </pc:spChg>
         <pc:spChg chg="mod">
           <ac:chgData name="Robert Horton" userId="885a253a-1f89-43e3-bab8-4c3002513a21" providerId="ADAL" clId="{238E5CC8-9B8A-406C-9BAE-8138369ADA9F}" dt="2023-02-08T07:21:41.052" v="0" actId="1076"/>
           <ac:spMkLst>
@@ -249,7 +270,7 @@
           </ac:spMkLst>
         </pc:spChg>
         <pc:spChg chg="add mod">
-          <ac:chgData name="Robert Horton" userId="885a253a-1f89-43e3-bab8-4c3002513a21" providerId="ADAL" clId="{238E5CC8-9B8A-406C-9BAE-8138369ADA9F}" dt="2023-02-08T07:24:46.560" v="54" actId="1076"/>
+          <ac:chgData name="Robert Horton" userId="885a253a-1f89-43e3-bab8-4c3002513a21" providerId="ADAL" clId="{238E5CC8-9B8A-406C-9BAE-8138369ADA9F}" dt="2023-02-09T18:15:18.214" v="150" actId="1037"/>
           <ac:spMkLst>
             <pc:docMk/>
             <pc:sldMk cId="3939775279" sldId="259"/>
@@ -281,7 +302,23 @@
           </ac:cxnSpMkLst>
         </pc:cxnChg>
         <pc:cxnChg chg="mod">
-          <ac:chgData name="Robert Horton" userId="885a253a-1f89-43e3-bab8-4c3002513a21" providerId="ADAL" clId="{238E5CC8-9B8A-406C-9BAE-8138369ADA9F}" dt="2023-02-08T07:27:40.225" v="100" actId="14100"/>
+          <ac:chgData name="Robert Horton" userId="885a253a-1f89-43e3-bab8-4c3002513a21" providerId="ADAL" clId="{238E5CC8-9B8A-406C-9BAE-8138369ADA9F}" dt="2023-02-09T18:15:24.579" v="151" actId="14100"/>
+          <ac:cxnSpMkLst>
+            <pc:docMk/>
+            <pc:sldMk cId="3939775279" sldId="259"/>
+            <ac:cxnSpMk id="11" creationId="{59456F5B-620F-A858-C60E-273E3B1B6A0E}"/>
+          </ac:cxnSpMkLst>
+        </pc:cxnChg>
+        <pc:cxnChg chg="mod">
+          <ac:chgData name="Robert Horton" userId="885a253a-1f89-43e3-bab8-4c3002513a21" providerId="ADAL" clId="{238E5CC8-9B8A-406C-9BAE-8138369ADA9F}" dt="2023-02-09T18:15:07.778" v="135" actId="14100"/>
+          <ac:cxnSpMkLst>
+            <pc:docMk/>
+            <pc:sldMk cId="3939775279" sldId="259"/>
+            <ac:cxnSpMk id="12" creationId="{733ECA5E-28CF-29F2-4A5F-3CC4B8E725CA}"/>
+          </ac:cxnSpMkLst>
+        </pc:cxnChg>
+        <pc:cxnChg chg="mod">
+          <ac:chgData name="Robert Horton" userId="885a253a-1f89-43e3-bab8-4c3002513a21" providerId="ADAL" clId="{238E5CC8-9B8A-406C-9BAE-8138369ADA9F}" dt="2023-02-09T18:15:28.912" v="152" actId="14100"/>
           <ac:cxnSpMkLst>
             <pc:docMk/>
             <pc:sldMk cId="3939775279" sldId="259"/>
@@ -480,9 +517,955 @@
           </ac:cxnSpMkLst>
         </pc:cxnChg>
       </pc:sldChg>
+      <pc:sldChg chg="addSp delSp modSp add mod">
+        <pc:chgData name="Robert Horton" userId="885a253a-1f89-43e3-bab8-4c3002513a21" providerId="ADAL" clId="{238E5CC8-9B8A-406C-9BAE-8138369ADA9F}" dt="2023-02-10T22:32:33.351" v="1107" actId="1037"/>
+        <pc:sldMkLst>
+          <pc:docMk/>
+          <pc:sldMk cId="2686814815" sldId="260"/>
+        </pc:sldMkLst>
+        <pc:spChg chg="mod">
+          <ac:chgData name="Robert Horton" userId="885a253a-1f89-43e3-bab8-4c3002513a21" providerId="ADAL" clId="{238E5CC8-9B8A-406C-9BAE-8138369ADA9F}" dt="2023-02-10T22:31:09.818" v="1076" actId="1037"/>
+          <ac:spMkLst>
+            <pc:docMk/>
+            <pc:sldMk cId="2686814815" sldId="260"/>
+            <ac:spMk id="2" creationId="{53D412E8-D39A-D47C-9D86-C709D9A87BAC}"/>
+          </ac:spMkLst>
+        </pc:spChg>
+        <pc:spChg chg="mod">
+          <ac:chgData name="Robert Horton" userId="885a253a-1f89-43e3-bab8-4c3002513a21" providerId="ADAL" clId="{238E5CC8-9B8A-406C-9BAE-8138369ADA9F}" dt="2023-02-10T22:31:09.818" v="1076" actId="1037"/>
+          <ac:spMkLst>
+            <pc:docMk/>
+            <pc:sldMk cId="2686814815" sldId="260"/>
+            <ac:spMk id="3" creationId="{A57852EE-101C-7687-CEC3-9C14B3A866A7}"/>
+          </ac:spMkLst>
+        </pc:spChg>
+        <pc:spChg chg="mod">
+          <ac:chgData name="Robert Horton" userId="885a253a-1f89-43e3-bab8-4c3002513a21" providerId="ADAL" clId="{238E5CC8-9B8A-406C-9BAE-8138369ADA9F}" dt="2023-02-10T22:31:09.818" v="1076" actId="1037"/>
+          <ac:spMkLst>
+            <pc:docMk/>
+            <pc:sldMk cId="2686814815" sldId="260"/>
+            <ac:spMk id="5" creationId="{3D0AD825-B406-118F-F745-7B9BC3378854}"/>
+          </ac:spMkLst>
+        </pc:spChg>
+        <pc:spChg chg="mod">
+          <ac:chgData name="Robert Horton" userId="885a253a-1f89-43e3-bab8-4c3002513a21" providerId="ADAL" clId="{238E5CC8-9B8A-406C-9BAE-8138369ADA9F}" dt="2023-02-10T22:32:33.351" v="1107" actId="1037"/>
+          <ac:spMkLst>
+            <pc:docMk/>
+            <pc:sldMk cId="2686814815" sldId="260"/>
+            <ac:spMk id="6" creationId="{D89F8164-5C1D-3E83-12C4-6141C0E20429}"/>
+          </ac:spMkLst>
+        </pc:spChg>
+        <pc:spChg chg="mod">
+          <ac:chgData name="Robert Horton" userId="885a253a-1f89-43e3-bab8-4c3002513a21" providerId="ADAL" clId="{238E5CC8-9B8A-406C-9BAE-8138369ADA9F}" dt="2023-02-10T22:31:09.818" v="1076" actId="1037"/>
+          <ac:spMkLst>
+            <pc:docMk/>
+            <pc:sldMk cId="2686814815" sldId="260"/>
+            <ac:spMk id="7" creationId="{3B799602-B204-34BD-F3DE-7C5042CE0F10}"/>
+          </ac:spMkLst>
+        </pc:spChg>
+        <pc:spChg chg="mod">
+          <ac:chgData name="Robert Horton" userId="885a253a-1f89-43e3-bab8-4c3002513a21" providerId="ADAL" clId="{238E5CC8-9B8A-406C-9BAE-8138369ADA9F}" dt="2023-02-10T22:31:09.818" v="1076" actId="1037"/>
+          <ac:spMkLst>
+            <pc:docMk/>
+            <pc:sldMk cId="2686814815" sldId="260"/>
+            <ac:spMk id="18" creationId="{EE33DA0C-8AB4-AD8D-381A-9EB869329156}"/>
+          </ac:spMkLst>
+        </pc:spChg>
+        <pc:spChg chg="mod">
+          <ac:chgData name="Robert Horton" userId="885a253a-1f89-43e3-bab8-4c3002513a21" providerId="ADAL" clId="{238E5CC8-9B8A-406C-9BAE-8138369ADA9F}" dt="2023-02-10T22:31:09.818" v="1076" actId="1037"/>
+          <ac:spMkLst>
+            <pc:docMk/>
+            <pc:sldMk cId="2686814815" sldId="260"/>
+            <ac:spMk id="19" creationId="{45F92B5B-3D79-4674-556E-536FC9AAEC64}"/>
+          </ac:spMkLst>
+        </pc:spChg>
+        <pc:spChg chg="mod">
+          <ac:chgData name="Robert Horton" userId="885a253a-1f89-43e3-bab8-4c3002513a21" providerId="ADAL" clId="{238E5CC8-9B8A-406C-9BAE-8138369ADA9F}" dt="2023-02-10T22:31:09.818" v="1076" actId="1037"/>
+          <ac:spMkLst>
+            <pc:docMk/>
+            <pc:sldMk cId="2686814815" sldId="260"/>
+            <ac:spMk id="23" creationId="{842FC0AB-E109-13AD-E8FC-D99AF4ECA6F5}"/>
+          </ac:spMkLst>
+        </pc:spChg>
+        <pc:spChg chg="mod">
+          <ac:chgData name="Robert Horton" userId="885a253a-1f89-43e3-bab8-4c3002513a21" providerId="ADAL" clId="{238E5CC8-9B8A-406C-9BAE-8138369ADA9F}" dt="2023-02-10T22:31:09.818" v="1076" actId="1037"/>
+          <ac:spMkLst>
+            <pc:docMk/>
+            <pc:sldMk cId="2686814815" sldId="260"/>
+            <ac:spMk id="25" creationId="{348540B3-09AE-C68E-1B9B-AD73BA94B7DA}"/>
+          </ac:spMkLst>
+        </pc:spChg>
+        <pc:spChg chg="mod">
+          <ac:chgData name="Robert Horton" userId="885a253a-1f89-43e3-bab8-4c3002513a21" providerId="ADAL" clId="{238E5CC8-9B8A-406C-9BAE-8138369ADA9F}" dt="2023-02-10T22:31:09.818" v="1076" actId="1037"/>
+          <ac:spMkLst>
+            <pc:docMk/>
+            <pc:sldMk cId="2686814815" sldId="260"/>
+            <ac:spMk id="27" creationId="{8F2D6096-AE95-313A-A509-F81911C89B14}"/>
+          </ac:spMkLst>
+        </pc:spChg>
+        <pc:spChg chg="add mod">
+          <ac:chgData name="Robert Horton" userId="885a253a-1f89-43e3-bab8-4c3002513a21" providerId="ADAL" clId="{238E5CC8-9B8A-406C-9BAE-8138369ADA9F}" dt="2023-02-10T22:31:09.818" v="1076" actId="1037"/>
+          <ac:spMkLst>
+            <pc:docMk/>
+            <pc:sldMk cId="2686814815" sldId="260"/>
+            <ac:spMk id="28" creationId="{5FB22E92-5869-FE2B-2FC1-E3D7AC32E66A}"/>
+          </ac:spMkLst>
+        </pc:spChg>
+        <pc:spChg chg="mod">
+          <ac:chgData name="Robert Horton" userId="885a253a-1f89-43e3-bab8-4c3002513a21" providerId="ADAL" clId="{238E5CC8-9B8A-406C-9BAE-8138369ADA9F}" dt="2023-02-10T22:31:09.818" v="1076" actId="1037"/>
+          <ac:spMkLst>
+            <pc:docMk/>
+            <pc:sldMk cId="2686814815" sldId="260"/>
+            <ac:spMk id="47" creationId="{D169DE58-0667-10B7-0EF1-143BB6F859B1}"/>
+          </ac:spMkLst>
+        </pc:spChg>
+        <pc:spChg chg="mod">
+          <ac:chgData name="Robert Horton" userId="885a253a-1f89-43e3-bab8-4c3002513a21" providerId="ADAL" clId="{238E5CC8-9B8A-406C-9BAE-8138369ADA9F}" dt="2023-02-10T22:31:09.818" v="1076" actId="1037"/>
+          <ac:spMkLst>
+            <pc:docMk/>
+            <pc:sldMk cId="2686814815" sldId="260"/>
+            <ac:spMk id="91" creationId="{294A6E50-E077-59B9-3A8F-D3361EDAA4E8}"/>
+          </ac:spMkLst>
+        </pc:spChg>
+        <pc:spChg chg="mod">
+          <ac:chgData name="Robert Horton" userId="885a253a-1f89-43e3-bab8-4c3002513a21" providerId="ADAL" clId="{238E5CC8-9B8A-406C-9BAE-8138369ADA9F}" dt="2023-02-10T22:31:09.818" v="1076" actId="1037"/>
+          <ac:spMkLst>
+            <pc:docMk/>
+            <pc:sldMk cId="2686814815" sldId="260"/>
+            <ac:spMk id="92" creationId="{C304E32B-DCB4-318B-5CC8-AC6C4E6FE682}"/>
+          </ac:spMkLst>
+        </pc:spChg>
+        <pc:spChg chg="mod">
+          <ac:chgData name="Robert Horton" userId="885a253a-1f89-43e3-bab8-4c3002513a21" providerId="ADAL" clId="{238E5CC8-9B8A-406C-9BAE-8138369ADA9F}" dt="2023-02-10T22:31:09.818" v="1076" actId="1037"/>
+          <ac:spMkLst>
+            <pc:docMk/>
+            <pc:sldMk cId="2686814815" sldId="260"/>
+            <ac:spMk id="93" creationId="{165BFDEB-4D2A-6F7A-09F6-C9D5B761B0CF}"/>
+          </ac:spMkLst>
+        </pc:spChg>
+        <pc:spChg chg="mod">
+          <ac:chgData name="Robert Horton" userId="885a253a-1f89-43e3-bab8-4c3002513a21" providerId="ADAL" clId="{238E5CC8-9B8A-406C-9BAE-8138369ADA9F}" dt="2023-02-10T22:31:09.818" v="1076" actId="1037"/>
+          <ac:spMkLst>
+            <pc:docMk/>
+            <pc:sldMk cId="2686814815" sldId="260"/>
+            <ac:spMk id="104" creationId="{8A4F6DF9-C937-42C1-3F6B-98D13B0D7225}"/>
+          </ac:spMkLst>
+        </pc:spChg>
+        <pc:spChg chg="mod">
+          <ac:chgData name="Robert Horton" userId="885a253a-1f89-43e3-bab8-4c3002513a21" providerId="ADAL" clId="{238E5CC8-9B8A-406C-9BAE-8138369ADA9F}" dt="2023-02-10T22:32:18.221" v="1101" actId="1038"/>
+          <ac:spMkLst>
+            <pc:docMk/>
+            <pc:sldMk cId="2686814815" sldId="260"/>
+            <ac:spMk id="105" creationId="{125983A9-5CCB-C88B-12C2-7D1BBBC78EBF}"/>
+          </ac:spMkLst>
+        </pc:spChg>
+        <pc:spChg chg="mod">
+          <ac:chgData name="Robert Horton" userId="885a253a-1f89-43e3-bab8-4c3002513a21" providerId="ADAL" clId="{238E5CC8-9B8A-406C-9BAE-8138369ADA9F}" dt="2023-02-10T22:31:09.818" v="1076" actId="1037"/>
+          <ac:spMkLst>
+            <pc:docMk/>
+            <pc:sldMk cId="2686814815" sldId="260"/>
+            <ac:spMk id="109" creationId="{DFED97AE-D445-411C-5401-9D0BD11D1EF3}"/>
+          </ac:spMkLst>
+        </pc:spChg>
+        <pc:cxnChg chg="mod">
+          <ac:chgData name="Robert Horton" userId="885a253a-1f89-43e3-bab8-4c3002513a21" providerId="ADAL" clId="{238E5CC8-9B8A-406C-9BAE-8138369ADA9F}" dt="2023-02-10T22:31:09.818" v="1076" actId="1037"/>
+          <ac:cxnSpMkLst>
+            <pc:docMk/>
+            <pc:sldMk cId="2686814815" sldId="260"/>
+            <ac:cxnSpMk id="9" creationId="{32A9BC64-0B31-72F0-4FB8-373A6FD0E265}"/>
+          </ac:cxnSpMkLst>
+        </pc:cxnChg>
+        <pc:cxnChg chg="mod">
+          <ac:chgData name="Robert Horton" userId="885a253a-1f89-43e3-bab8-4c3002513a21" providerId="ADAL" clId="{238E5CC8-9B8A-406C-9BAE-8138369ADA9F}" dt="2023-02-10T22:32:33.351" v="1107" actId="1037"/>
+          <ac:cxnSpMkLst>
+            <pc:docMk/>
+            <pc:sldMk cId="2686814815" sldId="260"/>
+            <ac:cxnSpMk id="10" creationId="{2E975068-4584-07EC-8508-E7A6CF15D699}"/>
+          </ac:cxnSpMkLst>
+        </pc:cxnChg>
+        <pc:cxnChg chg="mod">
+          <ac:chgData name="Robert Horton" userId="885a253a-1f89-43e3-bab8-4c3002513a21" providerId="ADAL" clId="{238E5CC8-9B8A-406C-9BAE-8138369ADA9F}" dt="2023-02-10T22:31:09.818" v="1076" actId="1037"/>
+          <ac:cxnSpMkLst>
+            <pc:docMk/>
+            <pc:sldMk cId="2686814815" sldId="260"/>
+            <ac:cxnSpMk id="11" creationId="{59456F5B-620F-A858-C60E-273E3B1B6A0E}"/>
+          </ac:cxnSpMkLst>
+        </pc:cxnChg>
+        <pc:cxnChg chg="mod">
+          <ac:chgData name="Robert Horton" userId="885a253a-1f89-43e3-bab8-4c3002513a21" providerId="ADAL" clId="{238E5CC8-9B8A-406C-9BAE-8138369ADA9F}" dt="2023-02-10T22:31:09.818" v="1076" actId="1037"/>
+          <ac:cxnSpMkLst>
+            <pc:docMk/>
+            <pc:sldMk cId="2686814815" sldId="260"/>
+            <ac:cxnSpMk id="12" creationId="{733ECA5E-28CF-29F2-4A5F-3CC4B8E725CA}"/>
+          </ac:cxnSpMkLst>
+        </pc:cxnChg>
+        <pc:cxnChg chg="mod">
+          <ac:chgData name="Robert Horton" userId="885a253a-1f89-43e3-bab8-4c3002513a21" providerId="ADAL" clId="{238E5CC8-9B8A-406C-9BAE-8138369ADA9F}" dt="2023-02-10T22:31:09.818" v="1076" actId="1037"/>
+          <ac:cxnSpMkLst>
+            <pc:docMk/>
+            <pc:sldMk cId="2686814815" sldId="260"/>
+            <ac:cxnSpMk id="13" creationId="{4A69FCD4-2B44-8B22-A3F9-688B631473F2}"/>
+          </ac:cxnSpMkLst>
+        </pc:cxnChg>
+        <pc:cxnChg chg="mod">
+          <ac:chgData name="Robert Horton" userId="885a253a-1f89-43e3-bab8-4c3002513a21" providerId="ADAL" clId="{238E5CC8-9B8A-406C-9BAE-8138369ADA9F}" dt="2023-02-10T22:31:09.818" v="1076" actId="1037"/>
+          <ac:cxnSpMkLst>
+            <pc:docMk/>
+            <pc:sldMk cId="2686814815" sldId="260"/>
+            <ac:cxnSpMk id="14" creationId="{36C827B2-CD4E-DBBF-9426-925F0EFB15FC}"/>
+          </ac:cxnSpMkLst>
+        </pc:cxnChg>
+        <pc:cxnChg chg="mod">
+          <ac:chgData name="Robert Horton" userId="885a253a-1f89-43e3-bab8-4c3002513a21" providerId="ADAL" clId="{238E5CC8-9B8A-406C-9BAE-8138369ADA9F}" dt="2023-02-10T22:31:09.818" v="1076" actId="1037"/>
+          <ac:cxnSpMkLst>
+            <pc:docMk/>
+            <pc:sldMk cId="2686814815" sldId="260"/>
+            <ac:cxnSpMk id="15" creationId="{49E9C397-2A44-C023-53EF-04E578C5946B}"/>
+          </ac:cxnSpMkLst>
+        </pc:cxnChg>
+        <pc:cxnChg chg="mod">
+          <ac:chgData name="Robert Horton" userId="885a253a-1f89-43e3-bab8-4c3002513a21" providerId="ADAL" clId="{238E5CC8-9B8A-406C-9BAE-8138369ADA9F}" dt="2023-02-10T22:32:33.351" v="1107" actId="1037"/>
+          <ac:cxnSpMkLst>
+            <pc:docMk/>
+            <pc:sldMk cId="2686814815" sldId="260"/>
+            <ac:cxnSpMk id="16" creationId="{6778C715-EF7E-AD6E-CD3E-CAD8D6BAF79D}"/>
+          </ac:cxnSpMkLst>
+        </pc:cxnChg>
+        <pc:cxnChg chg="mod">
+          <ac:chgData name="Robert Horton" userId="885a253a-1f89-43e3-bab8-4c3002513a21" providerId="ADAL" clId="{238E5CC8-9B8A-406C-9BAE-8138369ADA9F}" dt="2023-02-10T22:32:33.351" v="1107" actId="1037"/>
+          <ac:cxnSpMkLst>
+            <pc:docMk/>
+            <pc:sldMk cId="2686814815" sldId="260"/>
+            <ac:cxnSpMk id="22" creationId="{CF41CEEC-8444-B47E-3789-4AFFB7E1B4D6}"/>
+          </ac:cxnSpMkLst>
+        </pc:cxnChg>
+        <pc:cxnChg chg="mod">
+          <ac:chgData name="Robert Horton" userId="885a253a-1f89-43e3-bab8-4c3002513a21" providerId="ADAL" clId="{238E5CC8-9B8A-406C-9BAE-8138369ADA9F}" dt="2023-02-10T22:31:09.818" v="1076" actId="1037"/>
+          <ac:cxnSpMkLst>
+            <pc:docMk/>
+            <pc:sldMk cId="2686814815" sldId="260"/>
+            <ac:cxnSpMk id="24" creationId="{2B3E895E-1C0A-9E82-9A03-2C98F256CE20}"/>
+          </ac:cxnSpMkLst>
+        </pc:cxnChg>
+        <pc:cxnChg chg="add mod">
+          <ac:chgData name="Robert Horton" userId="885a253a-1f89-43e3-bab8-4c3002513a21" providerId="ADAL" clId="{238E5CC8-9B8A-406C-9BAE-8138369ADA9F}" dt="2023-02-10T22:31:09.818" v="1076" actId="1037"/>
+          <ac:cxnSpMkLst>
+            <pc:docMk/>
+            <pc:sldMk cId="2686814815" sldId="260"/>
+            <ac:cxnSpMk id="29" creationId="{67160EC5-A298-1067-141E-330F245FD62C}"/>
+          </ac:cxnSpMkLst>
+        </pc:cxnChg>
+        <pc:cxnChg chg="add mod">
+          <ac:chgData name="Robert Horton" userId="885a253a-1f89-43e3-bab8-4c3002513a21" providerId="ADAL" clId="{238E5CC8-9B8A-406C-9BAE-8138369ADA9F}" dt="2023-02-10T22:31:09.818" v="1076" actId="1037"/>
+          <ac:cxnSpMkLst>
+            <pc:docMk/>
+            <pc:sldMk cId="2686814815" sldId="260"/>
+            <ac:cxnSpMk id="33" creationId="{FF82D7BB-97D1-8C08-501A-B6DD9242C184}"/>
+          </ac:cxnSpMkLst>
+        </pc:cxnChg>
+        <pc:cxnChg chg="mod">
+          <ac:chgData name="Robert Horton" userId="885a253a-1f89-43e3-bab8-4c3002513a21" providerId="ADAL" clId="{238E5CC8-9B8A-406C-9BAE-8138369ADA9F}" dt="2023-02-10T22:31:09.818" v="1076" actId="1037"/>
+          <ac:cxnSpMkLst>
+            <pc:docMk/>
+            <pc:sldMk cId="2686814815" sldId="260"/>
+            <ac:cxnSpMk id="62" creationId="{2115033C-3D06-AD2D-50FB-D82CB92905C5}"/>
+          </ac:cxnSpMkLst>
+        </pc:cxnChg>
+        <pc:cxnChg chg="del mod">
+          <ac:chgData name="Robert Horton" userId="885a253a-1f89-43e3-bab8-4c3002513a21" providerId="ADAL" clId="{238E5CC8-9B8A-406C-9BAE-8138369ADA9F}" dt="2023-02-09T18:22:11.263" v="154" actId="478"/>
+          <ac:cxnSpMkLst>
+            <pc:docMk/>
+            <pc:sldMk cId="2686814815" sldId="260"/>
+            <ac:cxnSpMk id="65" creationId="{35FDBE92-A33A-EE4B-6400-15669DC76250}"/>
+          </ac:cxnSpMkLst>
+        </pc:cxnChg>
+        <pc:cxnChg chg="del mod">
+          <ac:chgData name="Robert Horton" userId="885a253a-1f89-43e3-bab8-4c3002513a21" providerId="ADAL" clId="{238E5CC8-9B8A-406C-9BAE-8138369ADA9F}" dt="2023-02-09T18:22:13.205" v="155" actId="478"/>
+          <ac:cxnSpMkLst>
+            <pc:docMk/>
+            <pc:sldMk cId="2686814815" sldId="260"/>
+            <ac:cxnSpMk id="66" creationId="{51284FB0-CFEA-5EC7-7BE1-87806299BB08}"/>
+          </ac:cxnSpMkLst>
+        </pc:cxnChg>
+      </pc:sldChg>
+      <pc:sldChg chg="addSp delSp modSp add mod modNotes">
+        <pc:chgData name="Robert Horton" userId="885a253a-1f89-43e3-bab8-4c3002513a21" providerId="ADAL" clId="{238E5CC8-9B8A-406C-9BAE-8138369ADA9F}" dt="2023-02-10T22:32:53.059" v="1123" actId="20577"/>
+        <pc:sldMkLst>
+          <pc:docMk/>
+          <pc:sldMk cId="3241601526" sldId="261"/>
+        </pc:sldMkLst>
+        <pc:spChg chg="mod">
+          <ac:chgData name="Robert Horton" userId="885a253a-1f89-43e3-bab8-4c3002513a21" providerId="ADAL" clId="{238E5CC8-9B8A-406C-9BAE-8138369ADA9F}" dt="2023-02-10T21:32:14.242" v="1009" actId="12788"/>
+          <ac:spMkLst>
+            <pc:docMk/>
+            <pc:sldMk cId="3241601526" sldId="261"/>
+            <ac:spMk id="3" creationId="{A57852EE-101C-7687-CEC3-9C14B3A866A7}"/>
+          </ac:spMkLst>
+        </pc:spChg>
+        <pc:spChg chg="mod">
+          <ac:chgData name="Robert Horton" userId="885a253a-1f89-43e3-bab8-4c3002513a21" providerId="ADAL" clId="{238E5CC8-9B8A-406C-9BAE-8138369ADA9F}" dt="2023-02-10T21:32:14.242" v="1009" actId="12788"/>
+          <ac:spMkLst>
+            <pc:docMk/>
+            <pc:sldMk cId="3241601526" sldId="261"/>
+            <ac:spMk id="5" creationId="{3D0AD825-B406-118F-F745-7B9BC3378854}"/>
+          </ac:spMkLst>
+        </pc:spChg>
+        <pc:spChg chg="mod">
+          <ac:chgData name="Robert Horton" userId="885a253a-1f89-43e3-bab8-4c3002513a21" providerId="ADAL" clId="{238E5CC8-9B8A-406C-9BAE-8138369ADA9F}" dt="2023-02-10T21:32:14.242" v="1009" actId="12788"/>
+          <ac:spMkLst>
+            <pc:docMk/>
+            <pc:sldMk cId="3241601526" sldId="261"/>
+            <ac:spMk id="7" creationId="{3B799602-B204-34BD-F3DE-7C5042CE0F10}"/>
+          </ac:spMkLst>
+        </pc:spChg>
+        <pc:spChg chg="mod">
+          <ac:chgData name="Robert Horton" userId="885a253a-1f89-43e3-bab8-4c3002513a21" providerId="ADAL" clId="{238E5CC8-9B8A-406C-9BAE-8138369ADA9F}" dt="2023-02-10T21:32:14.242" v="1009" actId="12788"/>
+          <ac:spMkLst>
+            <pc:docMk/>
+            <pc:sldMk cId="3241601526" sldId="261"/>
+            <ac:spMk id="18" creationId="{EE33DA0C-8AB4-AD8D-381A-9EB869329156}"/>
+          </ac:spMkLst>
+        </pc:spChg>
+        <pc:spChg chg="mod">
+          <ac:chgData name="Robert Horton" userId="885a253a-1f89-43e3-bab8-4c3002513a21" providerId="ADAL" clId="{238E5CC8-9B8A-406C-9BAE-8138369ADA9F}" dt="2023-02-10T21:31:45.910" v="1007" actId="12788"/>
+          <ac:spMkLst>
+            <pc:docMk/>
+            <pc:sldMk cId="3241601526" sldId="261"/>
+            <ac:spMk id="19" creationId="{45F92B5B-3D79-4674-556E-536FC9AAEC64}"/>
+          </ac:spMkLst>
+        </pc:spChg>
+        <pc:spChg chg="mod">
+          <ac:chgData name="Robert Horton" userId="885a253a-1f89-43e3-bab8-4c3002513a21" providerId="ADAL" clId="{238E5CC8-9B8A-406C-9BAE-8138369ADA9F}" dt="2023-02-10T21:28:17.130" v="842" actId="1076"/>
+          <ac:spMkLst>
+            <pc:docMk/>
+            <pc:sldMk cId="3241601526" sldId="261"/>
+            <ac:spMk id="23" creationId="{842FC0AB-E109-13AD-E8FC-D99AF4ECA6F5}"/>
+          </ac:spMkLst>
+        </pc:spChg>
+        <pc:spChg chg="mod">
+          <ac:chgData name="Robert Horton" userId="885a253a-1f89-43e3-bab8-4c3002513a21" providerId="ADAL" clId="{238E5CC8-9B8A-406C-9BAE-8138369ADA9F}" dt="2023-02-10T21:31:45.910" v="1007" actId="12788"/>
+          <ac:spMkLst>
+            <pc:docMk/>
+            <pc:sldMk cId="3241601526" sldId="261"/>
+            <ac:spMk id="25" creationId="{348540B3-09AE-C68E-1B9B-AD73BA94B7DA}"/>
+          </ac:spMkLst>
+        </pc:spChg>
+        <pc:spChg chg="add mod">
+          <ac:chgData name="Robert Horton" userId="885a253a-1f89-43e3-bab8-4c3002513a21" providerId="ADAL" clId="{238E5CC8-9B8A-406C-9BAE-8138369ADA9F}" dt="2023-02-10T21:29:09.127" v="956" actId="122"/>
+          <ac:spMkLst>
+            <pc:docMk/>
+            <pc:sldMk cId="3241601526" sldId="261"/>
+            <ac:spMk id="26" creationId="{37D3927D-ECDF-6810-2E9E-91E6B66D3E60}"/>
+          </ac:spMkLst>
+        </pc:spChg>
+        <pc:spChg chg="mod">
+          <ac:chgData name="Robert Horton" userId="885a253a-1f89-43e3-bab8-4c3002513a21" providerId="ADAL" clId="{238E5CC8-9B8A-406C-9BAE-8138369ADA9F}" dt="2023-02-10T21:31:45.910" v="1007" actId="12788"/>
+          <ac:spMkLst>
+            <pc:docMk/>
+            <pc:sldMk cId="3241601526" sldId="261"/>
+            <ac:spMk id="27" creationId="{8F2D6096-AE95-313A-A509-F81911C89B14}"/>
+          </ac:spMkLst>
+        </pc:spChg>
+        <pc:spChg chg="mod">
+          <ac:chgData name="Robert Horton" userId="885a253a-1f89-43e3-bab8-4c3002513a21" providerId="ADAL" clId="{238E5CC8-9B8A-406C-9BAE-8138369ADA9F}" dt="2023-02-10T21:32:27.809" v="1010" actId="1076"/>
+          <ac:spMkLst>
+            <pc:docMk/>
+            <pc:sldMk cId="3241601526" sldId="261"/>
+            <ac:spMk id="28" creationId="{5FB22E92-5869-FE2B-2FC1-E3D7AC32E66A}"/>
+          </ac:spMkLst>
+        </pc:spChg>
+        <pc:spChg chg="mod">
+          <ac:chgData name="Robert Horton" userId="885a253a-1f89-43e3-bab8-4c3002513a21" providerId="ADAL" clId="{238E5CC8-9B8A-406C-9BAE-8138369ADA9F}" dt="2023-02-10T21:31:45.910" v="1007" actId="12788"/>
+          <ac:spMkLst>
+            <pc:docMk/>
+            <pc:sldMk cId="3241601526" sldId="261"/>
+            <ac:spMk id="47" creationId="{D169DE58-0667-10B7-0EF1-143BB6F859B1}"/>
+          </ac:spMkLst>
+        </pc:spChg>
+        <pc:spChg chg="mod">
+          <ac:chgData name="Robert Horton" userId="885a253a-1f89-43e3-bab8-4c3002513a21" providerId="ADAL" clId="{238E5CC8-9B8A-406C-9BAE-8138369ADA9F}" dt="2023-02-10T21:29:18.951" v="959" actId="122"/>
+          <ac:spMkLst>
+            <pc:docMk/>
+            <pc:sldMk cId="3241601526" sldId="261"/>
+            <ac:spMk id="91" creationId="{294A6E50-E077-59B9-3A8F-D3361EDAA4E8}"/>
+          </ac:spMkLst>
+        </pc:spChg>
+        <pc:spChg chg="del mod">
+          <ac:chgData name="Robert Horton" userId="885a253a-1f89-43e3-bab8-4c3002513a21" providerId="ADAL" clId="{238E5CC8-9B8A-406C-9BAE-8138369ADA9F}" dt="2023-02-10T21:27:15.999" v="816" actId="478"/>
+          <ac:spMkLst>
+            <pc:docMk/>
+            <pc:sldMk cId="3241601526" sldId="261"/>
+            <ac:spMk id="92" creationId="{C304E32B-DCB4-318B-5CC8-AC6C4E6FE682}"/>
+          </ac:spMkLst>
+        </pc:spChg>
+        <pc:spChg chg="mod">
+          <ac:chgData name="Robert Horton" userId="885a253a-1f89-43e3-bab8-4c3002513a21" providerId="ADAL" clId="{238E5CC8-9B8A-406C-9BAE-8138369ADA9F}" dt="2023-02-10T21:30:15.945" v="999" actId="1035"/>
+          <ac:spMkLst>
+            <pc:docMk/>
+            <pc:sldMk cId="3241601526" sldId="261"/>
+            <ac:spMk id="93" creationId="{165BFDEB-4D2A-6F7A-09F6-C9D5B761B0CF}"/>
+          </ac:spMkLst>
+        </pc:spChg>
+        <pc:spChg chg="mod">
+          <ac:chgData name="Robert Horton" userId="885a253a-1f89-43e3-bab8-4c3002513a21" providerId="ADAL" clId="{238E5CC8-9B8A-406C-9BAE-8138369ADA9F}" dt="2023-02-10T21:30:35.059" v="1006" actId="1035"/>
+          <ac:spMkLst>
+            <pc:docMk/>
+            <pc:sldMk cId="3241601526" sldId="261"/>
+            <ac:spMk id="104" creationId="{8A4F6DF9-C937-42C1-3F6B-98D13B0D7225}"/>
+          </ac:spMkLst>
+        </pc:spChg>
+        <pc:spChg chg="mod">
+          <ac:chgData name="Robert Horton" userId="885a253a-1f89-43e3-bab8-4c3002513a21" providerId="ADAL" clId="{238E5CC8-9B8A-406C-9BAE-8138369ADA9F}" dt="2023-02-10T22:32:53.059" v="1123" actId="20577"/>
+          <ac:spMkLst>
+            <pc:docMk/>
+            <pc:sldMk cId="3241601526" sldId="261"/>
+            <ac:spMk id="105" creationId="{125983A9-5CCB-C88B-12C2-7D1BBBC78EBF}"/>
+          </ac:spMkLst>
+        </pc:spChg>
+        <pc:spChg chg="mod">
+          <ac:chgData name="Robert Horton" userId="885a253a-1f89-43e3-bab8-4c3002513a21" providerId="ADAL" clId="{238E5CC8-9B8A-406C-9BAE-8138369ADA9F}" dt="2023-02-10T21:29:44.246" v="990" actId="1037"/>
+          <ac:spMkLst>
+            <pc:docMk/>
+            <pc:sldMk cId="3241601526" sldId="261"/>
+            <ac:spMk id="109" creationId="{DFED97AE-D445-411C-5401-9D0BD11D1EF3}"/>
+          </ac:spMkLst>
+        </pc:spChg>
+        <pc:cxnChg chg="mod">
+          <ac:chgData name="Robert Horton" userId="885a253a-1f89-43e3-bab8-4c3002513a21" providerId="ADAL" clId="{238E5CC8-9B8A-406C-9BAE-8138369ADA9F}" dt="2023-02-10T21:32:14.242" v="1009" actId="12788"/>
+          <ac:cxnSpMkLst>
+            <pc:docMk/>
+            <pc:sldMk cId="3241601526" sldId="261"/>
+            <ac:cxnSpMk id="9" creationId="{32A9BC64-0B31-72F0-4FB8-373A6FD0E265}"/>
+          </ac:cxnSpMkLst>
+        </pc:cxnChg>
+        <pc:cxnChg chg="mod">
+          <ac:chgData name="Robert Horton" userId="885a253a-1f89-43e3-bab8-4c3002513a21" providerId="ADAL" clId="{238E5CC8-9B8A-406C-9BAE-8138369ADA9F}" dt="2023-02-10T21:32:14.242" v="1009" actId="12788"/>
+          <ac:cxnSpMkLst>
+            <pc:docMk/>
+            <pc:sldMk cId="3241601526" sldId="261"/>
+            <ac:cxnSpMk id="10" creationId="{2E975068-4584-07EC-8508-E7A6CF15D699}"/>
+          </ac:cxnSpMkLst>
+        </pc:cxnChg>
+        <pc:cxnChg chg="mod">
+          <ac:chgData name="Robert Horton" userId="885a253a-1f89-43e3-bab8-4c3002513a21" providerId="ADAL" clId="{238E5CC8-9B8A-406C-9BAE-8138369ADA9F}" dt="2023-02-10T21:32:14.242" v="1009" actId="12788"/>
+          <ac:cxnSpMkLst>
+            <pc:docMk/>
+            <pc:sldMk cId="3241601526" sldId="261"/>
+            <ac:cxnSpMk id="11" creationId="{59456F5B-620F-A858-C60E-273E3B1B6A0E}"/>
+          </ac:cxnSpMkLst>
+        </pc:cxnChg>
+        <pc:cxnChg chg="mod">
+          <ac:chgData name="Robert Horton" userId="885a253a-1f89-43e3-bab8-4c3002513a21" providerId="ADAL" clId="{238E5CC8-9B8A-406C-9BAE-8138369ADA9F}" dt="2023-02-10T21:32:14.242" v="1009" actId="12788"/>
+          <ac:cxnSpMkLst>
+            <pc:docMk/>
+            <pc:sldMk cId="3241601526" sldId="261"/>
+            <ac:cxnSpMk id="12" creationId="{733ECA5E-28CF-29F2-4A5F-3CC4B8E725CA}"/>
+          </ac:cxnSpMkLst>
+        </pc:cxnChg>
+        <pc:cxnChg chg="mod">
+          <ac:chgData name="Robert Horton" userId="885a253a-1f89-43e3-bab8-4c3002513a21" providerId="ADAL" clId="{238E5CC8-9B8A-406C-9BAE-8138369ADA9F}" dt="2023-02-10T21:28:17.130" v="842" actId="1076"/>
+          <ac:cxnSpMkLst>
+            <pc:docMk/>
+            <pc:sldMk cId="3241601526" sldId="261"/>
+            <ac:cxnSpMk id="13" creationId="{4A69FCD4-2B44-8B22-A3F9-688B631473F2}"/>
+          </ac:cxnSpMkLst>
+        </pc:cxnChg>
+        <pc:cxnChg chg="mod">
+          <ac:chgData name="Robert Horton" userId="885a253a-1f89-43e3-bab8-4c3002513a21" providerId="ADAL" clId="{238E5CC8-9B8A-406C-9BAE-8138369ADA9F}" dt="2023-02-10T21:32:14.242" v="1009" actId="12788"/>
+          <ac:cxnSpMkLst>
+            <pc:docMk/>
+            <pc:sldMk cId="3241601526" sldId="261"/>
+            <ac:cxnSpMk id="14" creationId="{36C827B2-CD4E-DBBF-9426-925F0EFB15FC}"/>
+          </ac:cxnSpMkLst>
+        </pc:cxnChg>
+        <pc:cxnChg chg="mod">
+          <ac:chgData name="Robert Horton" userId="885a253a-1f89-43e3-bab8-4c3002513a21" providerId="ADAL" clId="{238E5CC8-9B8A-406C-9BAE-8138369ADA9F}" dt="2023-02-10T21:32:14.242" v="1009" actId="12788"/>
+          <ac:cxnSpMkLst>
+            <pc:docMk/>
+            <pc:sldMk cId="3241601526" sldId="261"/>
+            <ac:cxnSpMk id="15" creationId="{49E9C397-2A44-C023-53EF-04E578C5946B}"/>
+          </ac:cxnSpMkLst>
+        </pc:cxnChg>
+        <pc:cxnChg chg="mod">
+          <ac:chgData name="Robert Horton" userId="885a253a-1f89-43e3-bab8-4c3002513a21" providerId="ADAL" clId="{238E5CC8-9B8A-406C-9BAE-8138369ADA9F}" dt="2023-02-10T21:32:14.242" v="1009" actId="12788"/>
+          <ac:cxnSpMkLst>
+            <pc:docMk/>
+            <pc:sldMk cId="3241601526" sldId="261"/>
+            <ac:cxnSpMk id="16" creationId="{6778C715-EF7E-AD6E-CD3E-CAD8D6BAF79D}"/>
+          </ac:cxnSpMkLst>
+        </pc:cxnChg>
+        <pc:cxnChg chg="del mod">
+          <ac:chgData name="Robert Horton" userId="885a253a-1f89-43e3-bab8-4c3002513a21" providerId="ADAL" clId="{238E5CC8-9B8A-406C-9BAE-8138369ADA9F}" dt="2023-02-10T21:27:17.827" v="817" actId="478"/>
+          <ac:cxnSpMkLst>
+            <pc:docMk/>
+            <pc:sldMk cId="3241601526" sldId="261"/>
+            <ac:cxnSpMk id="22" creationId="{CF41CEEC-8444-B47E-3789-4AFFB7E1B4D6}"/>
+          </ac:cxnSpMkLst>
+        </pc:cxnChg>
+        <pc:cxnChg chg="mod">
+          <ac:chgData name="Robert Horton" userId="885a253a-1f89-43e3-bab8-4c3002513a21" providerId="ADAL" clId="{238E5CC8-9B8A-406C-9BAE-8138369ADA9F}" dt="2023-02-10T21:32:33.957" v="1011" actId="14100"/>
+          <ac:cxnSpMkLst>
+            <pc:docMk/>
+            <pc:sldMk cId="3241601526" sldId="261"/>
+            <ac:cxnSpMk id="24" creationId="{2B3E895E-1C0A-9E82-9A03-2C98F256CE20}"/>
+          </ac:cxnSpMkLst>
+        </pc:cxnChg>
+        <pc:cxnChg chg="mod">
+          <ac:chgData name="Robert Horton" userId="885a253a-1f89-43e3-bab8-4c3002513a21" providerId="ADAL" clId="{238E5CC8-9B8A-406C-9BAE-8138369ADA9F}" dt="2023-02-10T21:32:14.242" v="1009" actId="12788"/>
+          <ac:cxnSpMkLst>
+            <pc:docMk/>
+            <pc:sldMk cId="3241601526" sldId="261"/>
+            <ac:cxnSpMk id="29" creationId="{67160EC5-A298-1067-141E-330F245FD62C}"/>
+          </ac:cxnSpMkLst>
+        </pc:cxnChg>
+        <pc:cxnChg chg="mod">
+          <ac:chgData name="Robert Horton" userId="885a253a-1f89-43e3-bab8-4c3002513a21" providerId="ADAL" clId="{238E5CC8-9B8A-406C-9BAE-8138369ADA9F}" dt="2023-02-10T21:32:14.242" v="1009" actId="12788"/>
+          <ac:cxnSpMkLst>
+            <pc:docMk/>
+            <pc:sldMk cId="3241601526" sldId="261"/>
+            <ac:cxnSpMk id="33" creationId="{FF82D7BB-97D1-8C08-501A-B6DD9242C184}"/>
+          </ac:cxnSpMkLst>
+        </pc:cxnChg>
+      </pc:sldChg>
     </pc:docChg>
   </pc:docChgLst>
 </pc:chgInfo>
+</file>
+
+<file path=ppt/notesMasters/notesMaster1.xml><?xml version="1.0" encoding="utf-8"?>
+<p:notesMaster xmlns:a="http://schemas.openxmlformats.org/drawingml/2006/main" xmlns:r="http://schemas.openxmlformats.org/officeDocument/2006/relationships" xmlns:p="http://schemas.openxmlformats.org/presentationml/2006/main">
+  <p:cSld>
+    <p:bg>
+      <p:bgRef idx="1001">
+        <a:schemeClr val="bg1"/>
+      </p:bgRef>
+    </p:bg>
+    <p:spTree>
+      <p:nvGrpSpPr>
+        <p:cNvPr id="1" name=""/>
+        <p:cNvGrpSpPr/>
+        <p:nvPr/>
+      </p:nvGrpSpPr>
+      <p:grpSpPr>
+        <a:xfrm>
+          <a:off x="0" y="0"/>
+          <a:ext cx="0" cy="0"/>
+          <a:chOff x="0" y="0"/>
+          <a:chExt cx="0" cy="0"/>
+        </a:xfrm>
+      </p:grpSpPr>
+      <p:sp>
+        <p:nvSpPr>
+          <p:cNvPr id="2" name="Header Placeholder 1"/>
+          <p:cNvSpPr>
+            <a:spLocks noGrp="1"/>
+          </p:cNvSpPr>
+          <p:nvPr>
+            <p:ph type="hdr" sz="quarter"/>
+          </p:nvPr>
+        </p:nvSpPr>
+        <p:spPr>
+          <a:xfrm>
+            <a:off x="0" y="0"/>
+            <a:ext cx="2971800" cy="458788"/>
+          </a:xfrm>
+          <a:prstGeom prst="rect">
+            <a:avLst/>
+          </a:prstGeom>
+        </p:spPr>
+        <p:txBody>
+          <a:bodyPr vert="horz" lIns="91440" tIns="45720" rIns="91440" bIns="45720" rtlCol="0"/>
+          <a:lstStyle>
+            <a:lvl1pPr algn="l">
+              <a:defRPr sz="1200"/>
+            </a:lvl1pPr>
+          </a:lstStyle>
+          <a:p>
+            <a:endParaRPr lang="en-US"/>
+          </a:p>
+        </p:txBody>
+      </p:sp>
+      <p:sp>
+        <p:nvSpPr>
+          <p:cNvPr id="3" name="Date Placeholder 2"/>
+          <p:cNvSpPr>
+            <a:spLocks noGrp="1"/>
+          </p:cNvSpPr>
+          <p:nvPr>
+            <p:ph type="dt" idx="1"/>
+          </p:nvPr>
+        </p:nvSpPr>
+        <p:spPr>
+          <a:xfrm>
+            <a:off x="3884613" y="0"/>
+            <a:ext cx="2971800" cy="458788"/>
+          </a:xfrm>
+          <a:prstGeom prst="rect">
+            <a:avLst/>
+          </a:prstGeom>
+        </p:spPr>
+        <p:txBody>
+          <a:bodyPr vert="horz" lIns="91440" tIns="45720" rIns="91440" bIns="45720" rtlCol="0"/>
+          <a:lstStyle>
+            <a:lvl1pPr algn="r">
+              <a:defRPr sz="1200"/>
+            </a:lvl1pPr>
+          </a:lstStyle>
+          <a:p>
+            <a:fld id="{8A653DC7-8F31-4879-9597-406DCF12C16F}" type="datetimeFigureOut">
+              <a:rPr lang="en-US" smtClean="0"/>
+              <a:t>2/10/2023</a:t>
+            </a:fld>
+            <a:endParaRPr lang="en-US"/>
+          </a:p>
+        </p:txBody>
+      </p:sp>
+      <p:sp>
+        <p:nvSpPr>
+          <p:cNvPr id="4" name="Slide Image Placeholder 3"/>
+          <p:cNvSpPr>
+            <a:spLocks noGrp="1" noRot="1" noChangeAspect="1"/>
+          </p:cNvSpPr>
+          <p:nvPr>
+            <p:ph type="sldImg" idx="2"/>
+          </p:nvPr>
+        </p:nvSpPr>
+        <p:spPr>
+          <a:xfrm>
+            <a:off x="685800" y="1143000"/>
+            <a:ext cx="5486400" cy="3086100"/>
+          </a:xfrm>
+          <a:prstGeom prst="rect">
+            <a:avLst/>
+          </a:prstGeom>
+          <a:noFill/>
+          <a:ln w="12700">
+            <a:solidFill>
+              <a:prstClr val="black"/>
+            </a:solidFill>
+          </a:ln>
+        </p:spPr>
+        <p:txBody>
+          <a:bodyPr vert="horz" lIns="91440" tIns="45720" rIns="91440" bIns="45720" rtlCol="0" anchor="ctr"/>
+          <a:lstStyle/>
+          <a:p>
+            <a:endParaRPr lang="en-US"/>
+          </a:p>
+        </p:txBody>
+      </p:sp>
+      <p:sp>
+        <p:nvSpPr>
+          <p:cNvPr id="5" name="Notes Placeholder 4"/>
+          <p:cNvSpPr>
+            <a:spLocks noGrp="1"/>
+          </p:cNvSpPr>
+          <p:nvPr>
+            <p:ph type="body" sz="quarter" idx="3"/>
+          </p:nvPr>
+        </p:nvSpPr>
+        <p:spPr>
+          <a:xfrm>
+            <a:off x="685800" y="4400550"/>
+            <a:ext cx="5486400" cy="3600450"/>
+          </a:xfrm>
+          <a:prstGeom prst="rect">
+            <a:avLst/>
+          </a:prstGeom>
+        </p:spPr>
+        <p:txBody>
+          <a:bodyPr vert="horz" lIns="91440" tIns="45720" rIns="91440" bIns="45720" rtlCol="0"/>
+          <a:lstStyle/>
+          <a:p>
+            <a:pPr lvl="0"/>
+            <a:r>
+              <a:rPr lang="en-US"/>
+              <a:t>Click to edit Master text styles</a:t>
+            </a:r>
+          </a:p>
+          <a:p>
+            <a:pPr lvl="1"/>
+            <a:r>
+              <a:rPr lang="en-US"/>
+              <a:t>Second level</a:t>
+            </a:r>
+          </a:p>
+          <a:p>
+            <a:pPr lvl="2"/>
+            <a:r>
+              <a:rPr lang="en-US"/>
+              <a:t>Third level</a:t>
+            </a:r>
+          </a:p>
+          <a:p>
+            <a:pPr lvl="3"/>
+            <a:r>
+              <a:rPr lang="en-US"/>
+              <a:t>Fourth level</a:t>
+            </a:r>
+          </a:p>
+          <a:p>
+            <a:pPr lvl="4"/>
+            <a:r>
+              <a:rPr lang="en-US"/>
+              <a:t>Fifth level</a:t>
+            </a:r>
+          </a:p>
+        </p:txBody>
+      </p:sp>
+      <p:sp>
+        <p:nvSpPr>
+          <p:cNvPr id="6" name="Footer Placeholder 5"/>
+          <p:cNvSpPr>
+            <a:spLocks noGrp="1"/>
+          </p:cNvSpPr>
+          <p:nvPr>
+            <p:ph type="ftr" sz="quarter" idx="4"/>
+          </p:nvPr>
+        </p:nvSpPr>
+        <p:spPr>
+          <a:xfrm>
+            <a:off x="0" y="8685213"/>
+            <a:ext cx="2971800" cy="458787"/>
+          </a:xfrm>
+          <a:prstGeom prst="rect">
+            <a:avLst/>
+          </a:prstGeom>
+        </p:spPr>
+        <p:txBody>
+          <a:bodyPr vert="horz" lIns="91440" tIns="45720" rIns="91440" bIns="45720" rtlCol="0" anchor="b"/>
+          <a:lstStyle>
+            <a:lvl1pPr algn="l">
+              <a:defRPr sz="1200"/>
+            </a:lvl1pPr>
+          </a:lstStyle>
+          <a:p>
+            <a:endParaRPr lang="en-US"/>
+          </a:p>
+        </p:txBody>
+      </p:sp>
+      <p:sp>
+        <p:nvSpPr>
+          <p:cNvPr id="7" name="Slide Number Placeholder 6"/>
+          <p:cNvSpPr>
+            <a:spLocks noGrp="1"/>
+          </p:cNvSpPr>
+          <p:nvPr>
+            <p:ph type="sldNum" sz="quarter" idx="5"/>
+          </p:nvPr>
+        </p:nvSpPr>
+        <p:spPr>
+          <a:xfrm>
+            <a:off x="3884613" y="8685213"/>
+            <a:ext cx="2971800" cy="458787"/>
+          </a:xfrm>
+          <a:prstGeom prst="rect">
+            <a:avLst/>
+          </a:prstGeom>
+        </p:spPr>
+        <p:txBody>
+          <a:bodyPr vert="horz" lIns="91440" tIns="45720" rIns="91440" bIns="45720" rtlCol="0" anchor="b"/>
+          <a:lstStyle>
+            <a:lvl1pPr algn="r">
+              <a:defRPr sz="1200"/>
+            </a:lvl1pPr>
+          </a:lstStyle>
+          <a:p>
+            <a:fld id="{08A364E6-BC94-4878-8AB8-68142CE8C22A}" type="slidenum">
+              <a:rPr lang="en-US" smtClean="0"/>
+              <a:t>‹#›</a:t>
+            </a:fld>
+            <a:endParaRPr lang="en-US"/>
+          </a:p>
+        </p:txBody>
+      </p:sp>
+    </p:spTree>
+    <p:extLst>
+      <p:ext uri="{BB962C8B-B14F-4D97-AF65-F5344CB8AC3E}">
+        <p14:creationId xmlns:p14="http://schemas.microsoft.com/office/powerpoint/2010/main" val="3477435973"/>
+      </p:ext>
+    </p:extLst>
+  </p:cSld>
+  <p:clrMap bg1="lt1" tx1="dk1" bg2="lt2" tx2="dk2" accent1="accent1" accent2="accent2" accent3="accent3" accent4="accent4" accent5="accent5" accent6="accent6" hlink="hlink" folHlink="folHlink"/>
+  <p:notesStyle>
+    <a:lvl1pPr marL="0" algn="l" defTabSz="914400" rtl="0" eaLnBrk="1" latinLnBrk="0" hangingPunct="1">
+      <a:defRPr sz="1200" kern="1200">
+        <a:solidFill>
+          <a:schemeClr val="tx1"/>
+        </a:solidFill>
+        <a:latin typeface="+mn-lt"/>
+        <a:ea typeface="+mn-ea"/>
+        <a:cs typeface="+mn-cs"/>
+      </a:defRPr>
+    </a:lvl1pPr>
+    <a:lvl2pPr marL="457200" algn="l" defTabSz="914400" rtl="0" eaLnBrk="1" latinLnBrk="0" hangingPunct="1">
+      <a:defRPr sz="1200" kern="1200">
+        <a:solidFill>
+          <a:schemeClr val="tx1"/>
+        </a:solidFill>
+        <a:latin typeface="+mn-lt"/>
+        <a:ea typeface="+mn-ea"/>
+        <a:cs typeface="+mn-cs"/>
+      </a:defRPr>
+    </a:lvl2pPr>
+    <a:lvl3pPr marL="914400" algn="l" defTabSz="914400" rtl="0" eaLnBrk="1" latinLnBrk="0" hangingPunct="1">
+      <a:defRPr sz="1200" kern="1200">
+        <a:solidFill>
+          <a:schemeClr val="tx1"/>
+        </a:solidFill>
+        <a:latin typeface="+mn-lt"/>
+        <a:ea typeface="+mn-ea"/>
+        <a:cs typeface="+mn-cs"/>
+      </a:defRPr>
+    </a:lvl3pPr>
+    <a:lvl4pPr marL="1371600" algn="l" defTabSz="914400" rtl="0" eaLnBrk="1" latinLnBrk="0" hangingPunct="1">
+      <a:defRPr sz="1200" kern="1200">
+        <a:solidFill>
+          <a:schemeClr val="tx1"/>
+        </a:solidFill>
+        <a:latin typeface="+mn-lt"/>
+        <a:ea typeface="+mn-ea"/>
+        <a:cs typeface="+mn-cs"/>
+      </a:defRPr>
+    </a:lvl4pPr>
+    <a:lvl5pPr marL="1828800" algn="l" defTabSz="914400" rtl="0" eaLnBrk="1" latinLnBrk="0" hangingPunct="1">
+      <a:defRPr sz="1200" kern="1200">
+        <a:solidFill>
+          <a:schemeClr val="tx1"/>
+        </a:solidFill>
+        <a:latin typeface="+mn-lt"/>
+        <a:ea typeface="+mn-ea"/>
+        <a:cs typeface="+mn-cs"/>
+      </a:defRPr>
+    </a:lvl5pPr>
+    <a:lvl6pPr marL="2286000" algn="l" defTabSz="914400" rtl="0" eaLnBrk="1" latinLnBrk="0" hangingPunct="1">
+      <a:defRPr sz="1200" kern="1200">
+        <a:solidFill>
+          <a:schemeClr val="tx1"/>
+        </a:solidFill>
+        <a:latin typeface="+mn-lt"/>
+        <a:ea typeface="+mn-ea"/>
+        <a:cs typeface="+mn-cs"/>
+      </a:defRPr>
+    </a:lvl6pPr>
+    <a:lvl7pPr marL="2743200" algn="l" defTabSz="914400" rtl="0" eaLnBrk="1" latinLnBrk="0" hangingPunct="1">
+      <a:defRPr sz="1200" kern="1200">
+        <a:solidFill>
+          <a:schemeClr val="tx1"/>
+        </a:solidFill>
+        <a:latin typeface="+mn-lt"/>
+        <a:ea typeface="+mn-ea"/>
+        <a:cs typeface="+mn-cs"/>
+      </a:defRPr>
+    </a:lvl7pPr>
+    <a:lvl8pPr marL="3200400" algn="l" defTabSz="914400" rtl="0" eaLnBrk="1" latinLnBrk="0" hangingPunct="1">
+      <a:defRPr sz="1200" kern="1200">
+        <a:solidFill>
+          <a:schemeClr val="tx1"/>
+        </a:solidFill>
+        <a:latin typeface="+mn-lt"/>
+        <a:ea typeface="+mn-ea"/>
+        <a:cs typeface="+mn-cs"/>
+      </a:defRPr>
+    </a:lvl8pPr>
+    <a:lvl9pPr marL="3657600" algn="l" defTabSz="914400" rtl="0" eaLnBrk="1" latinLnBrk="0" hangingPunct="1">
+      <a:defRPr sz="1200" kern="1200">
+        <a:solidFill>
+          <a:schemeClr val="tx1"/>
+        </a:solidFill>
+        <a:latin typeface="+mn-lt"/>
+        <a:ea typeface="+mn-ea"/>
+        <a:cs typeface="+mn-cs"/>
+      </a:defRPr>
+    </a:lvl9pPr>
+  </p:notesStyle>
+</p:notesMaster>
+</file>
+
+<file path=ppt/notesSlides/notesSlide1.xml><?xml version="1.0" encoding="utf-8"?>
+<p:notes xmlns:a="http://schemas.openxmlformats.org/drawingml/2006/main" xmlns:r="http://schemas.openxmlformats.org/officeDocument/2006/relationships" xmlns:p="http://schemas.openxmlformats.org/presentationml/2006/main">
+  <p:cSld>
+    <p:spTree>
+      <p:nvGrpSpPr>
+        <p:cNvPr id="1" name=""/>
+        <p:cNvGrpSpPr/>
+        <p:nvPr/>
+      </p:nvGrpSpPr>
+      <p:grpSpPr>
+        <a:xfrm>
+          <a:off x="0" y="0"/>
+          <a:ext cx="0" cy="0"/>
+          <a:chOff x="0" y="0"/>
+          <a:chExt cx="0" cy="0"/>
+        </a:xfrm>
+      </p:grpSpPr>
+      <p:sp>
+        <p:nvSpPr>
+          <p:cNvPr id="2" name="Slide Image Placeholder 1"/>
+          <p:cNvSpPr>
+            <a:spLocks noGrp="1" noRot="1" noChangeAspect="1"/>
+          </p:cNvSpPr>
+          <p:nvPr>
+            <p:ph type="sldImg"/>
+          </p:nvPr>
+        </p:nvSpPr>
+        <p:spPr/>
+      </p:sp>
+      <p:sp>
+        <p:nvSpPr>
+          <p:cNvPr id="3" name="Notes Placeholder 2"/>
+          <p:cNvSpPr>
+            <a:spLocks noGrp="1"/>
+          </p:cNvSpPr>
+          <p:nvPr>
+            <p:ph type="body" idx="1"/>
+          </p:nvPr>
+        </p:nvSpPr>
+        <p:spPr/>
+        <p:txBody>
+          <a:bodyPr/>
+          <a:lstStyle/>
+          <a:p>
+            <a:r>
+              <a:rPr lang="en-US" dirty="0"/>
+              <a:t>This version has no toxicity, only desensitization.</a:t>
+            </a:r>
+          </a:p>
+        </p:txBody>
+      </p:sp>
+      <p:sp>
+        <p:nvSpPr>
+          <p:cNvPr id="4" name="Slide Number Placeholder 3"/>
+          <p:cNvSpPr>
+            <a:spLocks noGrp="1"/>
+          </p:cNvSpPr>
+          <p:nvPr>
+            <p:ph type="sldNum" sz="quarter" idx="5"/>
+          </p:nvPr>
+        </p:nvSpPr>
+        <p:spPr/>
+        <p:txBody>
+          <a:bodyPr/>
+          <a:lstStyle/>
+          <a:p>
+            <a:fld id="{08A364E6-BC94-4878-8AB8-68142CE8C22A}" type="slidenum">
+              <a:rPr lang="en-US" smtClean="0"/>
+              <a:t>4</a:t>
+            </a:fld>
+            <a:endParaRPr lang="en-US"/>
+          </a:p>
+        </p:txBody>
+      </p:sp>
+    </p:spTree>
+    <p:extLst>
+      <p:ext uri="{BB962C8B-B14F-4D97-AF65-F5344CB8AC3E}">
+        <p14:creationId xmlns:p14="http://schemas.microsoft.com/office/powerpoint/2010/main" val="116599871"/>
+      </p:ext>
+    </p:extLst>
+  </p:cSld>
+  <p:clrMapOvr>
+    <a:masterClrMapping/>
+  </p:clrMapOvr>
+</p:notes>
 </file>
 
 <file path=ppt/slideLayouts/slideLayout1.xml><?xml version="1.0" encoding="utf-8"?>
@@ -632,7 +1615,7 @@
           <a:p>
             <a:fld id="{2BB6ABEF-F1DB-4B8D-A25F-41EB34AEF958}" type="datetimeFigureOut">
               <a:rPr lang="en-US" smtClean="0"/>
-              <a:t>2/8/2023</a:t>
+              <a:t>2/10/2023</a:t>
             </a:fld>
             <a:endParaRPr lang="en-US"/>
           </a:p>
@@ -830,7 +1813,7 @@
           <a:p>
             <a:fld id="{2BB6ABEF-F1DB-4B8D-A25F-41EB34AEF958}" type="datetimeFigureOut">
               <a:rPr lang="en-US" smtClean="0"/>
-              <a:t>2/8/2023</a:t>
+              <a:t>2/10/2023</a:t>
             </a:fld>
             <a:endParaRPr lang="en-US"/>
           </a:p>
@@ -1038,7 +2021,7 @@
           <a:p>
             <a:fld id="{2BB6ABEF-F1DB-4B8D-A25F-41EB34AEF958}" type="datetimeFigureOut">
               <a:rPr lang="en-US" smtClean="0"/>
-              <a:t>2/8/2023</a:t>
+              <a:t>2/10/2023</a:t>
             </a:fld>
             <a:endParaRPr lang="en-US"/>
           </a:p>
@@ -1236,7 +2219,7 @@
           <a:p>
             <a:fld id="{2BB6ABEF-F1DB-4B8D-A25F-41EB34AEF958}" type="datetimeFigureOut">
               <a:rPr lang="en-US" smtClean="0"/>
-              <a:t>2/8/2023</a:t>
+              <a:t>2/10/2023</a:t>
             </a:fld>
             <a:endParaRPr lang="en-US"/>
           </a:p>
@@ -1511,7 +2494,7 @@
           <a:p>
             <a:fld id="{2BB6ABEF-F1DB-4B8D-A25F-41EB34AEF958}" type="datetimeFigureOut">
               <a:rPr lang="en-US" smtClean="0"/>
-              <a:t>2/8/2023</a:t>
+              <a:t>2/10/2023</a:t>
             </a:fld>
             <a:endParaRPr lang="en-US"/>
           </a:p>
@@ -1776,7 +2759,7 @@
           <a:p>
             <a:fld id="{2BB6ABEF-F1DB-4B8D-A25F-41EB34AEF958}" type="datetimeFigureOut">
               <a:rPr lang="en-US" smtClean="0"/>
-              <a:t>2/8/2023</a:t>
+              <a:t>2/10/2023</a:t>
             </a:fld>
             <a:endParaRPr lang="en-US"/>
           </a:p>
@@ -2188,7 +3171,7 @@
           <a:p>
             <a:fld id="{2BB6ABEF-F1DB-4B8D-A25F-41EB34AEF958}" type="datetimeFigureOut">
               <a:rPr lang="en-US" smtClean="0"/>
-              <a:t>2/8/2023</a:t>
+              <a:t>2/10/2023</a:t>
             </a:fld>
             <a:endParaRPr lang="en-US"/>
           </a:p>
@@ -2329,7 +3312,7 @@
           <a:p>
             <a:fld id="{2BB6ABEF-F1DB-4B8D-A25F-41EB34AEF958}" type="datetimeFigureOut">
               <a:rPr lang="en-US" smtClean="0"/>
-              <a:t>2/8/2023</a:t>
+              <a:t>2/10/2023</a:t>
             </a:fld>
             <a:endParaRPr lang="en-US"/>
           </a:p>
@@ -2442,7 +3425,7 @@
           <a:p>
             <a:fld id="{2BB6ABEF-F1DB-4B8D-A25F-41EB34AEF958}" type="datetimeFigureOut">
               <a:rPr lang="en-US" smtClean="0"/>
-              <a:t>2/8/2023</a:t>
+              <a:t>2/10/2023</a:t>
             </a:fld>
             <a:endParaRPr lang="en-US"/>
           </a:p>
@@ -2753,7 +3736,7 @@
           <a:p>
             <a:fld id="{2BB6ABEF-F1DB-4B8D-A25F-41EB34AEF958}" type="datetimeFigureOut">
               <a:rPr lang="en-US" smtClean="0"/>
-              <a:t>2/8/2023</a:t>
+              <a:t>2/10/2023</a:t>
             </a:fld>
             <a:endParaRPr lang="en-US"/>
           </a:p>
@@ -3041,7 +4024,7 @@
           <a:p>
             <a:fld id="{2BB6ABEF-F1DB-4B8D-A25F-41EB34AEF958}" type="datetimeFigureOut">
               <a:rPr lang="en-US" smtClean="0"/>
-              <a:t>2/8/2023</a:t>
+              <a:t>2/10/2023</a:t>
             </a:fld>
             <a:endParaRPr lang="en-US"/>
           </a:p>
@@ -3282,7 +4265,7 @@
           <a:p>
             <a:fld id="{2BB6ABEF-F1DB-4B8D-A25F-41EB34AEF958}" type="datetimeFigureOut">
               <a:rPr lang="en-US" smtClean="0"/>
-              <a:t>2/8/2023</a:t>
+              <a:t>2/10/2023</a:t>
             </a:fld>
             <a:endParaRPr lang="en-US"/>
           </a:p>
@@ -3871,62 +4854,6 @@
       </p:sp>
       <p:sp>
         <p:nvSpPr>
-          <p:cNvPr id="4" name="Oval 3">
-            <a:extLst>
-              <a:ext uri="{FF2B5EF4-FFF2-40B4-BE49-F238E27FC236}">
-                <a16:creationId xmlns:a16="http://schemas.microsoft.com/office/drawing/2014/main" id="{53A84C64-E677-3BE2-9483-3F8A5501E2D0}"/>
-              </a:ext>
-            </a:extLst>
-          </p:cNvPr>
-          <p:cNvSpPr/>
-          <p:nvPr/>
-        </p:nvSpPr>
-        <p:spPr>
-          <a:xfrm>
-            <a:off x="4337423" y="3781133"/>
-            <a:ext cx="927445" cy="605258"/>
-          </a:xfrm>
-          <a:prstGeom prst="ellipse">
-            <a:avLst/>
-          </a:prstGeom>
-          <a:solidFill>
-            <a:srgbClr val="FFFF00"/>
-          </a:solidFill>
-        </p:spPr>
-        <p:style>
-          <a:lnRef idx="2">
-            <a:schemeClr val="accent1">
-              <a:shade val="50000"/>
-            </a:schemeClr>
-          </a:lnRef>
-          <a:fillRef idx="1">
-            <a:schemeClr val="accent1"/>
-          </a:fillRef>
-          <a:effectRef idx="0">
-            <a:schemeClr val="accent1"/>
-          </a:effectRef>
-          <a:fontRef idx="minor">
-            <a:schemeClr val="lt1"/>
-          </a:fontRef>
-        </p:style>
-        <p:txBody>
-          <a:bodyPr rtlCol="0" anchor="ctr"/>
-          <a:lstStyle/>
-          <a:p>
-            <a:pPr algn="ctr"/>
-            <a:r>
-              <a:rPr lang="en-US" dirty="0">
-                <a:solidFill>
-                  <a:schemeClr val="tx1"/>
-                </a:solidFill>
-              </a:rPr>
-              <a:t>drug</a:t>
-            </a:r>
-          </a:p>
-        </p:txBody>
-      </p:sp>
-      <p:sp>
-        <p:nvSpPr>
           <p:cNvPr id="5" name="Oval 4">
             <a:extLst>
               <a:ext uri="{FF2B5EF4-FFF2-40B4-BE49-F238E27FC236}">
@@ -4202,16 +5129,19 @@
           </p:cNvPr>
           <p:cNvCxnSpPr>
             <a:cxnSpLocks/>
+            <a:endCxn id="2" idx="2"/>
           </p:cNvCxnSpPr>
           <p:nvPr/>
         </p:nvCxnSpPr>
         <p:spPr>
           <a:xfrm rot="5400000" flipH="1" flipV="1">
-            <a:off x="3778406" y="4449178"/>
-            <a:ext cx="923735" cy="192905"/>
-          </a:xfrm>
-          <a:prstGeom prst="curvedConnector2">
-            <a:avLst/>
+            <a:off x="4122672" y="4407538"/>
+            <a:ext cx="621108" cy="578814"/>
+          </a:xfrm>
+          <a:prstGeom prst="curvedConnector3">
+            <a:avLst>
+              <a:gd name="adj1" fmla="val 50000"/>
+            </a:avLst>
           </a:prstGeom>
           <a:ln w="38100">
             <a:solidFill>
@@ -4246,18 +5176,17 @@
           </p:cNvPr>
           <p:cNvCxnSpPr>
             <a:cxnSpLocks/>
+            <a:stCxn id="2" idx="0"/>
           </p:cNvCxnSpPr>
           <p:nvPr/>
         </p:nvCxnSpPr>
         <p:spPr>
           <a:xfrm rot="16200000" flipV="1">
-            <a:off x="3641825" y="2622506"/>
-            <a:ext cx="1122461" cy="1194791"/>
-          </a:xfrm>
-          <a:prstGeom prst="curvedConnector3">
-            <a:avLst>
-              <a:gd name="adj1" fmla="val 50000"/>
-            </a:avLst>
+            <a:off x="3614260" y="2650074"/>
+            <a:ext cx="1099776" cy="1116971"/>
+          </a:xfrm>
+          <a:prstGeom prst="curvedConnector2">
+            <a:avLst/>
           </a:prstGeom>
           <a:ln w="38100">
             <a:solidFill>
@@ -4292,14 +5221,15 @@
           </p:cNvPr>
           <p:cNvCxnSpPr>
             <a:cxnSpLocks/>
+            <a:stCxn id="2" idx="3"/>
             <a:endCxn id="23" idx="0"/>
           </p:cNvCxnSpPr>
           <p:nvPr/>
         </p:nvCxnSpPr>
         <p:spPr>
           <a:xfrm>
-            <a:off x="5263746" y="4083726"/>
-            <a:ext cx="663241" cy="504225"/>
+            <a:off x="5244269" y="4072420"/>
+            <a:ext cx="682718" cy="515531"/>
           </a:xfrm>
           <a:prstGeom prst="curvedConnector2">
             <a:avLst/>
@@ -5123,7 +6053,7 @@
         </p:nvSpPr>
         <p:spPr>
           <a:xfrm rot="16581177">
-            <a:off x="3478080" y="4231136"/>
+            <a:off x="3145573" y="4231137"/>
             <a:ext cx="1109995" cy="369332"/>
           </a:xfrm>
           <a:prstGeom prst="rect">
@@ -5175,6 +6105,65 @@
             <a:r>
               <a:rPr lang="en-US" dirty="0"/>
               <a:t>accumulation</a:t>
+            </a:r>
+          </a:p>
+        </p:txBody>
+      </p:sp>
+      <p:sp>
+        <p:nvSpPr>
+          <p:cNvPr id="2" name="Rectangle 1">
+            <a:extLst>
+              <a:ext uri="{FF2B5EF4-FFF2-40B4-BE49-F238E27FC236}">
+                <a16:creationId xmlns:a16="http://schemas.microsoft.com/office/drawing/2014/main" id="{53D412E8-D39A-D47C-9D86-C709D9A87BAC}"/>
+              </a:ext>
+            </a:extLst>
+          </p:cNvPr>
+          <p:cNvSpPr/>
+          <p:nvPr/>
+        </p:nvSpPr>
+        <p:spPr>
+          <a:xfrm>
+            <a:off x="4200996" y="3758448"/>
+            <a:ext cx="1043273" cy="627943"/>
+          </a:xfrm>
+          <a:prstGeom prst="rect">
+            <a:avLst/>
+          </a:prstGeom>
+          <a:solidFill>
+            <a:schemeClr val="accent6">
+              <a:lumMod val="20000"/>
+              <a:lumOff val="80000"/>
+            </a:schemeClr>
+          </a:solidFill>
+        </p:spPr>
+        <p:style>
+          <a:lnRef idx="2">
+            <a:schemeClr val="accent1">
+              <a:shade val="50000"/>
+            </a:schemeClr>
+          </a:lnRef>
+          <a:fillRef idx="1">
+            <a:schemeClr val="accent1"/>
+          </a:fillRef>
+          <a:effectRef idx="0">
+            <a:schemeClr val="accent1"/>
+          </a:effectRef>
+          <a:fontRef idx="minor">
+            <a:schemeClr val="lt1"/>
+          </a:fontRef>
+        </p:style>
+        <p:txBody>
+          <a:bodyPr rtlCol="0" anchor="ctr"/>
+          <a:lstStyle/>
+          <a:p>
+            <a:pPr algn="ctr"/>
+            <a:r>
+              <a:rPr lang="en-US" dirty="0">
+                <a:solidFill>
+                  <a:schemeClr val="tx1"/>
+                </a:solidFill>
+              </a:rPr>
+              <a:t>drug</a:t>
             </a:r>
           </a:p>
         </p:txBody>
@@ -5183,6 +6172,3064 @@
     <p:extLst>
       <p:ext uri="{BB962C8B-B14F-4D97-AF65-F5344CB8AC3E}">
         <p14:creationId xmlns:p14="http://schemas.microsoft.com/office/powerpoint/2010/main" val="3939775279"/>
+      </p:ext>
+    </p:extLst>
+  </p:cSld>
+  <p:clrMapOvr>
+    <a:masterClrMapping/>
+  </p:clrMapOvr>
+</p:sld>
+</file>
+
+<file path=ppt/slides/slide3.xml><?xml version="1.0" encoding="utf-8"?>
+<p:sld xmlns:a="http://schemas.openxmlformats.org/drawingml/2006/main" xmlns:r="http://schemas.openxmlformats.org/officeDocument/2006/relationships" xmlns:p="http://schemas.openxmlformats.org/presentationml/2006/main">
+  <p:cSld>
+    <p:spTree>
+      <p:nvGrpSpPr>
+        <p:cNvPr id="1" name=""/>
+        <p:cNvGrpSpPr/>
+        <p:nvPr/>
+      </p:nvGrpSpPr>
+      <p:grpSpPr>
+        <a:xfrm>
+          <a:off x="0" y="0"/>
+          <a:ext cx="0" cy="0"/>
+          <a:chOff x="0" y="0"/>
+          <a:chExt cx="0" cy="0"/>
+        </a:xfrm>
+      </p:grpSpPr>
+      <p:cxnSp>
+        <p:nvCxnSpPr>
+          <p:cNvPr id="62" name="Straight Connector 61">
+            <a:extLst>
+              <a:ext uri="{FF2B5EF4-FFF2-40B4-BE49-F238E27FC236}">
+                <a16:creationId xmlns:a16="http://schemas.microsoft.com/office/drawing/2014/main" id="{2115033C-3D06-AD2D-50FB-D82CB92905C5}"/>
+              </a:ext>
+            </a:extLst>
+          </p:cNvPr>
+          <p:cNvCxnSpPr>
+            <a:cxnSpLocks/>
+          </p:cNvCxnSpPr>
+          <p:nvPr/>
+        </p:nvCxnSpPr>
+        <p:spPr>
+          <a:xfrm>
+            <a:off x="4747032" y="264695"/>
+            <a:ext cx="0" cy="6497052"/>
+          </a:xfrm>
+          <a:prstGeom prst="line">
+            <a:avLst/>
+          </a:prstGeom>
+          <a:ln w="127000">
+            <a:solidFill>
+              <a:schemeClr val="accent5">
+                <a:lumMod val="60000"/>
+                <a:lumOff val="40000"/>
+              </a:schemeClr>
+            </a:solidFill>
+            <a:prstDash val="solid"/>
+          </a:ln>
+        </p:spPr>
+        <p:style>
+          <a:lnRef idx="1">
+            <a:schemeClr val="accent1"/>
+          </a:lnRef>
+          <a:fillRef idx="0">
+            <a:schemeClr val="accent1"/>
+          </a:fillRef>
+          <a:effectRef idx="0">
+            <a:schemeClr val="accent1"/>
+          </a:effectRef>
+          <a:fontRef idx="minor">
+            <a:schemeClr val="tx1"/>
+          </a:fontRef>
+        </p:style>
+      </p:cxnSp>
+      <p:sp>
+        <p:nvSpPr>
+          <p:cNvPr id="3" name="Oval 2">
+            <a:extLst>
+              <a:ext uri="{FF2B5EF4-FFF2-40B4-BE49-F238E27FC236}">
+                <a16:creationId xmlns:a16="http://schemas.microsoft.com/office/drawing/2014/main" id="{A57852EE-101C-7687-CEC3-9C14B3A866A7}"/>
+              </a:ext>
+            </a:extLst>
+          </p:cNvPr>
+          <p:cNvSpPr/>
+          <p:nvPr/>
+        </p:nvSpPr>
+        <p:spPr>
+          <a:xfrm>
+            <a:off x="6998009" y="523472"/>
+            <a:ext cx="1536149" cy="626681"/>
+          </a:xfrm>
+          <a:prstGeom prst="ellipse">
+            <a:avLst/>
+          </a:prstGeom>
+          <a:solidFill>
+            <a:srgbClr val="FFFF00"/>
+          </a:solidFill>
+        </p:spPr>
+        <p:style>
+          <a:lnRef idx="2">
+            <a:schemeClr val="accent1">
+              <a:shade val="50000"/>
+            </a:schemeClr>
+          </a:lnRef>
+          <a:fillRef idx="1">
+            <a:schemeClr val="accent1"/>
+          </a:fillRef>
+          <a:effectRef idx="0">
+            <a:schemeClr val="accent1"/>
+          </a:effectRef>
+          <a:fontRef idx="minor">
+            <a:schemeClr val="lt1"/>
+          </a:fontRef>
+        </p:style>
+        <p:txBody>
+          <a:bodyPr rtlCol="0" anchor="ctr"/>
+          <a:lstStyle/>
+          <a:p>
+            <a:pPr algn="ctr"/>
+            <a:r>
+              <a:rPr lang="en-US" dirty="0">
+                <a:solidFill>
+                  <a:schemeClr val="tx1"/>
+                </a:solidFill>
+              </a:rPr>
+              <a:t>infection</a:t>
+            </a:r>
+          </a:p>
+        </p:txBody>
+      </p:sp>
+      <p:sp>
+        <p:nvSpPr>
+          <p:cNvPr id="5" name="Oval 4">
+            <a:extLst>
+              <a:ext uri="{FF2B5EF4-FFF2-40B4-BE49-F238E27FC236}">
+                <a16:creationId xmlns:a16="http://schemas.microsoft.com/office/drawing/2014/main" id="{3D0AD825-B406-118F-F745-7B9BC3378854}"/>
+              </a:ext>
+            </a:extLst>
+          </p:cNvPr>
+          <p:cNvSpPr/>
+          <p:nvPr/>
+        </p:nvSpPr>
+        <p:spPr>
+          <a:xfrm>
+            <a:off x="6937165" y="1503029"/>
+            <a:ext cx="1640654" cy="590437"/>
+          </a:xfrm>
+          <a:prstGeom prst="ellipse">
+            <a:avLst/>
+          </a:prstGeom>
+          <a:solidFill>
+            <a:srgbClr val="FFFF00"/>
+          </a:solidFill>
+        </p:spPr>
+        <p:style>
+          <a:lnRef idx="2">
+            <a:schemeClr val="accent1">
+              <a:shade val="50000"/>
+            </a:schemeClr>
+          </a:lnRef>
+          <a:fillRef idx="1">
+            <a:schemeClr val="accent1"/>
+          </a:fillRef>
+          <a:effectRef idx="0">
+            <a:schemeClr val="accent1"/>
+          </a:effectRef>
+          <a:fontRef idx="minor">
+            <a:schemeClr val="lt1"/>
+          </a:fontRef>
+        </p:style>
+        <p:txBody>
+          <a:bodyPr rtlCol="0" anchor="ctr"/>
+          <a:lstStyle/>
+          <a:p>
+            <a:pPr algn="ctr"/>
+            <a:r>
+              <a:rPr lang="en-US" dirty="0" err="1">
+                <a:solidFill>
+                  <a:schemeClr val="tx1"/>
+                </a:solidFill>
+              </a:rPr>
+              <a:t>cum_drug</a:t>
+            </a:r>
+            <a:endParaRPr lang="en-US" dirty="0">
+              <a:solidFill>
+                <a:schemeClr val="tx1"/>
+              </a:solidFill>
+            </a:endParaRPr>
+          </a:p>
+        </p:txBody>
+      </p:sp>
+      <p:sp>
+        <p:nvSpPr>
+          <p:cNvPr id="6" name="Hexagon 5">
+            <a:extLst>
+              <a:ext uri="{FF2B5EF4-FFF2-40B4-BE49-F238E27FC236}">
+                <a16:creationId xmlns:a16="http://schemas.microsoft.com/office/drawing/2014/main" id="{D89F8164-5C1D-3E83-12C4-6141C0E20429}"/>
+              </a:ext>
+            </a:extLst>
+          </p:cNvPr>
+          <p:cNvSpPr/>
+          <p:nvPr/>
+        </p:nvSpPr>
+        <p:spPr>
+          <a:xfrm>
+            <a:off x="5998959" y="3608238"/>
+            <a:ext cx="1340204" cy="421013"/>
+          </a:xfrm>
+          <a:prstGeom prst="hexagon">
+            <a:avLst/>
+          </a:prstGeom>
+          <a:solidFill>
+            <a:srgbClr val="FF0000"/>
+          </a:solidFill>
+        </p:spPr>
+        <p:style>
+          <a:lnRef idx="2">
+            <a:schemeClr val="accent1">
+              <a:shade val="50000"/>
+            </a:schemeClr>
+          </a:lnRef>
+          <a:fillRef idx="1">
+            <a:schemeClr val="accent1"/>
+          </a:fillRef>
+          <a:effectRef idx="0">
+            <a:schemeClr val="accent1"/>
+          </a:effectRef>
+          <a:fontRef idx="minor">
+            <a:schemeClr val="lt1"/>
+          </a:fontRef>
+        </p:style>
+        <p:txBody>
+          <a:bodyPr rtlCol="0" anchor="ctr"/>
+          <a:lstStyle/>
+          <a:p>
+            <a:pPr algn="ctr"/>
+            <a:r>
+              <a:rPr lang="en-US" dirty="0">
+                <a:solidFill>
+                  <a:schemeClr val="tx1"/>
+                </a:solidFill>
+              </a:rPr>
+              <a:t>outcome</a:t>
+            </a:r>
+          </a:p>
+        </p:txBody>
+      </p:sp>
+      <p:sp>
+        <p:nvSpPr>
+          <p:cNvPr id="7" name="Oval 6">
+            <a:extLst>
+              <a:ext uri="{FF2B5EF4-FFF2-40B4-BE49-F238E27FC236}">
+                <a16:creationId xmlns:a16="http://schemas.microsoft.com/office/drawing/2014/main" id="{3B799602-B204-34BD-F3DE-7C5042CE0F10}"/>
+              </a:ext>
+            </a:extLst>
+          </p:cNvPr>
+          <p:cNvSpPr/>
+          <p:nvPr/>
+        </p:nvSpPr>
+        <p:spPr>
+          <a:xfrm>
+            <a:off x="7008048" y="5091476"/>
+            <a:ext cx="1498888" cy="605258"/>
+          </a:xfrm>
+          <a:prstGeom prst="ellipse">
+            <a:avLst/>
+          </a:prstGeom>
+          <a:solidFill>
+            <a:srgbClr val="FFC000"/>
+          </a:solidFill>
+        </p:spPr>
+        <p:style>
+          <a:lnRef idx="2">
+            <a:schemeClr val="accent1">
+              <a:shade val="50000"/>
+            </a:schemeClr>
+          </a:lnRef>
+          <a:fillRef idx="1">
+            <a:schemeClr val="accent1"/>
+          </a:fillRef>
+          <a:effectRef idx="0">
+            <a:schemeClr val="accent1"/>
+          </a:effectRef>
+          <a:fontRef idx="minor">
+            <a:schemeClr val="lt1"/>
+          </a:fontRef>
+        </p:style>
+        <p:txBody>
+          <a:bodyPr rtlCol="0" anchor="ctr"/>
+          <a:lstStyle/>
+          <a:p>
+            <a:pPr algn="ctr"/>
+            <a:r>
+              <a:rPr lang="en-US" dirty="0">
+                <a:solidFill>
+                  <a:schemeClr val="tx1"/>
+                </a:solidFill>
+              </a:rPr>
+              <a:t>severity</a:t>
+            </a:r>
+          </a:p>
+        </p:txBody>
+      </p:sp>
+      <p:cxnSp>
+        <p:nvCxnSpPr>
+          <p:cNvPr id="9" name="Connector: Curved 8">
+            <a:extLst>
+              <a:ext uri="{FF2B5EF4-FFF2-40B4-BE49-F238E27FC236}">
+                <a16:creationId xmlns:a16="http://schemas.microsoft.com/office/drawing/2014/main" id="{32A9BC64-0B31-72F0-4FB8-373A6FD0E265}"/>
+              </a:ext>
+            </a:extLst>
+          </p:cNvPr>
+          <p:cNvCxnSpPr>
+            <a:cxnSpLocks/>
+            <a:stCxn id="25" idx="6"/>
+            <a:endCxn id="7" idx="2"/>
+          </p:cNvCxnSpPr>
+          <p:nvPr/>
+        </p:nvCxnSpPr>
+        <p:spPr>
+          <a:xfrm>
+            <a:off x="3246175" y="826101"/>
+            <a:ext cx="3761873" cy="4568004"/>
+          </a:xfrm>
+          <a:prstGeom prst="curvedConnector3">
+            <a:avLst>
+              <a:gd name="adj1" fmla="val 50000"/>
+            </a:avLst>
+          </a:prstGeom>
+          <a:ln w="38100">
+            <a:solidFill>
+              <a:schemeClr val="tx1"/>
+            </a:solidFill>
+            <a:tailEnd type="triangle" w="lg" len="lg"/>
+          </a:ln>
+        </p:spPr>
+        <p:style>
+          <a:lnRef idx="1">
+            <a:schemeClr val="accent1"/>
+          </a:lnRef>
+          <a:fillRef idx="0">
+            <a:schemeClr val="accent1"/>
+          </a:fillRef>
+          <a:effectRef idx="0">
+            <a:schemeClr val="accent1"/>
+          </a:effectRef>
+          <a:fontRef idx="minor">
+            <a:schemeClr val="tx1"/>
+          </a:fontRef>
+        </p:style>
+      </p:cxnSp>
+      <p:cxnSp>
+        <p:nvCxnSpPr>
+          <p:cNvPr id="10" name="Connector: Curved 9">
+            <a:extLst>
+              <a:ext uri="{FF2B5EF4-FFF2-40B4-BE49-F238E27FC236}">
+                <a16:creationId xmlns:a16="http://schemas.microsoft.com/office/drawing/2014/main" id="{2E975068-4584-07EC-8508-E7A6CF15D699}"/>
+              </a:ext>
+            </a:extLst>
+          </p:cNvPr>
+          <p:cNvCxnSpPr>
+            <a:cxnSpLocks/>
+            <a:stCxn id="3" idx="2"/>
+            <a:endCxn id="6" idx="4"/>
+          </p:cNvCxnSpPr>
+          <p:nvPr/>
+        </p:nvCxnSpPr>
+        <p:spPr>
+          <a:xfrm rot="10800000" flipV="1">
+            <a:off x="6104213" y="836812"/>
+            <a:ext cx="893797" cy="2771425"/>
+          </a:xfrm>
+          <a:prstGeom prst="curvedConnector2">
+            <a:avLst/>
+          </a:prstGeom>
+          <a:ln w="38100">
+            <a:solidFill>
+              <a:schemeClr val="tx1"/>
+            </a:solidFill>
+            <a:tailEnd type="triangle" w="lg" len="lg"/>
+          </a:ln>
+        </p:spPr>
+        <p:style>
+          <a:lnRef idx="1">
+            <a:schemeClr val="accent1"/>
+          </a:lnRef>
+          <a:fillRef idx="0">
+            <a:schemeClr val="accent1"/>
+          </a:fillRef>
+          <a:effectRef idx="0">
+            <a:schemeClr val="accent1"/>
+          </a:effectRef>
+          <a:fontRef idx="minor">
+            <a:schemeClr val="tx1"/>
+          </a:fontRef>
+        </p:style>
+      </p:cxnSp>
+      <p:cxnSp>
+        <p:nvCxnSpPr>
+          <p:cNvPr id="11" name="Connector: Curved 10">
+            <a:extLst>
+              <a:ext uri="{FF2B5EF4-FFF2-40B4-BE49-F238E27FC236}">
+                <a16:creationId xmlns:a16="http://schemas.microsoft.com/office/drawing/2014/main" id="{59456F5B-620F-A858-C60E-273E3B1B6A0E}"/>
+              </a:ext>
+            </a:extLst>
+          </p:cNvPr>
+          <p:cNvCxnSpPr>
+            <a:cxnSpLocks/>
+            <a:stCxn id="7" idx="0"/>
+            <a:endCxn id="2" idx="2"/>
+          </p:cNvCxnSpPr>
+          <p:nvPr/>
+        </p:nvCxnSpPr>
+        <p:spPr>
+          <a:xfrm rot="5400000" flipH="1" flipV="1">
+            <a:off x="7574960" y="4102394"/>
+            <a:ext cx="1171615" cy="806551"/>
+          </a:xfrm>
+          <a:prstGeom prst="curvedConnector3">
+            <a:avLst>
+              <a:gd name="adj1" fmla="val 50000"/>
+            </a:avLst>
+          </a:prstGeom>
+          <a:ln w="38100">
+            <a:solidFill>
+              <a:schemeClr val="tx1"/>
+            </a:solidFill>
+            <a:tailEnd type="triangle" w="lg" len="lg"/>
+          </a:ln>
+        </p:spPr>
+        <p:style>
+          <a:lnRef idx="1">
+            <a:schemeClr val="accent1"/>
+          </a:lnRef>
+          <a:fillRef idx="0">
+            <a:schemeClr val="accent1"/>
+          </a:fillRef>
+          <a:effectRef idx="0">
+            <a:schemeClr val="accent1"/>
+          </a:effectRef>
+          <a:fontRef idx="minor">
+            <a:schemeClr val="tx1"/>
+          </a:fontRef>
+        </p:style>
+      </p:cxnSp>
+      <p:cxnSp>
+        <p:nvCxnSpPr>
+          <p:cNvPr id="12" name="Connector: Curved 11">
+            <a:extLst>
+              <a:ext uri="{FF2B5EF4-FFF2-40B4-BE49-F238E27FC236}">
+                <a16:creationId xmlns:a16="http://schemas.microsoft.com/office/drawing/2014/main" id="{733ECA5E-28CF-29F2-4A5F-3CC4B8E725CA}"/>
+              </a:ext>
+            </a:extLst>
+          </p:cNvPr>
+          <p:cNvCxnSpPr>
+            <a:cxnSpLocks/>
+            <a:stCxn id="2" idx="0"/>
+            <a:endCxn id="5" idx="4"/>
+          </p:cNvCxnSpPr>
+          <p:nvPr/>
+        </p:nvCxnSpPr>
+        <p:spPr>
+          <a:xfrm rot="16200000" flipV="1">
+            <a:off x="7561542" y="2289416"/>
+            <a:ext cx="1198452" cy="806551"/>
+          </a:xfrm>
+          <a:prstGeom prst="curvedConnector3">
+            <a:avLst>
+              <a:gd name="adj1" fmla="val 50000"/>
+            </a:avLst>
+          </a:prstGeom>
+          <a:ln w="38100">
+            <a:solidFill>
+              <a:schemeClr val="tx1"/>
+            </a:solidFill>
+            <a:tailEnd type="triangle" w="lg" len="lg"/>
+          </a:ln>
+        </p:spPr>
+        <p:style>
+          <a:lnRef idx="1">
+            <a:schemeClr val="accent1"/>
+          </a:lnRef>
+          <a:fillRef idx="0">
+            <a:schemeClr val="accent1"/>
+          </a:fillRef>
+          <a:effectRef idx="0">
+            <a:schemeClr val="accent1"/>
+          </a:effectRef>
+          <a:fontRef idx="minor">
+            <a:schemeClr val="tx1"/>
+          </a:fontRef>
+        </p:style>
+      </p:cxnSp>
+      <p:cxnSp>
+        <p:nvCxnSpPr>
+          <p:cNvPr id="13" name="Connector: Curved 12">
+            <a:extLst>
+              <a:ext uri="{FF2B5EF4-FFF2-40B4-BE49-F238E27FC236}">
+                <a16:creationId xmlns:a16="http://schemas.microsoft.com/office/drawing/2014/main" id="{4A69FCD4-2B44-8B22-A3F9-688B631473F2}"/>
+              </a:ext>
+            </a:extLst>
+          </p:cNvPr>
+          <p:cNvCxnSpPr>
+            <a:cxnSpLocks/>
+            <a:stCxn id="2" idx="3"/>
+            <a:endCxn id="23" idx="0"/>
+          </p:cNvCxnSpPr>
+          <p:nvPr/>
+        </p:nvCxnSpPr>
+        <p:spPr>
+          <a:xfrm>
+            <a:off x="9085679" y="3605890"/>
+            <a:ext cx="682718" cy="614858"/>
+          </a:xfrm>
+          <a:prstGeom prst="curvedConnector2">
+            <a:avLst/>
+          </a:prstGeom>
+          <a:ln w="38100">
+            <a:solidFill>
+              <a:schemeClr val="tx1"/>
+            </a:solidFill>
+            <a:tailEnd type="triangle" w="lg" len="lg"/>
+          </a:ln>
+        </p:spPr>
+        <p:style>
+          <a:lnRef idx="1">
+            <a:schemeClr val="accent1"/>
+          </a:lnRef>
+          <a:fillRef idx="0">
+            <a:schemeClr val="accent1"/>
+          </a:fillRef>
+          <a:effectRef idx="0">
+            <a:schemeClr val="accent1"/>
+          </a:effectRef>
+          <a:fontRef idx="minor">
+            <a:schemeClr val="tx1"/>
+          </a:fontRef>
+        </p:style>
+      </p:cxnSp>
+      <p:cxnSp>
+        <p:nvCxnSpPr>
+          <p:cNvPr id="14" name="Connector: Curved 13">
+            <a:extLst>
+              <a:ext uri="{FF2B5EF4-FFF2-40B4-BE49-F238E27FC236}">
+                <a16:creationId xmlns:a16="http://schemas.microsoft.com/office/drawing/2014/main" id="{36C827B2-CD4E-DBBF-9426-925F0EFB15FC}"/>
+              </a:ext>
+            </a:extLst>
+          </p:cNvPr>
+          <p:cNvCxnSpPr>
+            <a:cxnSpLocks/>
+            <a:stCxn id="47" idx="6"/>
+            <a:endCxn id="7" idx="2"/>
+          </p:cNvCxnSpPr>
+          <p:nvPr/>
+        </p:nvCxnSpPr>
+        <p:spPr>
+          <a:xfrm>
+            <a:off x="3185870" y="5391190"/>
+            <a:ext cx="3822178" cy="2915"/>
+          </a:xfrm>
+          <a:prstGeom prst="curvedConnector3">
+            <a:avLst>
+              <a:gd name="adj1" fmla="val 50000"/>
+            </a:avLst>
+          </a:prstGeom>
+          <a:ln w="38100">
+            <a:solidFill>
+              <a:schemeClr val="tx1"/>
+            </a:solidFill>
+            <a:prstDash val="solid"/>
+            <a:tailEnd type="triangle" w="lg" len="lg"/>
+          </a:ln>
+        </p:spPr>
+        <p:style>
+          <a:lnRef idx="1">
+            <a:schemeClr val="accent1"/>
+          </a:lnRef>
+          <a:fillRef idx="0">
+            <a:schemeClr val="accent1"/>
+          </a:fillRef>
+          <a:effectRef idx="0">
+            <a:schemeClr val="accent1"/>
+          </a:effectRef>
+          <a:fontRef idx="minor">
+            <a:schemeClr val="tx1"/>
+          </a:fontRef>
+        </p:style>
+      </p:cxnSp>
+      <p:cxnSp>
+        <p:nvCxnSpPr>
+          <p:cNvPr id="15" name="Connector: Curved 14">
+            <a:extLst>
+              <a:ext uri="{FF2B5EF4-FFF2-40B4-BE49-F238E27FC236}">
+                <a16:creationId xmlns:a16="http://schemas.microsoft.com/office/drawing/2014/main" id="{49E9C397-2A44-C023-53EF-04E578C5946B}"/>
+              </a:ext>
+            </a:extLst>
+          </p:cNvPr>
+          <p:cNvCxnSpPr>
+            <a:cxnSpLocks/>
+            <a:stCxn id="5" idx="6"/>
+            <a:endCxn id="23" idx="0"/>
+          </p:cNvCxnSpPr>
+          <p:nvPr/>
+        </p:nvCxnSpPr>
+        <p:spPr>
+          <a:xfrm>
+            <a:off x="8577819" y="1798248"/>
+            <a:ext cx="1190578" cy="2422500"/>
+          </a:xfrm>
+          <a:prstGeom prst="curvedConnector2">
+            <a:avLst/>
+          </a:prstGeom>
+          <a:ln w="38100">
+            <a:solidFill>
+              <a:schemeClr val="tx1"/>
+            </a:solidFill>
+            <a:tailEnd type="triangle" w="lg" len="lg"/>
+          </a:ln>
+        </p:spPr>
+        <p:style>
+          <a:lnRef idx="1">
+            <a:schemeClr val="accent1"/>
+          </a:lnRef>
+          <a:fillRef idx="0">
+            <a:schemeClr val="accent1"/>
+          </a:fillRef>
+          <a:effectRef idx="0">
+            <a:schemeClr val="accent1"/>
+          </a:effectRef>
+          <a:fontRef idx="minor">
+            <a:schemeClr val="tx1"/>
+          </a:fontRef>
+        </p:style>
+      </p:cxnSp>
+      <p:cxnSp>
+        <p:nvCxnSpPr>
+          <p:cNvPr id="16" name="Connector: Curved 15">
+            <a:extLst>
+              <a:ext uri="{FF2B5EF4-FFF2-40B4-BE49-F238E27FC236}">
+                <a16:creationId xmlns:a16="http://schemas.microsoft.com/office/drawing/2014/main" id="{6778C715-EF7E-AD6E-CD3E-CAD8D6BAF79D}"/>
+              </a:ext>
+            </a:extLst>
+          </p:cNvPr>
+          <p:cNvCxnSpPr>
+            <a:cxnSpLocks/>
+            <a:stCxn id="7" idx="1"/>
+            <a:endCxn id="6" idx="1"/>
+          </p:cNvCxnSpPr>
+          <p:nvPr/>
+        </p:nvCxnSpPr>
+        <p:spPr>
+          <a:xfrm rot="5400000" flipH="1" flipV="1">
+            <a:off x="6655301" y="4601506"/>
+            <a:ext cx="1150863" cy="6355"/>
+          </a:xfrm>
+          <a:prstGeom prst="curvedConnector3">
+            <a:avLst>
+              <a:gd name="adj1" fmla="val 50000"/>
+            </a:avLst>
+          </a:prstGeom>
+          <a:ln w="38100">
+            <a:solidFill>
+              <a:schemeClr val="tx1"/>
+            </a:solidFill>
+            <a:tailEnd type="triangle" w="lg" len="lg"/>
+          </a:ln>
+        </p:spPr>
+        <p:style>
+          <a:lnRef idx="1">
+            <a:schemeClr val="accent1"/>
+          </a:lnRef>
+          <a:fillRef idx="0">
+            <a:schemeClr val="accent1"/>
+          </a:fillRef>
+          <a:effectRef idx="0">
+            <a:schemeClr val="accent1"/>
+          </a:effectRef>
+          <a:fontRef idx="minor">
+            <a:schemeClr val="tx1"/>
+          </a:fontRef>
+        </p:style>
+      </p:cxnSp>
+      <p:sp>
+        <p:nvSpPr>
+          <p:cNvPr id="18" name="TextBox 17">
+            <a:extLst>
+              <a:ext uri="{FF2B5EF4-FFF2-40B4-BE49-F238E27FC236}">
+                <a16:creationId xmlns:a16="http://schemas.microsoft.com/office/drawing/2014/main" id="{EE33DA0C-8AB4-AD8D-381A-9EB869329156}"/>
+              </a:ext>
+            </a:extLst>
+          </p:cNvPr>
+          <p:cNvSpPr txBox="1"/>
+          <p:nvPr/>
+        </p:nvSpPr>
+        <p:spPr>
+          <a:xfrm>
+            <a:off x="6545548" y="5892970"/>
+            <a:ext cx="2142038" cy="400110"/>
+          </a:xfrm>
+          <a:prstGeom prst="rect">
+            <a:avLst/>
+          </a:prstGeom>
+          <a:noFill/>
+        </p:spPr>
+        <p:txBody>
+          <a:bodyPr wrap="square" rtlCol="0">
+            <a:spAutoFit/>
+          </a:bodyPr>
+          <a:lstStyle/>
+          <a:p>
+            <a:pPr algn="ctr"/>
+            <a:r>
+              <a:rPr lang="en-US" sz="2000" b="1" dirty="0">
+                <a:solidFill>
+                  <a:srgbClr val="9DC3E6"/>
+                </a:solidFill>
+              </a:rPr>
+              <a:t>today</a:t>
+            </a:r>
+          </a:p>
+        </p:txBody>
+      </p:sp>
+      <p:sp>
+        <p:nvSpPr>
+          <p:cNvPr id="19" name="TextBox 18">
+            <a:extLst>
+              <a:ext uri="{FF2B5EF4-FFF2-40B4-BE49-F238E27FC236}">
+                <a16:creationId xmlns:a16="http://schemas.microsoft.com/office/drawing/2014/main" id="{45F92B5B-3D79-4674-556E-536FC9AAEC64}"/>
+              </a:ext>
+            </a:extLst>
+          </p:cNvPr>
+          <p:cNvSpPr txBox="1"/>
+          <p:nvPr/>
+        </p:nvSpPr>
+        <p:spPr>
+          <a:xfrm>
+            <a:off x="1472333" y="5939499"/>
+            <a:ext cx="2142038" cy="400110"/>
+          </a:xfrm>
+          <a:prstGeom prst="rect">
+            <a:avLst/>
+          </a:prstGeom>
+          <a:noFill/>
+        </p:spPr>
+        <p:txBody>
+          <a:bodyPr wrap="square" rtlCol="0">
+            <a:spAutoFit/>
+          </a:bodyPr>
+          <a:lstStyle/>
+          <a:p>
+            <a:pPr algn="ctr"/>
+            <a:r>
+              <a:rPr lang="en-US" sz="2000" b="1" dirty="0">
+                <a:solidFill>
+                  <a:srgbClr val="9DC3E6"/>
+                </a:solidFill>
+              </a:rPr>
+              <a:t>yesterday</a:t>
+            </a:r>
+          </a:p>
+        </p:txBody>
+      </p:sp>
+      <p:cxnSp>
+        <p:nvCxnSpPr>
+          <p:cNvPr id="22" name="Connector: Curved 21">
+            <a:extLst>
+              <a:ext uri="{FF2B5EF4-FFF2-40B4-BE49-F238E27FC236}">
+                <a16:creationId xmlns:a16="http://schemas.microsoft.com/office/drawing/2014/main" id="{CF41CEEC-8444-B47E-3789-4AFFB7E1B4D6}"/>
+              </a:ext>
+            </a:extLst>
+          </p:cNvPr>
+          <p:cNvCxnSpPr>
+            <a:cxnSpLocks/>
+            <a:stCxn id="5" idx="4"/>
+            <a:endCxn id="6" idx="5"/>
+          </p:cNvCxnSpPr>
+          <p:nvPr/>
+        </p:nvCxnSpPr>
+        <p:spPr>
+          <a:xfrm rot="5400000">
+            <a:off x="6738315" y="2589061"/>
+            <a:ext cx="1514772" cy="523582"/>
+          </a:xfrm>
+          <a:prstGeom prst="curvedConnector3">
+            <a:avLst>
+              <a:gd name="adj1" fmla="val 50000"/>
+            </a:avLst>
+          </a:prstGeom>
+          <a:ln w="38100">
+            <a:solidFill>
+              <a:schemeClr val="tx1"/>
+            </a:solidFill>
+            <a:tailEnd type="triangle" w="lg" len="lg"/>
+          </a:ln>
+        </p:spPr>
+        <p:style>
+          <a:lnRef idx="1">
+            <a:schemeClr val="accent1"/>
+          </a:lnRef>
+          <a:fillRef idx="0">
+            <a:schemeClr val="accent1"/>
+          </a:fillRef>
+          <a:effectRef idx="0">
+            <a:schemeClr val="accent1"/>
+          </a:effectRef>
+          <a:fontRef idx="minor">
+            <a:schemeClr val="tx1"/>
+          </a:fontRef>
+        </p:style>
+      </p:cxnSp>
+      <p:sp>
+        <p:nvSpPr>
+          <p:cNvPr id="23" name="Oval 22">
+            <a:extLst>
+              <a:ext uri="{FF2B5EF4-FFF2-40B4-BE49-F238E27FC236}">
+                <a16:creationId xmlns:a16="http://schemas.microsoft.com/office/drawing/2014/main" id="{842FC0AB-E109-13AD-E8FC-D99AF4ECA6F5}"/>
+              </a:ext>
+            </a:extLst>
+          </p:cNvPr>
+          <p:cNvSpPr/>
+          <p:nvPr/>
+        </p:nvSpPr>
+        <p:spPr>
+          <a:xfrm>
+            <a:off x="9120585" y="4220748"/>
+            <a:ext cx="1295624" cy="445532"/>
+          </a:xfrm>
+          <a:prstGeom prst="ellipse">
+            <a:avLst/>
+          </a:prstGeom>
+          <a:solidFill>
+            <a:srgbClr val="FFFF00"/>
+          </a:solidFill>
+        </p:spPr>
+        <p:style>
+          <a:lnRef idx="2">
+            <a:schemeClr val="accent1">
+              <a:shade val="50000"/>
+            </a:schemeClr>
+          </a:lnRef>
+          <a:fillRef idx="1">
+            <a:schemeClr val="accent1"/>
+          </a:fillRef>
+          <a:effectRef idx="0">
+            <a:schemeClr val="accent1"/>
+          </a:effectRef>
+          <a:fontRef idx="minor">
+            <a:schemeClr val="lt1"/>
+          </a:fontRef>
+        </p:style>
+        <p:txBody>
+          <a:bodyPr rtlCol="0" anchor="ctr"/>
+          <a:lstStyle/>
+          <a:p>
+            <a:pPr algn="ctr"/>
+            <a:r>
+              <a:rPr lang="en-US" dirty="0">
+                <a:solidFill>
+                  <a:schemeClr val="tx1"/>
+                </a:solidFill>
+              </a:rPr>
+              <a:t>efficacy</a:t>
+            </a:r>
+          </a:p>
+        </p:txBody>
+      </p:sp>
+      <p:cxnSp>
+        <p:nvCxnSpPr>
+          <p:cNvPr id="24" name="Connector: Curved 23">
+            <a:extLst>
+              <a:ext uri="{FF2B5EF4-FFF2-40B4-BE49-F238E27FC236}">
+                <a16:creationId xmlns:a16="http://schemas.microsoft.com/office/drawing/2014/main" id="{2B3E895E-1C0A-9E82-9A03-2C98F256CE20}"/>
+              </a:ext>
+            </a:extLst>
+          </p:cNvPr>
+          <p:cNvCxnSpPr>
+            <a:cxnSpLocks/>
+            <a:stCxn id="28" idx="6"/>
+            <a:endCxn id="7" idx="2"/>
+          </p:cNvCxnSpPr>
+          <p:nvPr/>
+        </p:nvCxnSpPr>
+        <p:spPr>
+          <a:xfrm>
+            <a:off x="3176497" y="3490395"/>
+            <a:ext cx="3831551" cy="1903710"/>
+          </a:xfrm>
+          <a:prstGeom prst="curvedConnector3">
+            <a:avLst>
+              <a:gd name="adj1" fmla="val 50000"/>
+            </a:avLst>
+          </a:prstGeom>
+          <a:ln w="38100">
+            <a:solidFill>
+              <a:schemeClr val="tx1"/>
+            </a:solidFill>
+            <a:tailEnd type="triangle" w="lg" len="lg"/>
+          </a:ln>
+        </p:spPr>
+        <p:style>
+          <a:lnRef idx="1">
+            <a:schemeClr val="accent1"/>
+          </a:lnRef>
+          <a:fillRef idx="0">
+            <a:schemeClr val="accent1"/>
+          </a:fillRef>
+          <a:effectRef idx="0">
+            <a:schemeClr val="accent1"/>
+          </a:effectRef>
+          <a:fontRef idx="minor">
+            <a:schemeClr val="tx1"/>
+          </a:fontRef>
+        </p:style>
+      </p:cxnSp>
+      <p:sp>
+        <p:nvSpPr>
+          <p:cNvPr id="25" name="Oval 24">
+            <a:extLst>
+              <a:ext uri="{FF2B5EF4-FFF2-40B4-BE49-F238E27FC236}">
+                <a16:creationId xmlns:a16="http://schemas.microsoft.com/office/drawing/2014/main" id="{348540B3-09AE-C68E-1B9B-AD73BA94B7DA}"/>
+              </a:ext>
+            </a:extLst>
+          </p:cNvPr>
+          <p:cNvSpPr/>
+          <p:nvPr/>
+        </p:nvSpPr>
+        <p:spPr>
+          <a:xfrm>
+            <a:off x="1697325" y="536982"/>
+            <a:ext cx="1548850" cy="578238"/>
+          </a:xfrm>
+          <a:prstGeom prst="ellipse">
+            <a:avLst/>
+          </a:prstGeom>
+          <a:solidFill>
+            <a:srgbClr val="FFFF00"/>
+          </a:solidFill>
+        </p:spPr>
+        <p:style>
+          <a:lnRef idx="2">
+            <a:schemeClr val="accent1">
+              <a:shade val="50000"/>
+            </a:schemeClr>
+          </a:lnRef>
+          <a:fillRef idx="1">
+            <a:schemeClr val="accent1"/>
+          </a:fillRef>
+          <a:effectRef idx="0">
+            <a:schemeClr val="accent1"/>
+          </a:effectRef>
+          <a:fontRef idx="minor">
+            <a:schemeClr val="lt1"/>
+          </a:fontRef>
+        </p:style>
+        <p:txBody>
+          <a:bodyPr rtlCol="0" anchor="ctr"/>
+          <a:lstStyle/>
+          <a:p>
+            <a:pPr algn="ctr"/>
+            <a:r>
+              <a:rPr lang="en-US" dirty="0">
+                <a:solidFill>
+                  <a:schemeClr val="tx1"/>
+                </a:solidFill>
+              </a:rPr>
+              <a:t>infection</a:t>
+            </a:r>
+          </a:p>
+        </p:txBody>
+      </p:sp>
+      <p:sp>
+        <p:nvSpPr>
+          <p:cNvPr id="27" name="Oval 26">
+            <a:extLst>
+              <a:ext uri="{FF2B5EF4-FFF2-40B4-BE49-F238E27FC236}">
+                <a16:creationId xmlns:a16="http://schemas.microsoft.com/office/drawing/2014/main" id="{8F2D6096-AE95-313A-A509-F81911C89B14}"/>
+              </a:ext>
+            </a:extLst>
+          </p:cNvPr>
+          <p:cNvSpPr/>
+          <p:nvPr/>
+        </p:nvSpPr>
+        <p:spPr>
+          <a:xfrm>
+            <a:off x="1680169" y="1493348"/>
+            <a:ext cx="1644108" cy="578237"/>
+          </a:xfrm>
+          <a:prstGeom prst="ellipse">
+            <a:avLst/>
+          </a:prstGeom>
+          <a:solidFill>
+            <a:srgbClr val="FFFF00"/>
+          </a:solidFill>
+        </p:spPr>
+        <p:style>
+          <a:lnRef idx="2">
+            <a:schemeClr val="accent1">
+              <a:shade val="50000"/>
+            </a:schemeClr>
+          </a:lnRef>
+          <a:fillRef idx="1">
+            <a:schemeClr val="accent1"/>
+          </a:fillRef>
+          <a:effectRef idx="0">
+            <a:schemeClr val="accent1"/>
+          </a:effectRef>
+          <a:fontRef idx="minor">
+            <a:schemeClr val="lt1"/>
+          </a:fontRef>
+        </p:style>
+        <p:txBody>
+          <a:bodyPr rtlCol="0" anchor="ctr"/>
+          <a:lstStyle/>
+          <a:p>
+            <a:pPr algn="ctr"/>
+            <a:r>
+              <a:rPr lang="en-US" dirty="0" err="1">
+                <a:solidFill>
+                  <a:schemeClr val="tx1"/>
+                </a:solidFill>
+              </a:rPr>
+              <a:t>cum_drug</a:t>
+            </a:r>
+            <a:endParaRPr lang="en-US" dirty="0">
+              <a:solidFill>
+                <a:schemeClr val="tx1"/>
+              </a:solidFill>
+            </a:endParaRPr>
+          </a:p>
+        </p:txBody>
+      </p:sp>
+      <p:sp>
+        <p:nvSpPr>
+          <p:cNvPr id="47" name="Oval 46">
+            <a:extLst>
+              <a:ext uri="{FF2B5EF4-FFF2-40B4-BE49-F238E27FC236}">
+                <a16:creationId xmlns:a16="http://schemas.microsoft.com/office/drawing/2014/main" id="{D169DE58-0667-10B7-0EF1-143BB6F859B1}"/>
+              </a:ext>
+            </a:extLst>
+          </p:cNvPr>
+          <p:cNvSpPr/>
+          <p:nvPr/>
+        </p:nvSpPr>
+        <p:spPr>
+          <a:xfrm>
+            <a:off x="1759949" y="5117462"/>
+            <a:ext cx="1425921" cy="547455"/>
+          </a:xfrm>
+          <a:prstGeom prst="ellipse">
+            <a:avLst/>
+          </a:prstGeom>
+          <a:solidFill>
+            <a:srgbClr val="FFC000"/>
+          </a:solidFill>
+        </p:spPr>
+        <p:style>
+          <a:lnRef idx="2">
+            <a:schemeClr val="accent1">
+              <a:shade val="50000"/>
+            </a:schemeClr>
+          </a:lnRef>
+          <a:fillRef idx="1">
+            <a:schemeClr val="accent1"/>
+          </a:fillRef>
+          <a:effectRef idx="0">
+            <a:schemeClr val="accent1"/>
+          </a:effectRef>
+          <a:fontRef idx="minor">
+            <a:schemeClr val="lt1"/>
+          </a:fontRef>
+        </p:style>
+        <p:txBody>
+          <a:bodyPr rtlCol="0" anchor="ctr"/>
+          <a:lstStyle/>
+          <a:p>
+            <a:pPr algn="ctr"/>
+            <a:r>
+              <a:rPr lang="en-US" dirty="0">
+                <a:solidFill>
+                  <a:schemeClr val="tx1"/>
+                </a:solidFill>
+              </a:rPr>
+              <a:t>severity</a:t>
+            </a:r>
+          </a:p>
+        </p:txBody>
+      </p:sp>
+      <p:sp>
+        <p:nvSpPr>
+          <p:cNvPr id="91" name="TextBox 90">
+            <a:extLst>
+              <a:ext uri="{FF2B5EF4-FFF2-40B4-BE49-F238E27FC236}">
+                <a16:creationId xmlns:a16="http://schemas.microsoft.com/office/drawing/2014/main" id="{294A6E50-E077-59B9-3A8F-D3361EDAA4E8}"/>
+              </a:ext>
+            </a:extLst>
+          </p:cNvPr>
+          <p:cNvSpPr txBox="1"/>
+          <p:nvPr/>
+        </p:nvSpPr>
+        <p:spPr>
+          <a:xfrm rot="16700736">
+            <a:off x="5529426" y="2320351"/>
+            <a:ext cx="1109995" cy="369332"/>
+          </a:xfrm>
+          <a:prstGeom prst="rect">
+            <a:avLst/>
+          </a:prstGeom>
+          <a:noFill/>
+        </p:spPr>
+        <p:txBody>
+          <a:bodyPr wrap="square" rtlCol="0">
+            <a:spAutoFit/>
+          </a:bodyPr>
+          <a:lstStyle/>
+          <a:p>
+            <a:r>
+              <a:rPr lang="en-US" dirty="0">
+                <a:solidFill>
+                  <a:schemeClr val="accent4">
+                    <a:lumMod val="75000"/>
+                  </a:schemeClr>
+                </a:solidFill>
+              </a:rPr>
+              <a:t>finished</a:t>
+            </a:r>
+            <a:endParaRPr lang="en-US" dirty="0"/>
+          </a:p>
+        </p:txBody>
+      </p:sp>
+      <p:sp>
+        <p:nvSpPr>
+          <p:cNvPr id="92" name="TextBox 91">
+            <a:extLst>
+              <a:ext uri="{FF2B5EF4-FFF2-40B4-BE49-F238E27FC236}">
+                <a16:creationId xmlns:a16="http://schemas.microsoft.com/office/drawing/2014/main" id="{C304E32B-DCB4-318B-5CC8-AC6C4E6FE682}"/>
+              </a:ext>
+            </a:extLst>
+          </p:cNvPr>
+          <p:cNvSpPr txBox="1"/>
+          <p:nvPr/>
+        </p:nvSpPr>
+        <p:spPr>
+          <a:xfrm rot="17886317">
+            <a:off x="6786740" y="2541097"/>
+            <a:ext cx="1109995" cy="369332"/>
+          </a:xfrm>
+          <a:prstGeom prst="rect">
+            <a:avLst/>
+          </a:prstGeom>
+          <a:noFill/>
+        </p:spPr>
+        <p:txBody>
+          <a:bodyPr wrap="square" rtlCol="0">
+            <a:spAutoFit/>
+          </a:bodyPr>
+          <a:lstStyle/>
+          <a:p>
+            <a:r>
+              <a:rPr lang="en-US" dirty="0">
+                <a:solidFill>
+                  <a:schemeClr val="accent4">
+                    <a:lumMod val="75000"/>
+                  </a:schemeClr>
+                </a:solidFill>
+              </a:rPr>
+              <a:t>toxicity</a:t>
+            </a:r>
+          </a:p>
+        </p:txBody>
+      </p:sp>
+      <p:sp>
+        <p:nvSpPr>
+          <p:cNvPr id="93" name="TextBox 92">
+            <a:extLst>
+              <a:ext uri="{FF2B5EF4-FFF2-40B4-BE49-F238E27FC236}">
+                <a16:creationId xmlns:a16="http://schemas.microsoft.com/office/drawing/2014/main" id="{165BFDEB-4D2A-6F7A-09F6-C9D5B761B0CF}"/>
+              </a:ext>
+            </a:extLst>
+          </p:cNvPr>
+          <p:cNvSpPr txBox="1"/>
+          <p:nvPr/>
+        </p:nvSpPr>
+        <p:spPr>
+          <a:xfrm rot="3758822">
+            <a:off x="8731846" y="2299487"/>
+            <a:ext cx="1695166" cy="369332"/>
+          </a:xfrm>
+          <a:prstGeom prst="rect">
+            <a:avLst/>
+          </a:prstGeom>
+          <a:noFill/>
+        </p:spPr>
+        <p:txBody>
+          <a:bodyPr wrap="square" rtlCol="0">
+            <a:spAutoFit/>
+          </a:bodyPr>
+          <a:lstStyle/>
+          <a:p>
+            <a:r>
+              <a:rPr lang="en-US" dirty="0">
+                <a:solidFill>
+                  <a:schemeClr val="accent4">
+                    <a:lumMod val="75000"/>
+                  </a:schemeClr>
+                </a:solidFill>
+              </a:rPr>
+              <a:t>desensitization</a:t>
+            </a:r>
+          </a:p>
+        </p:txBody>
+      </p:sp>
+      <p:sp>
+        <p:nvSpPr>
+          <p:cNvPr id="104" name="TextBox 103">
+            <a:extLst>
+              <a:ext uri="{FF2B5EF4-FFF2-40B4-BE49-F238E27FC236}">
+                <a16:creationId xmlns:a16="http://schemas.microsoft.com/office/drawing/2014/main" id="{8A4F6DF9-C937-42C1-3F6B-98D13B0D7225}"/>
+              </a:ext>
+            </a:extLst>
+          </p:cNvPr>
+          <p:cNvSpPr txBox="1"/>
+          <p:nvPr/>
+        </p:nvSpPr>
+        <p:spPr>
+          <a:xfrm rot="16499065">
+            <a:off x="6428961" y="4481614"/>
+            <a:ext cx="1109995" cy="369332"/>
+          </a:xfrm>
+          <a:prstGeom prst="rect">
+            <a:avLst/>
+          </a:prstGeom>
+          <a:noFill/>
+        </p:spPr>
+        <p:txBody>
+          <a:bodyPr wrap="square" rtlCol="0">
+            <a:spAutoFit/>
+          </a:bodyPr>
+          <a:lstStyle/>
+          <a:p>
+            <a:r>
+              <a:rPr lang="en-US" dirty="0">
+                <a:solidFill>
+                  <a:schemeClr val="accent4">
+                    <a:lumMod val="75000"/>
+                  </a:schemeClr>
+                </a:solidFill>
+              </a:rPr>
+              <a:t>mortality</a:t>
+            </a:r>
+          </a:p>
+        </p:txBody>
+      </p:sp>
+      <p:sp>
+        <p:nvSpPr>
+          <p:cNvPr id="105" name="TextBox 104">
+            <a:extLst>
+              <a:ext uri="{FF2B5EF4-FFF2-40B4-BE49-F238E27FC236}">
+                <a16:creationId xmlns:a16="http://schemas.microsoft.com/office/drawing/2014/main" id="{125983A9-5CCB-C88B-12C2-7D1BBBC78EBF}"/>
+              </a:ext>
+            </a:extLst>
+          </p:cNvPr>
+          <p:cNvSpPr txBox="1"/>
+          <p:nvPr/>
+        </p:nvSpPr>
+        <p:spPr>
+          <a:xfrm rot="18761903">
+            <a:off x="7324387" y="4310716"/>
+            <a:ext cx="1109995" cy="369332"/>
+          </a:xfrm>
+          <a:prstGeom prst="rect">
+            <a:avLst/>
+          </a:prstGeom>
+          <a:noFill/>
+        </p:spPr>
+        <p:txBody>
+          <a:bodyPr wrap="square" rtlCol="0">
+            <a:spAutoFit/>
+          </a:bodyPr>
+          <a:lstStyle/>
+          <a:p>
+            <a:r>
+              <a:rPr lang="en-US" dirty="0">
+                <a:solidFill>
+                  <a:schemeClr val="accent4">
+                    <a:lumMod val="75000"/>
+                  </a:schemeClr>
+                </a:solidFill>
+              </a:rPr>
+              <a:t>indication</a:t>
+            </a:r>
+          </a:p>
+        </p:txBody>
+      </p:sp>
+      <p:sp>
+        <p:nvSpPr>
+          <p:cNvPr id="109" name="TextBox 108">
+            <a:extLst>
+              <a:ext uri="{FF2B5EF4-FFF2-40B4-BE49-F238E27FC236}">
+                <a16:creationId xmlns:a16="http://schemas.microsoft.com/office/drawing/2014/main" id="{DFED97AE-D445-411C-5401-9D0BD11D1EF3}"/>
+              </a:ext>
+            </a:extLst>
+          </p:cNvPr>
+          <p:cNvSpPr txBox="1"/>
+          <p:nvPr/>
+        </p:nvSpPr>
+        <p:spPr>
+          <a:xfrm rot="2610934">
+            <a:off x="7725084" y="2680200"/>
+            <a:ext cx="1695166" cy="369332"/>
+          </a:xfrm>
+          <a:prstGeom prst="rect">
+            <a:avLst/>
+          </a:prstGeom>
+          <a:noFill/>
+        </p:spPr>
+        <p:txBody>
+          <a:bodyPr wrap="square" rtlCol="0">
+            <a:spAutoFit/>
+          </a:bodyPr>
+          <a:lstStyle/>
+          <a:p>
+            <a:r>
+              <a:rPr lang="en-US" dirty="0">
+                <a:solidFill>
+                  <a:schemeClr val="accent4">
+                    <a:lumMod val="75000"/>
+                  </a:schemeClr>
+                </a:solidFill>
+              </a:rPr>
+              <a:t>accumulation</a:t>
+            </a:r>
+          </a:p>
+        </p:txBody>
+      </p:sp>
+      <p:sp>
+        <p:nvSpPr>
+          <p:cNvPr id="2" name="Rectangle 1">
+            <a:extLst>
+              <a:ext uri="{FF2B5EF4-FFF2-40B4-BE49-F238E27FC236}">
+                <a16:creationId xmlns:a16="http://schemas.microsoft.com/office/drawing/2014/main" id="{53D412E8-D39A-D47C-9D86-C709D9A87BAC}"/>
+              </a:ext>
+            </a:extLst>
+          </p:cNvPr>
+          <p:cNvSpPr/>
+          <p:nvPr/>
+        </p:nvSpPr>
+        <p:spPr>
+          <a:xfrm>
+            <a:off x="8042406" y="3291918"/>
+            <a:ext cx="1043273" cy="627943"/>
+          </a:xfrm>
+          <a:prstGeom prst="rect">
+            <a:avLst/>
+          </a:prstGeom>
+          <a:solidFill>
+            <a:schemeClr val="accent6">
+              <a:lumMod val="40000"/>
+              <a:lumOff val="60000"/>
+            </a:schemeClr>
+          </a:solidFill>
+        </p:spPr>
+        <p:style>
+          <a:lnRef idx="2">
+            <a:schemeClr val="accent1">
+              <a:shade val="50000"/>
+            </a:schemeClr>
+          </a:lnRef>
+          <a:fillRef idx="1">
+            <a:schemeClr val="accent1"/>
+          </a:fillRef>
+          <a:effectRef idx="0">
+            <a:schemeClr val="accent1"/>
+          </a:effectRef>
+          <a:fontRef idx="minor">
+            <a:schemeClr val="lt1"/>
+          </a:fontRef>
+        </p:style>
+        <p:txBody>
+          <a:bodyPr rtlCol="0" anchor="ctr"/>
+          <a:lstStyle/>
+          <a:p>
+            <a:pPr algn="ctr"/>
+            <a:r>
+              <a:rPr lang="en-US" dirty="0">
+                <a:solidFill>
+                  <a:schemeClr val="tx1"/>
+                </a:solidFill>
+              </a:rPr>
+              <a:t>drug</a:t>
+            </a:r>
+          </a:p>
+        </p:txBody>
+      </p:sp>
+      <p:sp>
+        <p:nvSpPr>
+          <p:cNvPr id="28" name="Oval 27">
+            <a:extLst>
+              <a:ext uri="{FF2B5EF4-FFF2-40B4-BE49-F238E27FC236}">
+                <a16:creationId xmlns:a16="http://schemas.microsoft.com/office/drawing/2014/main" id="{5FB22E92-5869-FE2B-2FC1-E3D7AC32E66A}"/>
+              </a:ext>
+            </a:extLst>
+          </p:cNvPr>
+          <p:cNvSpPr/>
+          <p:nvPr/>
+        </p:nvSpPr>
+        <p:spPr>
+          <a:xfrm>
+            <a:off x="1880873" y="3267629"/>
+            <a:ext cx="1295624" cy="445532"/>
+          </a:xfrm>
+          <a:prstGeom prst="ellipse">
+            <a:avLst/>
+          </a:prstGeom>
+          <a:solidFill>
+            <a:srgbClr val="FFFF00"/>
+          </a:solidFill>
+        </p:spPr>
+        <p:style>
+          <a:lnRef idx="2">
+            <a:schemeClr val="accent1">
+              <a:shade val="50000"/>
+            </a:schemeClr>
+          </a:lnRef>
+          <a:fillRef idx="1">
+            <a:schemeClr val="accent1"/>
+          </a:fillRef>
+          <a:effectRef idx="0">
+            <a:schemeClr val="accent1"/>
+          </a:effectRef>
+          <a:fontRef idx="minor">
+            <a:schemeClr val="lt1"/>
+          </a:fontRef>
+        </p:style>
+        <p:txBody>
+          <a:bodyPr rtlCol="0" anchor="ctr"/>
+          <a:lstStyle/>
+          <a:p>
+            <a:pPr algn="ctr"/>
+            <a:r>
+              <a:rPr lang="en-US" dirty="0">
+                <a:solidFill>
+                  <a:schemeClr val="tx1"/>
+                </a:solidFill>
+              </a:rPr>
+              <a:t>efficacy</a:t>
+            </a:r>
+          </a:p>
+        </p:txBody>
+      </p:sp>
+      <p:cxnSp>
+        <p:nvCxnSpPr>
+          <p:cNvPr id="29" name="Connector: Curved 28">
+            <a:extLst>
+              <a:ext uri="{FF2B5EF4-FFF2-40B4-BE49-F238E27FC236}">
+                <a16:creationId xmlns:a16="http://schemas.microsoft.com/office/drawing/2014/main" id="{67160EC5-A298-1067-141E-330F245FD62C}"/>
+              </a:ext>
+            </a:extLst>
+          </p:cNvPr>
+          <p:cNvCxnSpPr>
+            <a:cxnSpLocks/>
+            <a:stCxn id="25" idx="6"/>
+            <a:endCxn id="3" idx="2"/>
+          </p:cNvCxnSpPr>
+          <p:nvPr/>
+        </p:nvCxnSpPr>
+        <p:spPr>
+          <a:xfrm>
+            <a:off x="3246175" y="826101"/>
+            <a:ext cx="3751834" cy="10712"/>
+          </a:xfrm>
+          <a:prstGeom prst="curvedConnector3">
+            <a:avLst>
+              <a:gd name="adj1" fmla="val 50000"/>
+            </a:avLst>
+          </a:prstGeom>
+          <a:ln w="38100">
+            <a:solidFill>
+              <a:schemeClr val="tx1"/>
+            </a:solidFill>
+            <a:prstDash val="solid"/>
+            <a:tailEnd type="triangle" w="lg" len="lg"/>
+          </a:ln>
+        </p:spPr>
+        <p:style>
+          <a:lnRef idx="1">
+            <a:schemeClr val="accent1"/>
+          </a:lnRef>
+          <a:fillRef idx="0">
+            <a:schemeClr val="accent1"/>
+          </a:fillRef>
+          <a:effectRef idx="0">
+            <a:schemeClr val="accent1"/>
+          </a:effectRef>
+          <a:fontRef idx="minor">
+            <a:schemeClr val="tx1"/>
+          </a:fontRef>
+        </p:style>
+      </p:cxnSp>
+      <p:cxnSp>
+        <p:nvCxnSpPr>
+          <p:cNvPr id="33" name="Connector: Curved 32">
+            <a:extLst>
+              <a:ext uri="{FF2B5EF4-FFF2-40B4-BE49-F238E27FC236}">
+                <a16:creationId xmlns:a16="http://schemas.microsoft.com/office/drawing/2014/main" id="{FF82D7BB-97D1-8C08-501A-B6DD9242C184}"/>
+              </a:ext>
+            </a:extLst>
+          </p:cNvPr>
+          <p:cNvCxnSpPr>
+            <a:cxnSpLocks/>
+            <a:stCxn id="27" idx="6"/>
+            <a:endCxn id="5" idx="2"/>
+          </p:cNvCxnSpPr>
+          <p:nvPr/>
+        </p:nvCxnSpPr>
+        <p:spPr>
+          <a:xfrm>
+            <a:off x="3324277" y="1782467"/>
+            <a:ext cx="3612888" cy="15781"/>
+          </a:xfrm>
+          <a:prstGeom prst="curvedConnector3">
+            <a:avLst>
+              <a:gd name="adj1" fmla="val 50000"/>
+            </a:avLst>
+          </a:prstGeom>
+          <a:ln w="38100">
+            <a:solidFill>
+              <a:schemeClr val="tx1"/>
+            </a:solidFill>
+            <a:prstDash val="solid"/>
+            <a:tailEnd type="triangle" w="lg" len="lg"/>
+          </a:ln>
+        </p:spPr>
+        <p:style>
+          <a:lnRef idx="1">
+            <a:schemeClr val="accent1"/>
+          </a:lnRef>
+          <a:fillRef idx="0">
+            <a:schemeClr val="accent1"/>
+          </a:fillRef>
+          <a:effectRef idx="0">
+            <a:schemeClr val="accent1"/>
+          </a:effectRef>
+          <a:fontRef idx="minor">
+            <a:schemeClr val="tx1"/>
+          </a:fontRef>
+        </p:style>
+      </p:cxnSp>
+    </p:spTree>
+    <p:extLst>
+      <p:ext uri="{BB962C8B-B14F-4D97-AF65-F5344CB8AC3E}">
+        <p14:creationId xmlns:p14="http://schemas.microsoft.com/office/powerpoint/2010/main" val="2686814815"/>
+      </p:ext>
+    </p:extLst>
+  </p:cSld>
+  <p:clrMapOvr>
+    <a:masterClrMapping/>
+  </p:clrMapOvr>
+</p:sld>
+</file>
+
+<file path=ppt/slides/slide4.xml><?xml version="1.0" encoding="utf-8"?>
+<p:sld xmlns:a="http://schemas.openxmlformats.org/drawingml/2006/main" xmlns:r="http://schemas.openxmlformats.org/officeDocument/2006/relationships" xmlns:p="http://schemas.openxmlformats.org/presentationml/2006/main">
+  <p:cSld>
+    <p:spTree>
+      <p:nvGrpSpPr>
+        <p:cNvPr id="1" name=""/>
+        <p:cNvGrpSpPr/>
+        <p:nvPr/>
+      </p:nvGrpSpPr>
+      <p:grpSpPr>
+        <a:xfrm>
+          <a:off x="0" y="0"/>
+          <a:ext cx="0" cy="0"/>
+          <a:chOff x="0" y="0"/>
+          <a:chExt cx="0" cy="0"/>
+        </a:xfrm>
+      </p:grpSpPr>
+      <p:cxnSp>
+        <p:nvCxnSpPr>
+          <p:cNvPr id="62" name="Straight Connector 61">
+            <a:extLst>
+              <a:ext uri="{FF2B5EF4-FFF2-40B4-BE49-F238E27FC236}">
+                <a16:creationId xmlns:a16="http://schemas.microsoft.com/office/drawing/2014/main" id="{2115033C-3D06-AD2D-50FB-D82CB92905C5}"/>
+              </a:ext>
+            </a:extLst>
+          </p:cNvPr>
+          <p:cNvCxnSpPr>
+            <a:cxnSpLocks/>
+          </p:cNvCxnSpPr>
+          <p:nvPr/>
+        </p:nvCxnSpPr>
+        <p:spPr>
+          <a:xfrm>
+            <a:off x="5295672" y="264695"/>
+            <a:ext cx="0" cy="6497052"/>
+          </a:xfrm>
+          <a:prstGeom prst="line">
+            <a:avLst/>
+          </a:prstGeom>
+          <a:ln w="127000">
+            <a:solidFill>
+              <a:schemeClr val="accent5">
+                <a:lumMod val="60000"/>
+                <a:lumOff val="40000"/>
+              </a:schemeClr>
+            </a:solidFill>
+            <a:prstDash val="solid"/>
+          </a:ln>
+        </p:spPr>
+        <p:style>
+          <a:lnRef idx="1">
+            <a:schemeClr val="accent1"/>
+          </a:lnRef>
+          <a:fillRef idx="0">
+            <a:schemeClr val="accent1"/>
+          </a:fillRef>
+          <a:effectRef idx="0">
+            <a:schemeClr val="accent1"/>
+          </a:effectRef>
+          <a:fontRef idx="minor">
+            <a:schemeClr val="tx1"/>
+          </a:fontRef>
+        </p:style>
+      </p:cxnSp>
+      <p:sp>
+        <p:nvSpPr>
+          <p:cNvPr id="3" name="Oval 2">
+            <a:extLst>
+              <a:ext uri="{FF2B5EF4-FFF2-40B4-BE49-F238E27FC236}">
+                <a16:creationId xmlns:a16="http://schemas.microsoft.com/office/drawing/2014/main" id="{A57852EE-101C-7687-CEC3-9C14B3A866A7}"/>
+              </a:ext>
+            </a:extLst>
+          </p:cNvPr>
+          <p:cNvSpPr/>
+          <p:nvPr/>
+        </p:nvSpPr>
+        <p:spPr>
+          <a:xfrm>
+            <a:off x="7563386" y="524201"/>
+            <a:ext cx="1536149" cy="626681"/>
+          </a:xfrm>
+          <a:prstGeom prst="ellipse">
+            <a:avLst/>
+          </a:prstGeom>
+          <a:solidFill>
+            <a:srgbClr val="FFFF00"/>
+          </a:solidFill>
+        </p:spPr>
+        <p:style>
+          <a:lnRef idx="2">
+            <a:schemeClr val="accent1">
+              <a:shade val="50000"/>
+            </a:schemeClr>
+          </a:lnRef>
+          <a:fillRef idx="1">
+            <a:schemeClr val="accent1"/>
+          </a:fillRef>
+          <a:effectRef idx="0">
+            <a:schemeClr val="accent1"/>
+          </a:effectRef>
+          <a:fontRef idx="minor">
+            <a:schemeClr val="lt1"/>
+          </a:fontRef>
+        </p:style>
+        <p:txBody>
+          <a:bodyPr rtlCol="0" anchor="ctr"/>
+          <a:lstStyle/>
+          <a:p>
+            <a:pPr algn="ctr"/>
+            <a:r>
+              <a:rPr lang="en-US" dirty="0">
+                <a:solidFill>
+                  <a:schemeClr val="tx1"/>
+                </a:solidFill>
+              </a:rPr>
+              <a:t>infection</a:t>
+            </a:r>
+          </a:p>
+        </p:txBody>
+      </p:sp>
+      <p:sp>
+        <p:nvSpPr>
+          <p:cNvPr id="5" name="Oval 4">
+            <a:extLst>
+              <a:ext uri="{FF2B5EF4-FFF2-40B4-BE49-F238E27FC236}">
+                <a16:creationId xmlns:a16="http://schemas.microsoft.com/office/drawing/2014/main" id="{3D0AD825-B406-118F-F745-7B9BC3378854}"/>
+              </a:ext>
+            </a:extLst>
+          </p:cNvPr>
+          <p:cNvSpPr/>
+          <p:nvPr/>
+        </p:nvSpPr>
+        <p:spPr>
+          <a:xfrm>
+            <a:off x="7511133" y="1503758"/>
+            <a:ext cx="1640654" cy="590437"/>
+          </a:xfrm>
+          <a:prstGeom prst="ellipse">
+            <a:avLst/>
+          </a:prstGeom>
+          <a:solidFill>
+            <a:srgbClr val="FFFF00"/>
+          </a:solidFill>
+        </p:spPr>
+        <p:style>
+          <a:lnRef idx="2">
+            <a:schemeClr val="accent1">
+              <a:shade val="50000"/>
+            </a:schemeClr>
+          </a:lnRef>
+          <a:fillRef idx="1">
+            <a:schemeClr val="accent1"/>
+          </a:fillRef>
+          <a:effectRef idx="0">
+            <a:schemeClr val="accent1"/>
+          </a:effectRef>
+          <a:fontRef idx="minor">
+            <a:schemeClr val="lt1"/>
+          </a:fontRef>
+        </p:style>
+        <p:txBody>
+          <a:bodyPr rtlCol="0" anchor="ctr"/>
+          <a:lstStyle/>
+          <a:p>
+            <a:pPr algn="ctr"/>
+            <a:r>
+              <a:rPr lang="en-US" dirty="0" err="1">
+                <a:solidFill>
+                  <a:schemeClr val="tx1"/>
+                </a:solidFill>
+              </a:rPr>
+              <a:t>cum_drug</a:t>
+            </a:r>
+            <a:endParaRPr lang="en-US" dirty="0">
+              <a:solidFill>
+                <a:schemeClr val="tx1"/>
+              </a:solidFill>
+            </a:endParaRPr>
+          </a:p>
+        </p:txBody>
+      </p:sp>
+      <p:sp>
+        <p:nvSpPr>
+          <p:cNvPr id="6" name="Hexagon 5">
+            <a:extLst>
+              <a:ext uri="{FF2B5EF4-FFF2-40B4-BE49-F238E27FC236}">
+                <a16:creationId xmlns:a16="http://schemas.microsoft.com/office/drawing/2014/main" id="{D89F8164-5C1D-3E83-12C4-6141C0E20429}"/>
+              </a:ext>
+            </a:extLst>
+          </p:cNvPr>
+          <p:cNvSpPr/>
+          <p:nvPr/>
+        </p:nvSpPr>
+        <p:spPr>
+          <a:xfrm>
+            <a:off x="6591143" y="3586466"/>
+            <a:ext cx="1340204" cy="421013"/>
+          </a:xfrm>
+          <a:prstGeom prst="hexagon">
+            <a:avLst/>
+          </a:prstGeom>
+          <a:solidFill>
+            <a:srgbClr val="FF0000"/>
+          </a:solidFill>
+        </p:spPr>
+        <p:style>
+          <a:lnRef idx="2">
+            <a:schemeClr val="accent1">
+              <a:shade val="50000"/>
+            </a:schemeClr>
+          </a:lnRef>
+          <a:fillRef idx="1">
+            <a:schemeClr val="accent1"/>
+          </a:fillRef>
+          <a:effectRef idx="0">
+            <a:schemeClr val="accent1"/>
+          </a:effectRef>
+          <a:fontRef idx="minor">
+            <a:schemeClr val="lt1"/>
+          </a:fontRef>
+        </p:style>
+        <p:txBody>
+          <a:bodyPr rtlCol="0" anchor="ctr"/>
+          <a:lstStyle/>
+          <a:p>
+            <a:pPr algn="ctr"/>
+            <a:r>
+              <a:rPr lang="en-US" dirty="0">
+                <a:solidFill>
+                  <a:schemeClr val="tx1"/>
+                </a:solidFill>
+              </a:rPr>
+              <a:t>outcome</a:t>
+            </a:r>
+          </a:p>
+        </p:txBody>
+      </p:sp>
+      <p:sp>
+        <p:nvSpPr>
+          <p:cNvPr id="7" name="Oval 6">
+            <a:extLst>
+              <a:ext uri="{FF2B5EF4-FFF2-40B4-BE49-F238E27FC236}">
+                <a16:creationId xmlns:a16="http://schemas.microsoft.com/office/drawing/2014/main" id="{3B799602-B204-34BD-F3DE-7C5042CE0F10}"/>
+              </a:ext>
+            </a:extLst>
+          </p:cNvPr>
+          <p:cNvSpPr/>
+          <p:nvPr/>
+        </p:nvSpPr>
+        <p:spPr>
+          <a:xfrm>
+            <a:off x="7582016" y="5091476"/>
+            <a:ext cx="1498888" cy="605258"/>
+          </a:xfrm>
+          <a:prstGeom prst="ellipse">
+            <a:avLst/>
+          </a:prstGeom>
+          <a:solidFill>
+            <a:srgbClr val="FFC000"/>
+          </a:solidFill>
+        </p:spPr>
+        <p:style>
+          <a:lnRef idx="2">
+            <a:schemeClr val="accent1">
+              <a:shade val="50000"/>
+            </a:schemeClr>
+          </a:lnRef>
+          <a:fillRef idx="1">
+            <a:schemeClr val="accent1"/>
+          </a:fillRef>
+          <a:effectRef idx="0">
+            <a:schemeClr val="accent1"/>
+          </a:effectRef>
+          <a:fontRef idx="minor">
+            <a:schemeClr val="lt1"/>
+          </a:fontRef>
+        </p:style>
+        <p:txBody>
+          <a:bodyPr rtlCol="0" anchor="ctr"/>
+          <a:lstStyle/>
+          <a:p>
+            <a:pPr algn="ctr"/>
+            <a:r>
+              <a:rPr lang="en-US" dirty="0">
+                <a:solidFill>
+                  <a:schemeClr val="tx1"/>
+                </a:solidFill>
+              </a:rPr>
+              <a:t>severity</a:t>
+            </a:r>
+          </a:p>
+        </p:txBody>
+      </p:sp>
+      <p:cxnSp>
+        <p:nvCxnSpPr>
+          <p:cNvPr id="9" name="Connector: Curved 8">
+            <a:extLst>
+              <a:ext uri="{FF2B5EF4-FFF2-40B4-BE49-F238E27FC236}">
+                <a16:creationId xmlns:a16="http://schemas.microsoft.com/office/drawing/2014/main" id="{32A9BC64-0B31-72F0-4FB8-373A6FD0E265}"/>
+              </a:ext>
+            </a:extLst>
+          </p:cNvPr>
+          <p:cNvCxnSpPr>
+            <a:cxnSpLocks/>
+            <a:stCxn id="25" idx="6"/>
+            <a:endCxn id="7" idx="2"/>
+          </p:cNvCxnSpPr>
+          <p:nvPr/>
+        </p:nvCxnSpPr>
+        <p:spPr>
+          <a:xfrm>
+            <a:off x="3866417" y="826101"/>
+            <a:ext cx="3715599" cy="4568004"/>
+          </a:xfrm>
+          <a:prstGeom prst="curvedConnector3">
+            <a:avLst>
+              <a:gd name="adj1" fmla="val 50000"/>
+            </a:avLst>
+          </a:prstGeom>
+          <a:ln w="38100">
+            <a:solidFill>
+              <a:schemeClr val="tx1"/>
+            </a:solidFill>
+            <a:tailEnd type="triangle" w="lg" len="lg"/>
+          </a:ln>
+        </p:spPr>
+        <p:style>
+          <a:lnRef idx="1">
+            <a:schemeClr val="accent1"/>
+          </a:lnRef>
+          <a:fillRef idx="0">
+            <a:schemeClr val="accent1"/>
+          </a:fillRef>
+          <a:effectRef idx="0">
+            <a:schemeClr val="accent1"/>
+          </a:effectRef>
+          <a:fontRef idx="minor">
+            <a:schemeClr val="tx1"/>
+          </a:fontRef>
+        </p:style>
+      </p:cxnSp>
+      <p:cxnSp>
+        <p:nvCxnSpPr>
+          <p:cNvPr id="10" name="Connector: Curved 9">
+            <a:extLst>
+              <a:ext uri="{FF2B5EF4-FFF2-40B4-BE49-F238E27FC236}">
+                <a16:creationId xmlns:a16="http://schemas.microsoft.com/office/drawing/2014/main" id="{2E975068-4584-07EC-8508-E7A6CF15D699}"/>
+              </a:ext>
+            </a:extLst>
+          </p:cNvPr>
+          <p:cNvCxnSpPr>
+            <a:cxnSpLocks/>
+            <a:stCxn id="3" idx="2"/>
+            <a:endCxn id="6" idx="4"/>
+          </p:cNvCxnSpPr>
+          <p:nvPr/>
+        </p:nvCxnSpPr>
+        <p:spPr>
+          <a:xfrm rot="10800000" flipV="1">
+            <a:off x="6696396" y="837542"/>
+            <a:ext cx="866990" cy="2748924"/>
+          </a:xfrm>
+          <a:prstGeom prst="curvedConnector2">
+            <a:avLst/>
+          </a:prstGeom>
+          <a:ln w="38100">
+            <a:solidFill>
+              <a:schemeClr val="tx1"/>
+            </a:solidFill>
+            <a:tailEnd type="triangle" w="lg" len="lg"/>
+          </a:ln>
+        </p:spPr>
+        <p:style>
+          <a:lnRef idx="1">
+            <a:schemeClr val="accent1"/>
+          </a:lnRef>
+          <a:fillRef idx="0">
+            <a:schemeClr val="accent1"/>
+          </a:fillRef>
+          <a:effectRef idx="0">
+            <a:schemeClr val="accent1"/>
+          </a:effectRef>
+          <a:fontRef idx="minor">
+            <a:schemeClr val="tx1"/>
+          </a:fontRef>
+        </p:style>
+      </p:cxnSp>
+      <p:cxnSp>
+        <p:nvCxnSpPr>
+          <p:cNvPr id="11" name="Connector: Curved 10">
+            <a:extLst>
+              <a:ext uri="{FF2B5EF4-FFF2-40B4-BE49-F238E27FC236}">
+                <a16:creationId xmlns:a16="http://schemas.microsoft.com/office/drawing/2014/main" id="{59456F5B-620F-A858-C60E-273E3B1B6A0E}"/>
+              </a:ext>
+            </a:extLst>
+          </p:cNvPr>
+          <p:cNvCxnSpPr>
+            <a:cxnSpLocks/>
+            <a:stCxn id="7" idx="0"/>
+            <a:endCxn id="2" idx="2"/>
+          </p:cNvCxnSpPr>
+          <p:nvPr/>
+        </p:nvCxnSpPr>
+        <p:spPr>
+          <a:xfrm rot="5400000" flipH="1" flipV="1">
+            <a:off x="8136264" y="4115058"/>
+            <a:ext cx="1171615" cy="781223"/>
+          </a:xfrm>
+          <a:prstGeom prst="curvedConnector3">
+            <a:avLst>
+              <a:gd name="adj1" fmla="val 50000"/>
+            </a:avLst>
+          </a:prstGeom>
+          <a:ln w="38100">
+            <a:solidFill>
+              <a:schemeClr val="tx1"/>
+            </a:solidFill>
+            <a:tailEnd type="triangle" w="lg" len="lg"/>
+          </a:ln>
+        </p:spPr>
+        <p:style>
+          <a:lnRef idx="1">
+            <a:schemeClr val="accent1"/>
+          </a:lnRef>
+          <a:fillRef idx="0">
+            <a:schemeClr val="accent1"/>
+          </a:fillRef>
+          <a:effectRef idx="0">
+            <a:schemeClr val="accent1"/>
+          </a:effectRef>
+          <a:fontRef idx="minor">
+            <a:schemeClr val="tx1"/>
+          </a:fontRef>
+        </p:style>
+      </p:cxnSp>
+      <p:cxnSp>
+        <p:nvCxnSpPr>
+          <p:cNvPr id="12" name="Connector: Curved 11">
+            <a:extLst>
+              <a:ext uri="{FF2B5EF4-FFF2-40B4-BE49-F238E27FC236}">
+                <a16:creationId xmlns:a16="http://schemas.microsoft.com/office/drawing/2014/main" id="{733ECA5E-28CF-29F2-4A5F-3CC4B8E725CA}"/>
+              </a:ext>
+            </a:extLst>
+          </p:cNvPr>
+          <p:cNvCxnSpPr>
+            <a:cxnSpLocks/>
+            <a:stCxn id="2" idx="0"/>
+            <a:endCxn id="5" idx="4"/>
+          </p:cNvCxnSpPr>
+          <p:nvPr/>
+        </p:nvCxnSpPr>
+        <p:spPr>
+          <a:xfrm rot="16200000" flipV="1">
+            <a:off x="8123211" y="2302445"/>
+            <a:ext cx="1197723" cy="781223"/>
+          </a:xfrm>
+          <a:prstGeom prst="curvedConnector3">
+            <a:avLst>
+              <a:gd name="adj1" fmla="val 50000"/>
+            </a:avLst>
+          </a:prstGeom>
+          <a:ln w="38100">
+            <a:solidFill>
+              <a:schemeClr val="tx1"/>
+            </a:solidFill>
+            <a:tailEnd type="triangle" w="lg" len="lg"/>
+          </a:ln>
+        </p:spPr>
+        <p:style>
+          <a:lnRef idx="1">
+            <a:schemeClr val="accent1"/>
+          </a:lnRef>
+          <a:fillRef idx="0">
+            <a:schemeClr val="accent1"/>
+          </a:fillRef>
+          <a:effectRef idx="0">
+            <a:schemeClr val="accent1"/>
+          </a:effectRef>
+          <a:fontRef idx="minor">
+            <a:schemeClr val="tx1"/>
+          </a:fontRef>
+        </p:style>
+      </p:cxnSp>
+      <p:cxnSp>
+        <p:nvCxnSpPr>
+          <p:cNvPr id="13" name="Connector: Curved 12">
+            <a:extLst>
+              <a:ext uri="{FF2B5EF4-FFF2-40B4-BE49-F238E27FC236}">
+                <a16:creationId xmlns:a16="http://schemas.microsoft.com/office/drawing/2014/main" id="{4A69FCD4-2B44-8B22-A3F9-688B631473F2}"/>
+              </a:ext>
+            </a:extLst>
+          </p:cNvPr>
+          <p:cNvCxnSpPr>
+            <a:cxnSpLocks/>
+            <a:stCxn id="2" idx="3"/>
+            <a:endCxn id="23" idx="0"/>
+          </p:cNvCxnSpPr>
+          <p:nvPr/>
+        </p:nvCxnSpPr>
+        <p:spPr>
+          <a:xfrm>
+            <a:off x="9634319" y="3605890"/>
+            <a:ext cx="1330530" cy="333067"/>
+          </a:xfrm>
+          <a:prstGeom prst="curvedConnector2">
+            <a:avLst/>
+          </a:prstGeom>
+          <a:ln w="38100">
+            <a:solidFill>
+              <a:schemeClr val="tx1"/>
+            </a:solidFill>
+            <a:tailEnd type="triangle" w="lg" len="lg"/>
+          </a:ln>
+        </p:spPr>
+        <p:style>
+          <a:lnRef idx="1">
+            <a:schemeClr val="accent1"/>
+          </a:lnRef>
+          <a:fillRef idx="0">
+            <a:schemeClr val="accent1"/>
+          </a:fillRef>
+          <a:effectRef idx="0">
+            <a:schemeClr val="accent1"/>
+          </a:effectRef>
+          <a:fontRef idx="minor">
+            <a:schemeClr val="tx1"/>
+          </a:fontRef>
+        </p:style>
+      </p:cxnSp>
+      <p:cxnSp>
+        <p:nvCxnSpPr>
+          <p:cNvPr id="14" name="Connector: Curved 13">
+            <a:extLst>
+              <a:ext uri="{FF2B5EF4-FFF2-40B4-BE49-F238E27FC236}">
+                <a16:creationId xmlns:a16="http://schemas.microsoft.com/office/drawing/2014/main" id="{36C827B2-CD4E-DBBF-9426-925F0EFB15FC}"/>
+              </a:ext>
+            </a:extLst>
+          </p:cNvPr>
+          <p:cNvCxnSpPr>
+            <a:cxnSpLocks/>
+            <a:stCxn id="47" idx="6"/>
+            <a:endCxn id="7" idx="2"/>
+          </p:cNvCxnSpPr>
+          <p:nvPr/>
+        </p:nvCxnSpPr>
+        <p:spPr>
+          <a:xfrm>
+            <a:off x="3804953" y="5391190"/>
+            <a:ext cx="3777063" cy="2915"/>
+          </a:xfrm>
+          <a:prstGeom prst="curvedConnector3">
+            <a:avLst>
+              <a:gd name="adj1" fmla="val 50000"/>
+            </a:avLst>
+          </a:prstGeom>
+          <a:ln w="38100">
+            <a:solidFill>
+              <a:schemeClr val="tx1"/>
+            </a:solidFill>
+            <a:prstDash val="solid"/>
+            <a:tailEnd type="triangle" w="lg" len="lg"/>
+          </a:ln>
+        </p:spPr>
+        <p:style>
+          <a:lnRef idx="1">
+            <a:schemeClr val="accent1"/>
+          </a:lnRef>
+          <a:fillRef idx="0">
+            <a:schemeClr val="accent1"/>
+          </a:fillRef>
+          <a:effectRef idx="0">
+            <a:schemeClr val="accent1"/>
+          </a:effectRef>
+          <a:fontRef idx="minor">
+            <a:schemeClr val="tx1"/>
+          </a:fontRef>
+        </p:style>
+      </p:cxnSp>
+      <p:cxnSp>
+        <p:nvCxnSpPr>
+          <p:cNvPr id="15" name="Connector: Curved 14">
+            <a:extLst>
+              <a:ext uri="{FF2B5EF4-FFF2-40B4-BE49-F238E27FC236}">
+                <a16:creationId xmlns:a16="http://schemas.microsoft.com/office/drawing/2014/main" id="{49E9C397-2A44-C023-53EF-04E578C5946B}"/>
+              </a:ext>
+            </a:extLst>
+          </p:cNvPr>
+          <p:cNvCxnSpPr>
+            <a:cxnSpLocks/>
+            <a:stCxn id="5" idx="6"/>
+            <a:endCxn id="23" idx="0"/>
+          </p:cNvCxnSpPr>
+          <p:nvPr/>
+        </p:nvCxnSpPr>
+        <p:spPr>
+          <a:xfrm>
+            <a:off x="9151787" y="1798977"/>
+            <a:ext cx="1813062" cy="2139980"/>
+          </a:xfrm>
+          <a:prstGeom prst="curvedConnector2">
+            <a:avLst/>
+          </a:prstGeom>
+          <a:ln w="38100">
+            <a:solidFill>
+              <a:schemeClr val="tx1"/>
+            </a:solidFill>
+            <a:tailEnd type="triangle" w="lg" len="lg"/>
+          </a:ln>
+        </p:spPr>
+        <p:style>
+          <a:lnRef idx="1">
+            <a:schemeClr val="accent1"/>
+          </a:lnRef>
+          <a:fillRef idx="0">
+            <a:schemeClr val="accent1"/>
+          </a:fillRef>
+          <a:effectRef idx="0">
+            <a:schemeClr val="accent1"/>
+          </a:effectRef>
+          <a:fontRef idx="minor">
+            <a:schemeClr val="tx1"/>
+          </a:fontRef>
+        </p:style>
+      </p:cxnSp>
+      <p:cxnSp>
+        <p:nvCxnSpPr>
+          <p:cNvPr id="16" name="Connector: Curved 15">
+            <a:extLst>
+              <a:ext uri="{FF2B5EF4-FFF2-40B4-BE49-F238E27FC236}">
+                <a16:creationId xmlns:a16="http://schemas.microsoft.com/office/drawing/2014/main" id="{6778C715-EF7E-AD6E-CD3E-CAD8D6BAF79D}"/>
+              </a:ext>
+            </a:extLst>
+          </p:cNvPr>
+          <p:cNvCxnSpPr>
+            <a:cxnSpLocks/>
+            <a:stCxn id="7" idx="1"/>
+            <a:endCxn id="6" idx="2"/>
+          </p:cNvCxnSpPr>
+          <p:nvPr/>
+        </p:nvCxnSpPr>
+        <p:spPr>
+          <a:xfrm rot="16200000" flipV="1">
+            <a:off x="6662643" y="4041233"/>
+            <a:ext cx="1172635" cy="1105127"/>
+          </a:xfrm>
+          <a:prstGeom prst="curvedConnector3">
+            <a:avLst>
+              <a:gd name="adj1" fmla="val 50000"/>
+            </a:avLst>
+          </a:prstGeom>
+          <a:ln w="38100">
+            <a:solidFill>
+              <a:schemeClr val="tx1"/>
+            </a:solidFill>
+            <a:tailEnd type="triangle" w="lg" len="lg"/>
+          </a:ln>
+        </p:spPr>
+        <p:style>
+          <a:lnRef idx="1">
+            <a:schemeClr val="accent1"/>
+          </a:lnRef>
+          <a:fillRef idx="0">
+            <a:schemeClr val="accent1"/>
+          </a:fillRef>
+          <a:effectRef idx="0">
+            <a:schemeClr val="accent1"/>
+          </a:effectRef>
+          <a:fontRef idx="minor">
+            <a:schemeClr val="tx1"/>
+          </a:fontRef>
+        </p:style>
+      </p:cxnSp>
+      <p:sp>
+        <p:nvSpPr>
+          <p:cNvPr id="18" name="TextBox 17">
+            <a:extLst>
+              <a:ext uri="{FF2B5EF4-FFF2-40B4-BE49-F238E27FC236}">
+                <a16:creationId xmlns:a16="http://schemas.microsoft.com/office/drawing/2014/main" id="{EE33DA0C-8AB4-AD8D-381A-9EB869329156}"/>
+              </a:ext>
+            </a:extLst>
+          </p:cNvPr>
+          <p:cNvSpPr txBox="1"/>
+          <p:nvPr/>
+        </p:nvSpPr>
+        <p:spPr>
+          <a:xfrm>
+            <a:off x="7260441" y="5892970"/>
+            <a:ext cx="2142038" cy="400110"/>
+          </a:xfrm>
+          <a:prstGeom prst="rect">
+            <a:avLst/>
+          </a:prstGeom>
+          <a:noFill/>
+        </p:spPr>
+        <p:txBody>
+          <a:bodyPr wrap="square" rtlCol="0">
+            <a:spAutoFit/>
+          </a:bodyPr>
+          <a:lstStyle/>
+          <a:p>
+            <a:pPr algn="ctr"/>
+            <a:r>
+              <a:rPr lang="en-US" sz="2000" b="1" dirty="0">
+                <a:solidFill>
+                  <a:srgbClr val="9DC3E6"/>
+                </a:solidFill>
+              </a:rPr>
+              <a:t>today</a:t>
+            </a:r>
+          </a:p>
+        </p:txBody>
+      </p:sp>
+      <p:sp>
+        <p:nvSpPr>
+          <p:cNvPr id="19" name="TextBox 18">
+            <a:extLst>
+              <a:ext uri="{FF2B5EF4-FFF2-40B4-BE49-F238E27FC236}">
+                <a16:creationId xmlns:a16="http://schemas.microsoft.com/office/drawing/2014/main" id="{45F92B5B-3D79-4674-556E-536FC9AAEC64}"/>
+              </a:ext>
+            </a:extLst>
+          </p:cNvPr>
+          <p:cNvSpPr txBox="1"/>
+          <p:nvPr/>
+        </p:nvSpPr>
+        <p:spPr>
+          <a:xfrm>
+            <a:off x="2020973" y="5939499"/>
+            <a:ext cx="2142038" cy="400110"/>
+          </a:xfrm>
+          <a:prstGeom prst="rect">
+            <a:avLst/>
+          </a:prstGeom>
+          <a:noFill/>
+        </p:spPr>
+        <p:txBody>
+          <a:bodyPr wrap="square" rtlCol="0">
+            <a:spAutoFit/>
+          </a:bodyPr>
+          <a:lstStyle/>
+          <a:p>
+            <a:pPr algn="ctr"/>
+            <a:r>
+              <a:rPr lang="en-US" sz="2000" b="1" dirty="0">
+                <a:solidFill>
+                  <a:srgbClr val="9DC3E6"/>
+                </a:solidFill>
+              </a:rPr>
+              <a:t>yesterday</a:t>
+            </a:r>
+          </a:p>
+        </p:txBody>
+      </p:sp>
+      <p:sp>
+        <p:nvSpPr>
+          <p:cNvPr id="23" name="Oval 22">
+            <a:extLst>
+              <a:ext uri="{FF2B5EF4-FFF2-40B4-BE49-F238E27FC236}">
+                <a16:creationId xmlns:a16="http://schemas.microsoft.com/office/drawing/2014/main" id="{842FC0AB-E109-13AD-E8FC-D99AF4ECA6F5}"/>
+              </a:ext>
+            </a:extLst>
+          </p:cNvPr>
+          <p:cNvSpPr/>
+          <p:nvPr/>
+        </p:nvSpPr>
+        <p:spPr>
+          <a:xfrm>
+            <a:off x="10317037" y="3938957"/>
+            <a:ext cx="1295624" cy="445532"/>
+          </a:xfrm>
+          <a:prstGeom prst="ellipse">
+            <a:avLst/>
+          </a:prstGeom>
+          <a:solidFill>
+            <a:srgbClr val="FFFF00"/>
+          </a:solidFill>
+        </p:spPr>
+        <p:style>
+          <a:lnRef idx="2">
+            <a:schemeClr val="accent1">
+              <a:shade val="50000"/>
+            </a:schemeClr>
+          </a:lnRef>
+          <a:fillRef idx="1">
+            <a:schemeClr val="accent1"/>
+          </a:fillRef>
+          <a:effectRef idx="0">
+            <a:schemeClr val="accent1"/>
+          </a:effectRef>
+          <a:fontRef idx="minor">
+            <a:schemeClr val="lt1"/>
+          </a:fontRef>
+        </p:style>
+        <p:txBody>
+          <a:bodyPr rtlCol="0" anchor="ctr"/>
+          <a:lstStyle/>
+          <a:p>
+            <a:pPr algn="ctr"/>
+            <a:r>
+              <a:rPr lang="en-US" dirty="0">
+                <a:solidFill>
+                  <a:schemeClr val="tx1"/>
+                </a:solidFill>
+              </a:rPr>
+              <a:t>efficacy</a:t>
+            </a:r>
+          </a:p>
+        </p:txBody>
+      </p:sp>
+      <p:cxnSp>
+        <p:nvCxnSpPr>
+          <p:cNvPr id="24" name="Connector: Curved 23">
+            <a:extLst>
+              <a:ext uri="{FF2B5EF4-FFF2-40B4-BE49-F238E27FC236}">
+                <a16:creationId xmlns:a16="http://schemas.microsoft.com/office/drawing/2014/main" id="{2B3E895E-1C0A-9E82-9A03-2C98F256CE20}"/>
+              </a:ext>
+            </a:extLst>
+          </p:cNvPr>
+          <p:cNvCxnSpPr>
+            <a:cxnSpLocks/>
+            <a:stCxn id="28" idx="6"/>
+            <a:endCxn id="7" idx="2"/>
+          </p:cNvCxnSpPr>
+          <p:nvPr/>
+        </p:nvCxnSpPr>
+        <p:spPr>
+          <a:xfrm>
+            <a:off x="4966765" y="4381834"/>
+            <a:ext cx="2615251" cy="1012271"/>
+          </a:xfrm>
+          <a:prstGeom prst="curvedConnector3">
+            <a:avLst>
+              <a:gd name="adj1" fmla="val 36579"/>
+            </a:avLst>
+          </a:prstGeom>
+          <a:ln w="38100">
+            <a:solidFill>
+              <a:schemeClr val="tx1"/>
+            </a:solidFill>
+            <a:tailEnd type="triangle" w="lg" len="lg"/>
+          </a:ln>
+        </p:spPr>
+        <p:style>
+          <a:lnRef idx="1">
+            <a:schemeClr val="accent1"/>
+          </a:lnRef>
+          <a:fillRef idx="0">
+            <a:schemeClr val="accent1"/>
+          </a:fillRef>
+          <a:effectRef idx="0">
+            <a:schemeClr val="accent1"/>
+          </a:effectRef>
+          <a:fontRef idx="minor">
+            <a:schemeClr val="tx1"/>
+          </a:fontRef>
+        </p:style>
+      </p:cxnSp>
+      <p:sp>
+        <p:nvSpPr>
+          <p:cNvPr id="25" name="Oval 24">
+            <a:extLst>
+              <a:ext uri="{FF2B5EF4-FFF2-40B4-BE49-F238E27FC236}">
+                <a16:creationId xmlns:a16="http://schemas.microsoft.com/office/drawing/2014/main" id="{348540B3-09AE-C68E-1B9B-AD73BA94B7DA}"/>
+              </a:ext>
+            </a:extLst>
+          </p:cNvPr>
+          <p:cNvSpPr/>
+          <p:nvPr/>
+        </p:nvSpPr>
+        <p:spPr>
+          <a:xfrm>
+            <a:off x="2317567" y="536982"/>
+            <a:ext cx="1548850" cy="578238"/>
+          </a:xfrm>
+          <a:prstGeom prst="ellipse">
+            <a:avLst/>
+          </a:prstGeom>
+          <a:solidFill>
+            <a:srgbClr val="FFFF00"/>
+          </a:solidFill>
+        </p:spPr>
+        <p:style>
+          <a:lnRef idx="2">
+            <a:schemeClr val="accent1">
+              <a:shade val="50000"/>
+            </a:schemeClr>
+          </a:lnRef>
+          <a:fillRef idx="1">
+            <a:schemeClr val="accent1"/>
+          </a:fillRef>
+          <a:effectRef idx="0">
+            <a:schemeClr val="accent1"/>
+          </a:effectRef>
+          <a:fontRef idx="minor">
+            <a:schemeClr val="lt1"/>
+          </a:fontRef>
+        </p:style>
+        <p:txBody>
+          <a:bodyPr rtlCol="0" anchor="ctr"/>
+          <a:lstStyle/>
+          <a:p>
+            <a:pPr algn="ctr"/>
+            <a:r>
+              <a:rPr lang="en-US" dirty="0">
+                <a:solidFill>
+                  <a:schemeClr val="tx1"/>
+                </a:solidFill>
+              </a:rPr>
+              <a:t>infection</a:t>
+            </a:r>
+          </a:p>
+        </p:txBody>
+      </p:sp>
+      <p:sp>
+        <p:nvSpPr>
+          <p:cNvPr id="27" name="Oval 26">
+            <a:extLst>
+              <a:ext uri="{FF2B5EF4-FFF2-40B4-BE49-F238E27FC236}">
+                <a16:creationId xmlns:a16="http://schemas.microsoft.com/office/drawing/2014/main" id="{8F2D6096-AE95-313A-A509-F81911C89B14}"/>
+              </a:ext>
+            </a:extLst>
+          </p:cNvPr>
+          <p:cNvSpPr/>
+          <p:nvPr/>
+        </p:nvSpPr>
+        <p:spPr>
+          <a:xfrm>
+            <a:off x="2269938" y="1493348"/>
+            <a:ext cx="1644108" cy="578237"/>
+          </a:xfrm>
+          <a:prstGeom prst="ellipse">
+            <a:avLst/>
+          </a:prstGeom>
+          <a:solidFill>
+            <a:srgbClr val="FFFF00"/>
+          </a:solidFill>
+        </p:spPr>
+        <p:style>
+          <a:lnRef idx="2">
+            <a:schemeClr val="accent1">
+              <a:shade val="50000"/>
+            </a:schemeClr>
+          </a:lnRef>
+          <a:fillRef idx="1">
+            <a:schemeClr val="accent1"/>
+          </a:fillRef>
+          <a:effectRef idx="0">
+            <a:schemeClr val="accent1"/>
+          </a:effectRef>
+          <a:fontRef idx="minor">
+            <a:schemeClr val="lt1"/>
+          </a:fontRef>
+        </p:style>
+        <p:txBody>
+          <a:bodyPr rtlCol="0" anchor="ctr"/>
+          <a:lstStyle/>
+          <a:p>
+            <a:pPr algn="ctr"/>
+            <a:r>
+              <a:rPr lang="en-US" dirty="0" err="1">
+                <a:solidFill>
+                  <a:schemeClr val="tx1"/>
+                </a:solidFill>
+              </a:rPr>
+              <a:t>cum_drug</a:t>
+            </a:r>
+            <a:endParaRPr lang="en-US" dirty="0">
+              <a:solidFill>
+                <a:schemeClr val="tx1"/>
+              </a:solidFill>
+            </a:endParaRPr>
+          </a:p>
+        </p:txBody>
+      </p:sp>
+      <p:sp>
+        <p:nvSpPr>
+          <p:cNvPr id="47" name="Oval 46">
+            <a:extLst>
+              <a:ext uri="{FF2B5EF4-FFF2-40B4-BE49-F238E27FC236}">
+                <a16:creationId xmlns:a16="http://schemas.microsoft.com/office/drawing/2014/main" id="{D169DE58-0667-10B7-0EF1-143BB6F859B1}"/>
+              </a:ext>
+            </a:extLst>
+          </p:cNvPr>
+          <p:cNvSpPr/>
+          <p:nvPr/>
+        </p:nvSpPr>
+        <p:spPr>
+          <a:xfrm>
+            <a:off x="2379032" y="5117462"/>
+            <a:ext cx="1425921" cy="547455"/>
+          </a:xfrm>
+          <a:prstGeom prst="ellipse">
+            <a:avLst/>
+          </a:prstGeom>
+          <a:solidFill>
+            <a:srgbClr val="FFC000"/>
+          </a:solidFill>
+        </p:spPr>
+        <p:style>
+          <a:lnRef idx="2">
+            <a:schemeClr val="accent1">
+              <a:shade val="50000"/>
+            </a:schemeClr>
+          </a:lnRef>
+          <a:fillRef idx="1">
+            <a:schemeClr val="accent1"/>
+          </a:fillRef>
+          <a:effectRef idx="0">
+            <a:schemeClr val="accent1"/>
+          </a:effectRef>
+          <a:fontRef idx="minor">
+            <a:schemeClr val="lt1"/>
+          </a:fontRef>
+        </p:style>
+        <p:txBody>
+          <a:bodyPr rtlCol="0" anchor="ctr"/>
+          <a:lstStyle/>
+          <a:p>
+            <a:pPr algn="ctr"/>
+            <a:r>
+              <a:rPr lang="en-US" dirty="0">
+                <a:solidFill>
+                  <a:schemeClr val="tx1"/>
+                </a:solidFill>
+              </a:rPr>
+              <a:t>severity</a:t>
+            </a:r>
+          </a:p>
+        </p:txBody>
+      </p:sp>
+      <p:sp>
+        <p:nvSpPr>
+          <p:cNvPr id="91" name="TextBox 90">
+            <a:extLst>
+              <a:ext uri="{FF2B5EF4-FFF2-40B4-BE49-F238E27FC236}">
+                <a16:creationId xmlns:a16="http://schemas.microsoft.com/office/drawing/2014/main" id="{294A6E50-E077-59B9-3A8F-D3361EDAA4E8}"/>
+              </a:ext>
+            </a:extLst>
+          </p:cNvPr>
+          <p:cNvSpPr txBox="1"/>
+          <p:nvPr/>
+        </p:nvSpPr>
+        <p:spPr>
+          <a:xfrm rot="16700736">
+            <a:off x="6078066" y="2320351"/>
+            <a:ext cx="1109995" cy="369332"/>
+          </a:xfrm>
+          <a:prstGeom prst="rect">
+            <a:avLst/>
+          </a:prstGeom>
+          <a:noFill/>
+        </p:spPr>
+        <p:txBody>
+          <a:bodyPr wrap="square" rtlCol="0">
+            <a:spAutoFit/>
+          </a:bodyPr>
+          <a:lstStyle/>
+          <a:p>
+            <a:pPr algn="ctr"/>
+            <a:r>
+              <a:rPr lang="en-US" dirty="0">
+                <a:solidFill>
+                  <a:schemeClr val="accent4">
+                    <a:lumMod val="75000"/>
+                  </a:schemeClr>
+                </a:solidFill>
+              </a:rPr>
+              <a:t>finished</a:t>
+            </a:r>
+            <a:endParaRPr lang="en-US" dirty="0"/>
+          </a:p>
+        </p:txBody>
+      </p:sp>
+      <p:sp>
+        <p:nvSpPr>
+          <p:cNvPr id="93" name="TextBox 92">
+            <a:extLst>
+              <a:ext uri="{FF2B5EF4-FFF2-40B4-BE49-F238E27FC236}">
+                <a16:creationId xmlns:a16="http://schemas.microsoft.com/office/drawing/2014/main" id="{165BFDEB-4D2A-6F7A-09F6-C9D5B761B0CF}"/>
+              </a:ext>
+            </a:extLst>
+          </p:cNvPr>
+          <p:cNvSpPr txBox="1"/>
+          <p:nvPr/>
+        </p:nvSpPr>
+        <p:spPr>
+          <a:xfrm rot="2837346">
+            <a:off x="9593420" y="2111812"/>
+            <a:ext cx="1695166" cy="369332"/>
+          </a:xfrm>
+          <a:prstGeom prst="rect">
+            <a:avLst/>
+          </a:prstGeom>
+          <a:noFill/>
+        </p:spPr>
+        <p:txBody>
+          <a:bodyPr wrap="square" rtlCol="0">
+            <a:spAutoFit/>
+          </a:bodyPr>
+          <a:lstStyle/>
+          <a:p>
+            <a:pPr algn="ctr"/>
+            <a:r>
+              <a:rPr lang="en-US" dirty="0">
+                <a:solidFill>
+                  <a:schemeClr val="accent4">
+                    <a:lumMod val="75000"/>
+                  </a:schemeClr>
+                </a:solidFill>
+              </a:rPr>
+              <a:t>desensitization</a:t>
+            </a:r>
+          </a:p>
+        </p:txBody>
+      </p:sp>
+      <p:sp>
+        <p:nvSpPr>
+          <p:cNvPr id="104" name="TextBox 103">
+            <a:extLst>
+              <a:ext uri="{FF2B5EF4-FFF2-40B4-BE49-F238E27FC236}">
+                <a16:creationId xmlns:a16="http://schemas.microsoft.com/office/drawing/2014/main" id="{8A4F6DF9-C937-42C1-3F6B-98D13B0D7225}"/>
+              </a:ext>
+            </a:extLst>
+          </p:cNvPr>
+          <p:cNvSpPr txBox="1"/>
+          <p:nvPr/>
+        </p:nvSpPr>
+        <p:spPr>
+          <a:xfrm rot="1816204">
+            <a:off x="6977601" y="4333838"/>
+            <a:ext cx="1109995" cy="369332"/>
+          </a:xfrm>
+          <a:prstGeom prst="rect">
+            <a:avLst/>
+          </a:prstGeom>
+          <a:noFill/>
+        </p:spPr>
+        <p:txBody>
+          <a:bodyPr wrap="square" rtlCol="0">
+            <a:spAutoFit/>
+          </a:bodyPr>
+          <a:lstStyle/>
+          <a:p>
+            <a:pPr algn="ctr"/>
+            <a:r>
+              <a:rPr lang="en-US" dirty="0">
+                <a:solidFill>
+                  <a:schemeClr val="accent4">
+                    <a:lumMod val="75000"/>
+                  </a:schemeClr>
+                </a:solidFill>
+              </a:rPr>
+              <a:t>mortality</a:t>
+            </a:r>
+          </a:p>
+        </p:txBody>
+      </p:sp>
+      <p:sp>
+        <p:nvSpPr>
+          <p:cNvPr id="105" name="TextBox 104">
+            <a:extLst>
+              <a:ext uri="{FF2B5EF4-FFF2-40B4-BE49-F238E27FC236}">
+                <a16:creationId xmlns:a16="http://schemas.microsoft.com/office/drawing/2014/main" id="{125983A9-5CCB-C88B-12C2-7D1BBBC78EBF}"/>
+              </a:ext>
+            </a:extLst>
+          </p:cNvPr>
+          <p:cNvSpPr txBox="1"/>
+          <p:nvPr/>
+        </p:nvSpPr>
+        <p:spPr>
+          <a:xfrm rot="19680086">
+            <a:off x="7888199" y="4263872"/>
+            <a:ext cx="1109995" cy="369332"/>
+          </a:xfrm>
+          <a:prstGeom prst="rect">
+            <a:avLst/>
+          </a:prstGeom>
+          <a:noFill/>
+        </p:spPr>
+        <p:txBody>
+          <a:bodyPr wrap="square" rtlCol="0">
+            <a:spAutoFit/>
+          </a:bodyPr>
+          <a:lstStyle/>
+          <a:p>
+            <a:pPr algn="ctr"/>
+            <a:r>
+              <a:rPr lang="en-US" dirty="0">
+                <a:solidFill>
+                  <a:schemeClr val="accent4">
+                    <a:lumMod val="75000"/>
+                  </a:schemeClr>
+                </a:solidFill>
+              </a:rPr>
+              <a:t>indication</a:t>
+            </a:r>
+          </a:p>
+        </p:txBody>
+      </p:sp>
+      <p:sp>
+        <p:nvSpPr>
+          <p:cNvPr id="109" name="TextBox 108">
+            <a:extLst>
+              <a:ext uri="{FF2B5EF4-FFF2-40B4-BE49-F238E27FC236}">
+                <a16:creationId xmlns:a16="http://schemas.microsoft.com/office/drawing/2014/main" id="{DFED97AE-D445-411C-5401-9D0BD11D1EF3}"/>
+              </a:ext>
+            </a:extLst>
+          </p:cNvPr>
+          <p:cNvSpPr txBox="1"/>
+          <p:nvPr/>
+        </p:nvSpPr>
+        <p:spPr>
+          <a:xfrm rot="2610934">
+            <a:off x="8190600" y="2560132"/>
+            <a:ext cx="1695166" cy="369332"/>
+          </a:xfrm>
+          <a:prstGeom prst="rect">
+            <a:avLst/>
+          </a:prstGeom>
+          <a:noFill/>
+        </p:spPr>
+        <p:txBody>
+          <a:bodyPr wrap="square" rtlCol="0">
+            <a:spAutoFit/>
+          </a:bodyPr>
+          <a:lstStyle/>
+          <a:p>
+            <a:pPr algn="ctr"/>
+            <a:r>
+              <a:rPr lang="en-US" dirty="0">
+                <a:solidFill>
+                  <a:schemeClr val="accent4">
+                    <a:lumMod val="75000"/>
+                  </a:schemeClr>
+                </a:solidFill>
+              </a:rPr>
+              <a:t>accumulation</a:t>
+            </a:r>
+          </a:p>
+        </p:txBody>
+      </p:sp>
+      <p:sp>
+        <p:nvSpPr>
+          <p:cNvPr id="2" name="Rectangle 1">
+            <a:extLst>
+              <a:ext uri="{FF2B5EF4-FFF2-40B4-BE49-F238E27FC236}">
+                <a16:creationId xmlns:a16="http://schemas.microsoft.com/office/drawing/2014/main" id="{53D412E8-D39A-D47C-9D86-C709D9A87BAC}"/>
+              </a:ext>
+            </a:extLst>
+          </p:cNvPr>
+          <p:cNvSpPr/>
+          <p:nvPr/>
+        </p:nvSpPr>
+        <p:spPr>
+          <a:xfrm>
+            <a:off x="8591046" y="3291918"/>
+            <a:ext cx="1043273" cy="627943"/>
+          </a:xfrm>
+          <a:prstGeom prst="rect">
+            <a:avLst/>
+          </a:prstGeom>
+          <a:solidFill>
+            <a:schemeClr val="accent6">
+              <a:lumMod val="40000"/>
+              <a:lumOff val="60000"/>
+            </a:schemeClr>
+          </a:solidFill>
+        </p:spPr>
+        <p:style>
+          <a:lnRef idx="2">
+            <a:schemeClr val="accent1">
+              <a:shade val="50000"/>
+            </a:schemeClr>
+          </a:lnRef>
+          <a:fillRef idx="1">
+            <a:schemeClr val="accent1"/>
+          </a:fillRef>
+          <a:effectRef idx="0">
+            <a:schemeClr val="accent1"/>
+          </a:effectRef>
+          <a:fontRef idx="minor">
+            <a:schemeClr val="lt1"/>
+          </a:fontRef>
+        </p:style>
+        <p:txBody>
+          <a:bodyPr rtlCol="0" anchor="ctr"/>
+          <a:lstStyle/>
+          <a:p>
+            <a:pPr algn="ctr"/>
+            <a:r>
+              <a:rPr lang="en-US" dirty="0">
+                <a:solidFill>
+                  <a:schemeClr val="tx1"/>
+                </a:solidFill>
+              </a:rPr>
+              <a:t>drug</a:t>
+            </a:r>
+          </a:p>
+        </p:txBody>
+      </p:sp>
+      <p:sp>
+        <p:nvSpPr>
+          <p:cNvPr id="28" name="Oval 27">
+            <a:extLst>
+              <a:ext uri="{FF2B5EF4-FFF2-40B4-BE49-F238E27FC236}">
+                <a16:creationId xmlns:a16="http://schemas.microsoft.com/office/drawing/2014/main" id="{5FB22E92-5869-FE2B-2FC1-E3D7AC32E66A}"/>
+              </a:ext>
+            </a:extLst>
+          </p:cNvPr>
+          <p:cNvSpPr/>
+          <p:nvPr/>
+        </p:nvSpPr>
+        <p:spPr>
+          <a:xfrm>
+            <a:off x="3671141" y="4159068"/>
+            <a:ext cx="1295624" cy="445532"/>
+          </a:xfrm>
+          <a:prstGeom prst="ellipse">
+            <a:avLst/>
+          </a:prstGeom>
+          <a:solidFill>
+            <a:srgbClr val="FFFF00"/>
+          </a:solidFill>
+        </p:spPr>
+        <p:style>
+          <a:lnRef idx="2">
+            <a:schemeClr val="accent1">
+              <a:shade val="50000"/>
+            </a:schemeClr>
+          </a:lnRef>
+          <a:fillRef idx="1">
+            <a:schemeClr val="accent1"/>
+          </a:fillRef>
+          <a:effectRef idx="0">
+            <a:schemeClr val="accent1"/>
+          </a:effectRef>
+          <a:fontRef idx="minor">
+            <a:schemeClr val="lt1"/>
+          </a:fontRef>
+        </p:style>
+        <p:txBody>
+          <a:bodyPr rtlCol="0" anchor="ctr"/>
+          <a:lstStyle/>
+          <a:p>
+            <a:pPr algn="ctr"/>
+            <a:r>
+              <a:rPr lang="en-US" dirty="0">
+                <a:solidFill>
+                  <a:schemeClr val="tx1"/>
+                </a:solidFill>
+              </a:rPr>
+              <a:t>efficacy</a:t>
+            </a:r>
+          </a:p>
+        </p:txBody>
+      </p:sp>
+      <p:cxnSp>
+        <p:nvCxnSpPr>
+          <p:cNvPr id="29" name="Connector: Curved 28">
+            <a:extLst>
+              <a:ext uri="{FF2B5EF4-FFF2-40B4-BE49-F238E27FC236}">
+                <a16:creationId xmlns:a16="http://schemas.microsoft.com/office/drawing/2014/main" id="{67160EC5-A298-1067-141E-330F245FD62C}"/>
+              </a:ext>
+            </a:extLst>
+          </p:cNvPr>
+          <p:cNvCxnSpPr>
+            <a:cxnSpLocks/>
+            <a:stCxn id="25" idx="6"/>
+            <a:endCxn id="3" idx="2"/>
+          </p:cNvCxnSpPr>
+          <p:nvPr/>
+        </p:nvCxnSpPr>
+        <p:spPr>
+          <a:xfrm>
+            <a:off x="3866417" y="826101"/>
+            <a:ext cx="3696969" cy="11441"/>
+          </a:xfrm>
+          <a:prstGeom prst="curvedConnector3">
+            <a:avLst>
+              <a:gd name="adj1" fmla="val 50000"/>
+            </a:avLst>
+          </a:prstGeom>
+          <a:ln w="38100">
+            <a:solidFill>
+              <a:schemeClr val="tx1"/>
+            </a:solidFill>
+            <a:prstDash val="solid"/>
+            <a:tailEnd type="triangle" w="lg" len="lg"/>
+          </a:ln>
+        </p:spPr>
+        <p:style>
+          <a:lnRef idx="1">
+            <a:schemeClr val="accent1"/>
+          </a:lnRef>
+          <a:fillRef idx="0">
+            <a:schemeClr val="accent1"/>
+          </a:fillRef>
+          <a:effectRef idx="0">
+            <a:schemeClr val="accent1"/>
+          </a:effectRef>
+          <a:fontRef idx="minor">
+            <a:schemeClr val="tx1"/>
+          </a:fontRef>
+        </p:style>
+      </p:cxnSp>
+      <p:cxnSp>
+        <p:nvCxnSpPr>
+          <p:cNvPr id="33" name="Connector: Curved 32">
+            <a:extLst>
+              <a:ext uri="{FF2B5EF4-FFF2-40B4-BE49-F238E27FC236}">
+                <a16:creationId xmlns:a16="http://schemas.microsoft.com/office/drawing/2014/main" id="{FF82D7BB-97D1-8C08-501A-B6DD9242C184}"/>
+              </a:ext>
+            </a:extLst>
+          </p:cNvPr>
+          <p:cNvCxnSpPr>
+            <a:cxnSpLocks/>
+            <a:stCxn id="27" idx="6"/>
+            <a:endCxn id="5" idx="2"/>
+          </p:cNvCxnSpPr>
+          <p:nvPr/>
+        </p:nvCxnSpPr>
+        <p:spPr>
+          <a:xfrm>
+            <a:off x="3914046" y="1782467"/>
+            <a:ext cx="3597087" cy="16510"/>
+          </a:xfrm>
+          <a:prstGeom prst="curvedConnector3">
+            <a:avLst>
+              <a:gd name="adj1" fmla="val 50000"/>
+            </a:avLst>
+          </a:prstGeom>
+          <a:ln w="38100">
+            <a:solidFill>
+              <a:schemeClr val="tx1"/>
+            </a:solidFill>
+            <a:prstDash val="solid"/>
+            <a:tailEnd type="triangle" w="lg" len="lg"/>
+          </a:ln>
+        </p:spPr>
+        <p:style>
+          <a:lnRef idx="1">
+            <a:schemeClr val="accent1"/>
+          </a:lnRef>
+          <a:fillRef idx="0">
+            <a:schemeClr val="accent1"/>
+          </a:fillRef>
+          <a:effectRef idx="0">
+            <a:schemeClr val="accent1"/>
+          </a:effectRef>
+          <a:fontRef idx="minor">
+            <a:schemeClr val="tx1"/>
+          </a:fontRef>
+        </p:style>
+      </p:cxnSp>
+      <p:sp>
+        <p:nvSpPr>
+          <p:cNvPr id="26" name="TextBox 25">
+            <a:extLst>
+              <a:ext uri="{FF2B5EF4-FFF2-40B4-BE49-F238E27FC236}">
+                <a16:creationId xmlns:a16="http://schemas.microsoft.com/office/drawing/2014/main" id="{37D3927D-ECDF-6810-2E9E-91E6B66D3E60}"/>
+              </a:ext>
+            </a:extLst>
+          </p:cNvPr>
+          <p:cNvSpPr txBox="1"/>
+          <p:nvPr/>
+        </p:nvSpPr>
+        <p:spPr>
+          <a:xfrm rot="751440">
+            <a:off x="9723050" y="3338754"/>
+            <a:ext cx="1215214" cy="369332"/>
+          </a:xfrm>
+          <a:prstGeom prst="rect">
+            <a:avLst/>
+          </a:prstGeom>
+          <a:noFill/>
+        </p:spPr>
+        <p:txBody>
+          <a:bodyPr wrap="square" rtlCol="0">
+            <a:spAutoFit/>
+          </a:bodyPr>
+          <a:lstStyle/>
+          <a:p>
+            <a:pPr algn="ctr"/>
+            <a:r>
+              <a:rPr lang="en-US" dirty="0">
+                <a:solidFill>
+                  <a:schemeClr val="accent4">
+                    <a:lumMod val="75000"/>
+                  </a:schemeClr>
+                </a:solidFill>
+              </a:rPr>
+              <a:t>treatment</a:t>
+            </a:r>
+          </a:p>
+        </p:txBody>
+      </p:sp>
+    </p:spTree>
+    <p:extLst>
+      <p:ext uri="{BB962C8B-B14F-4D97-AF65-F5344CB8AC3E}">
+        <p14:creationId xmlns:p14="http://schemas.microsoft.com/office/powerpoint/2010/main" val="3241601526"/>
       </p:ext>
     </p:extLst>
   </p:cSld>
@@ -5487,6 +9534,301 @@
 </a:theme>
 </file>
 
+<file path=ppt/theme/theme2.xml><?xml version="1.0" encoding="utf-8"?>
+<a:theme xmlns:a="http://schemas.openxmlformats.org/drawingml/2006/main" name="Office Theme">
+  <a:themeElements>
+    <a:clrScheme name="Office">
+      <a:dk1>
+        <a:sysClr val="windowText" lastClr="000000"/>
+      </a:dk1>
+      <a:lt1>
+        <a:sysClr val="window" lastClr="FFFFFF"/>
+      </a:lt1>
+      <a:dk2>
+        <a:srgbClr val="44546A"/>
+      </a:dk2>
+      <a:lt2>
+        <a:srgbClr val="E7E6E6"/>
+      </a:lt2>
+      <a:accent1>
+        <a:srgbClr val="4472C4"/>
+      </a:accent1>
+      <a:accent2>
+        <a:srgbClr val="ED7D31"/>
+      </a:accent2>
+      <a:accent3>
+        <a:srgbClr val="A5A5A5"/>
+      </a:accent3>
+      <a:accent4>
+        <a:srgbClr val="FFC000"/>
+      </a:accent4>
+      <a:accent5>
+        <a:srgbClr val="5B9BD5"/>
+      </a:accent5>
+      <a:accent6>
+        <a:srgbClr val="70AD47"/>
+      </a:accent6>
+      <a:hlink>
+        <a:srgbClr val="0563C1"/>
+      </a:hlink>
+      <a:folHlink>
+        <a:srgbClr val="954F72"/>
+      </a:folHlink>
+    </a:clrScheme>
+    <a:fontScheme name="Office">
+      <a:majorFont>
+        <a:latin typeface="Calibri Light" panose="020F0302020204030204"/>
+        <a:ea typeface=""/>
+        <a:cs typeface=""/>
+        <a:font script="Jpan" typeface="游ゴシック Light"/>
+        <a:font script="Hang" typeface="맑은 고딕"/>
+        <a:font script="Hans" typeface="等线 Light"/>
+        <a:font script="Hant" typeface="新細明體"/>
+        <a:font script="Arab" typeface="Times New Roman"/>
+        <a:font script="Hebr" typeface="Times New Roman"/>
+        <a:font script="Thai" typeface="Angsana New"/>
+        <a:font script="Ethi" typeface="Nyala"/>
+        <a:font script="Beng" typeface="Vrinda"/>
+        <a:font script="Gujr" typeface="Shruti"/>
+        <a:font script="Khmr" typeface="MoolBoran"/>
+        <a:font script="Knda" typeface="Tunga"/>
+        <a:font script="Guru" typeface="Raavi"/>
+        <a:font script="Cans" typeface="Euphemia"/>
+        <a:font script="Cher" typeface="Plantagenet Cherokee"/>
+        <a:font script="Yiii" typeface="Microsoft Yi Baiti"/>
+        <a:font script="Tibt" typeface="Microsoft Himalaya"/>
+        <a:font script="Thaa" typeface="MV Boli"/>
+        <a:font script="Deva" typeface="Mangal"/>
+        <a:font script="Telu" typeface="Gautami"/>
+        <a:font script="Taml" typeface="Latha"/>
+        <a:font script="Syrc" typeface="Estrangelo Edessa"/>
+        <a:font script="Orya" typeface="Kalinga"/>
+        <a:font script="Mlym" typeface="Kartika"/>
+        <a:font script="Laoo" typeface="DokChampa"/>
+        <a:font script="Sinh" typeface="Iskoola Pota"/>
+        <a:font script="Mong" typeface="Mongolian Baiti"/>
+        <a:font script="Viet" typeface="Times New Roman"/>
+        <a:font script="Uigh" typeface="Microsoft Uighur"/>
+        <a:font script="Geor" typeface="Sylfaen"/>
+        <a:font script="Armn" typeface="Arial"/>
+        <a:font script="Bugi" typeface="Leelawadee UI"/>
+        <a:font script="Bopo" typeface="Microsoft JhengHei"/>
+        <a:font script="Java" typeface="Javanese Text"/>
+        <a:font script="Lisu" typeface="Segoe UI"/>
+        <a:font script="Mymr" typeface="Myanmar Text"/>
+        <a:font script="Nkoo" typeface="Ebrima"/>
+        <a:font script="Olck" typeface="Nirmala UI"/>
+        <a:font script="Osma" typeface="Ebrima"/>
+        <a:font script="Phag" typeface="Phagspa"/>
+        <a:font script="Syrn" typeface="Estrangelo Edessa"/>
+        <a:font script="Syrj" typeface="Estrangelo Edessa"/>
+        <a:font script="Syre" typeface="Estrangelo Edessa"/>
+        <a:font script="Sora" typeface="Nirmala UI"/>
+        <a:font script="Tale" typeface="Microsoft Tai Le"/>
+        <a:font script="Talu" typeface="Microsoft New Tai Lue"/>
+        <a:font script="Tfng" typeface="Ebrima"/>
+      </a:majorFont>
+      <a:minorFont>
+        <a:latin typeface="Calibri" panose="020F0502020204030204"/>
+        <a:ea typeface=""/>
+        <a:cs typeface=""/>
+        <a:font script="Jpan" typeface="游ゴシック"/>
+        <a:font script="Hang" typeface="맑은 고딕"/>
+        <a:font script="Hans" typeface="等线"/>
+        <a:font script="Hant" typeface="新細明體"/>
+        <a:font script="Arab" typeface="Arial"/>
+        <a:font script="Hebr" typeface="Arial"/>
+        <a:font script="Thai" typeface="Cordia New"/>
+        <a:font script="Ethi" typeface="Nyala"/>
+        <a:font script="Beng" typeface="Vrinda"/>
+        <a:font script="Gujr" typeface="Shruti"/>
+        <a:font script="Khmr" typeface="DaunPenh"/>
+        <a:font script="Knda" typeface="Tunga"/>
+        <a:font script="Guru" typeface="Raavi"/>
+        <a:font script="Cans" typeface="Euphemia"/>
+        <a:font script="Cher" typeface="Plantagenet Cherokee"/>
+        <a:font script="Yiii" typeface="Microsoft Yi Baiti"/>
+        <a:font script="Tibt" typeface="Microsoft Himalaya"/>
+        <a:font script="Thaa" typeface="MV Boli"/>
+        <a:font script="Deva" typeface="Mangal"/>
+        <a:font script="Telu" typeface="Gautami"/>
+        <a:font script="Taml" typeface="Latha"/>
+        <a:font script="Syrc" typeface="Estrangelo Edessa"/>
+        <a:font script="Orya" typeface="Kalinga"/>
+        <a:font script="Mlym" typeface="Kartika"/>
+        <a:font script="Laoo" typeface="DokChampa"/>
+        <a:font script="Sinh" typeface="Iskoola Pota"/>
+        <a:font script="Mong" typeface="Mongolian Baiti"/>
+        <a:font script="Viet" typeface="Arial"/>
+        <a:font script="Uigh" typeface="Microsoft Uighur"/>
+        <a:font script="Geor" typeface="Sylfaen"/>
+        <a:font script="Armn" typeface="Arial"/>
+        <a:font script="Bugi" typeface="Leelawadee UI"/>
+        <a:font script="Bopo" typeface="Microsoft JhengHei"/>
+        <a:font script="Java" typeface="Javanese Text"/>
+        <a:font script="Lisu" typeface="Segoe UI"/>
+        <a:font script="Mymr" typeface="Myanmar Text"/>
+        <a:font script="Nkoo" typeface="Ebrima"/>
+        <a:font script="Olck" typeface="Nirmala UI"/>
+        <a:font script="Osma" typeface="Ebrima"/>
+        <a:font script="Phag" typeface="Phagspa"/>
+        <a:font script="Syrn" typeface="Estrangelo Edessa"/>
+        <a:font script="Syrj" typeface="Estrangelo Edessa"/>
+        <a:font script="Syre" typeface="Estrangelo Edessa"/>
+        <a:font script="Sora" typeface="Nirmala UI"/>
+        <a:font script="Tale" typeface="Microsoft Tai Le"/>
+        <a:font script="Talu" typeface="Microsoft New Tai Lue"/>
+        <a:font script="Tfng" typeface="Ebrima"/>
+      </a:minorFont>
+    </a:fontScheme>
+    <a:fmtScheme name="Office">
+      <a:fillStyleLst>
+        <a:solidFill>
+          <a:schemeClr val="phClr"/>
+        </a:solidFill>
+        <a:gradFill rotWithShape="1">
+          <a:gsLst>
+            <a:gs pos="0">
+              <a:schemeClr val="phClr">
+                <a:lumMod val="110000"/>
+                <a:satMod val="105000"/>
+                <a:tint val="67000"/>
+              </a:schemeClr>
+            </a:gs>
+            <a:gs pos="50000">
+              <a:schemeClr val="phClr">
+                <a:lumMod val="105000"/>
+                <a:satMod val="103000"/>
+                <a:tint val="73000"/>
+              </a:schemeClr>
+            </a:gs>
+            <a:gs pos="100000">
+              <a:schemeClr val="phClr">
+                <a:lumMod val="105000"/>
+                <a:satMod val="109000"/>
+                <a:tint val="81000"/>
+              </a:schemeClr>
+            </a:gs>
+          </a:gsLst>
+          <a:lin ang="5400000" scaled="0"/>
+        </a:gradFill>
+        <a:gradFill rotWithShape="1">
+          <a:gsLst>
+            <a:gs pos="0">
+              <a:schemeClr val="phClr">
+                <a:satMod val="103000"/>
+                <a:lumMod val="102000"/>
+                <a:tint val="94000"/>
+              </a:schemeClr>
+            </a:gs>
+            <a:gs pos="50000">
+              <a:schemeClr val="phClr">
+                <a:satMod val="110000"/>
+                <a:lumMod val="100000"/>
+                <a:shade val="100000"/>
+              </a:schemeClr>
+            </a:gs>
+            <a:gs pos="100000">
+              <a:schemeClr val="phClr">
+                <a:lumMod val="99000"/>
+                <a:satMod val="120000"/>
+                <a:shade val="78000"/>
+              </a:schemeClr>
+            </a:gs>
+          </a:gsLst>
+          <a:lin ang="5400000" scaled="0"/>
+        </a:gradFill>
+      </a:fillStyleLst>
+      <a:lnStyleLst>
+        <a:ln w="6350" cap="flat" cmpd="sng" algn="ctr">
+          <a:solidFill>
+            <a:schemeClr val="phClr"/>
+          </a:solidFill>
+          <a:prstDash val="solid"/>
+          <a:miter lim="800000"/>
+        </a:ln>
+        <a:ln w="12700" cap="flat" cmpd="sng" algn="ctr">
+          <a:solidFill>
+            <a:schemeClr val="phClr"/>
+          </a:solidFill>
+          <a:prstDash val="solid"/>
+          <a:miter lim="800000"/>
+        </a:ln>
+        <a:ln w="19050" cap="flat" cmpd="sng" algn="ctr">
+          <a:solidFill>
+            <a:schemeClr val="phClr"/>
+          </a:solidFill>
+          <a:prstDash val="solid"/>
+          <a:miter lim="800000"/>
+        </a:ln>
+      </a:lnStyleLst>
+      <a:effectStyleLst>
+        <a:effectStyle>
+          <a:effectLst/>
+        </a:effectStyle>
+        <a:effectStyle>
+          <a:effectLst/>
+        </a:effectStyle>
+        <a:effectStyle>
+          <a:effectLst>
+            <a:outerShdw blurRad="57150" dist="19050" dir="5400000" algn="ctr" rotWithShape="0">
+              <a:srgbClr val="000000">
+                <a:alpha val="63000"/>
+              </a:srgbClr>
+            </a:outerShdw>
+          </a:effectLst>
+        </a:effectStyle>
+      </a:effectStyleLst>
+      <a:bgFillStyleLst>
+        <a:solidFill>
+          <a:schemeClr val="phClr"/>
+        </a:solidFill>
+        <a:solidFill>
+          <a:schemeClr val="phClr">
+            <a:tint val="95000"/>
+            <a:satMod val="170000"/>
+          </a:schemeClr>
+        </a:solidFill>
+        <a:gradFill rotWithShape="1">
+          <a:gsLst>
+            <a:gs pos="0">
+              <a:schemeClr val="phClr">
+                <a:tint val="93000"/>
+                <a:satMod val="150000"/>
+                <a:shade val="98000"/>
+                <a:lumMod val="102000"/>
+              </a:schemeClr>
+            </a:gs>
+            <a:gs pos="50000">
+              <a:schemeClr val="phClr">
+                <a:tint val="98000"/>
+                <a:satMod val="130000"/>
+                <a:shade val="90000"/>
+                <a:lumMod val="103000"/>
+              </a:schemeClr>
+            </a:gs>
+            <a:gs pos="100000">
+              <a:schemeClr val="phClr">
+                <a:shade val="63000"/>
+                <a:satMod val="120000"/>
+              </a:schemeClr>
+            </a:gs>
+          </a:gsLst>
+          <a:lin ang="5400000" scaled="0"/>
+        </a:gradFill>
+      </a:bgFillStyleLst>
+    </a:fmtScheme>
+  </a:themeElements>
+  <a:objectDefaults/>
+  <a:extraClrSchemeLst/>
+  <a:extLst>
+    <a:ext uri="{05A4C25C-085E-4340-85A3-A5531E510DB2}">
+      <thm15:themeFamily xmlns:thm15="http://schemas.microsoft.com/office/thememl/2012/main" name="Office Theme" id="{62F939B6-93AF-4DB8-9C6B-D6C7DFDC589F}" vid="{4A3C46E8-61CC-4603-A589-7422A47A8E4A}"/>
+    </a:ext>
+  </a:extLst>
+</a:theme>
+</file>
+
 <file path=docMetadata/LabelInfo.xml><?xml version="1.0" encoding="utf-8"?>
 <clbl:labelList xmlns:clbl="http://schemas.microsoft.com/office/2020/mipLabelMetadata">
   <clbl:label id="{f42aa342-8706-4288-bd11-ebb85995028c}" enabled="1" method="Standard" siteId="{72f988bf-86f1-41af-91ab-2d7cd011db47}" removed="0"/>

</xml_diff>